<commit_message>
Did the BDA HW
</commit_message>
<xml_diff>
--- a/OSDA/bighw/presentation/neaurla_kirdin_matvei_presentation.pptx
+++ b/OSDA/bighw/presentation/neaurla_kirdin_matvei_presentation.pptx
@@ -5,28 +5,30 @@
     <p:sldMasterId id="2147483659" r:id="rId1"/>
   </p:sldMasterIdLst>
   <p:notesMasterIdLst>
-    <p:notesMasterId r:id="rId18"/>
+    <p:notesMasterId r:id="rId20"/>
   </p:notesMasterIdLst>
   <p:handoutMasterIdLst>
-    <p:handoutMasterId r:id="rId19"/>
+    <p:handoutMasterId r:id="rId21"/>
   </p:handoutMasterIdLst>
   <p:sldIdLst>
     <p:sldId id="256" r:id="rId2"/>
     <p:sldId id="257" r:id="rId3"/>
-    <p:sldId id="258" r:id="rId4"/>
-    <p:sldId id="260" r:id="rId5"/>
-    <p:sldId id="279" r:id="rId6"/>
-    <p:sldId id="276" r:id="rId7"/>
-    <p:sldId id="277" r:id="rId8"/>
-    <p:sldId id="278" r:id="rId9"/>
-    <p:sldId id="282" r:id="rId10"/>
-    <p:sldId id="283" r:id="rId11"/>
-    <p:sldId id="284" r:id="rId12"/>
-    <p:sldId id="280" r:id="rId13"/>
-    <p:sldId id="281" r:id="rId14"/>
-    <p:sldId id="273" r:id="rId15"/>
-    <p:sldId id="275" r:id="rId16"/>
-    <p:sldId id="274" r:id="rId17"/>
+    <p:sldId id="285" r:id="rId4"/>
+    <p:sldId id="258" r:id="rId5"/>
+    <p:sldId id="260" r:id="rId6"/>
+    <p:sldId id="279" r:id="rId7"/>
+    <p:sldId id="276" r:id="rId8"/>
+    <p:sldId id="277" r:id="rId9"/>
+    <p:sldId id="278" r:id="rId10"/>
+    <p:sldId id="286" r:id="rId11"/>
+    <p:sldId id="282" r:id="rId12"/>
+    <p:sldId id="283" r:id="rId13"/>
+    <p:sldId id="284" r:id="rId14"/>
+    <p:sldId id="280" r:id="rId15"/>
+    <p:sldId id="281" r:id="rId16"/>
+    <p:sldId id="273" r:id="rId17"/>
+    <p:sldId id="275" r:id="rId18"/>
+    <p:sldId id="274" r:id="rId19"/>
   </p:sldIdLst>
   <p:sldSz cx="12192000" cy="6858000"/>
   <p:notesSz cx="6858000" cy="9144000"/>
@@ -352,7 +354,7 @@
           <a:p>
             <a:fld id="{FF24A9DD-F218-471B-908E-23F8C68ED030}" type="datetimeFigureOut">
               <a:rPr lang="en-US" smtClean="0"/>
-              <a:t>12/2/2024</a:t>
+              <a:t>12/4/2024</a:t>
             </a:fld>
             <a:endParaRPr lang="en-US"/>
           </a:p>
@@ -2076,7 +2078,7 @@
             </a:pPr>
             <a:fld id="{00000000-1234-1234-1234-123412341234}" type="slidenum">
               <a:rPr lang="en-US"/>
-              <a:t>4</a:t>
+              <a:t>5</a:t>
             </a:fld>
             <a:endParaRPr/>
           </a:p>
@@ -2887,8 +2889,8 @@
                 <a:solidFill>
                   <a:srgbClr val="0F2D69"/>
                 </a:solidFill>
-                <a:latin typeface="Arial"/>
-                <a:ea typeface="Arial"/>
+                <a:latin typeface="HSE Sans" panose="02000000000000000000" pitchFamily="50" charset="0"/>
+                <a:ea typeface="HSE Sans" panose="02000000000000000000" pitchFamily="50" charset="0"/>
                 <a:cs typeface="Arial"/>
                 <a:sym typeface="Arial"/>
               </a:defRPr>
@@ -3022,7 +3024,7 @@
             </a:fld>
             <a:r>
               <a:rPr lang="en-US" dirty="0" smtClean="0"/>
-              <a:t>/ 16</a:t>
+              <a:t>/18</a:t>
             </a:r>
             <a:endParaRPr lang="en-US" dirty="0"/>
           </a:p>
@@ -3681,7 +3683,7 @@
             </a:fld>
             <a:r>
               <a:rPr lang="en-US" dirty="0" smtClean="0"/>
-              <a:t>/16</a:t>
+              <a:t>/18</a:t>
             </a:r>
             <a:endParaRPr lang="en-US" dirty="0"/>
           </a:p>
@@ -5240,7 +5242,7 @@
             </a:fld>
             <a:r>
               <a:rPr lang="en-US" dirty="0" smtClean="0"/>
-              <a:t>/16</a:t>
+              <a:t>/18</a:t>
             </a:r>
             <a:endParaRPr lang="en-US" sz="1400" dirty="0">
               <a:solidFill>
@@ -6228,7 +6230,7 @@
               <a:rPr lang="en-US" dirty="0" smtClean="0">
                 <a:latin typeface="HSE Sans" panose="02000000000000000000" pitchFamily="50" charset="0"/>
               </a:rPr>
-              <a:t>/16 </a:t>
+              <a:t>/18 </a:t>
             </a:r>
             <a:endParaRPr dirty="0">
               <a:latin typeface="HSE Sans" panose="02000000000000000000" pitchFamily="50" charset="0"/>
@@ -6298,6 +6300,138 @@
 </file>
 
 <file path=ppt/slides/slide10.xml><?xml version="1.0" encoding="utf-8"?>
+<p:sld xmlns:a="http://schemas.openxmlformats.org/drawingml/2006/main" xmlns:r="http://schemas.openxmlformats.org/officeDocument/2006/relationships" xmlns:p="http://schemas.openxmlformats.org/presentationml/2006/main">
+  <p:cSld>
+    <p:spTree>
+      <p:nvGrpSpPr>
+        <p:cNvPr id="1" name=""/>
+        <p:cNvGrpSpPr/>
+        <p:nvPr/>
+      </p:nvGrpSpPr>
+      <p:grpSpPr>
+        <a:xfrm>
+          <a:off x="0" y="0"/>
+          <a:ext cx="0" cy="0"/>
+          <a:chOff x="0" y="0"/>
+          <a:chExt cx="0" cy="0"/>
+        </a:xfrm>
+      </p:grpSpPr>
+      <p:sp>
+        <p:nvSpPr>
+          <p:cNvPr id="2" name="Title 1"/>
+          <p:cNvSpPr>
+            <a:spLocks noGrp="1"/>
+          </p:cNvSpPr>
+          <p:nvPr>
+            <p:ph type="title"/>
+          </p:nvPr>
+        </p:nvSpPr>
+        <p:spPr/>
+        <p:txBody>
+          <a:bodyPr/>
+          <a:lstStyle/>
+          <a:p>
+            <a:r>
+              <a:rPr lang="en-US" dirty="0" smtClean="0"/>
+              <a:t>Model Evaluation</a:t>
+            </a:r>
+            <a:endParaRPr lang="en-US" dirty="0"/>
+          </a:p>
+        </p:txBody>
+      </p:sp>
+      <p:sp>
+        <p:nvSpPr>
+          <p:cNvPr id="3" name="Text Placeholder 2"/>
+          <p:cNvSpPr>
+            <a:spLocks noGrp="1"/>
+          </p:cNvSpPr>
+          <p:nvPr>
+            <p:ph type="body" idx="1"/>
+          </p:nvPr>
+        </p:nvSpPr>
+        <p:spPr/>
+        <p:txBody>
+          <a:bodyPr/>
+          <a:lstStyle/>
+          <a:p>
+            <a:pPr marL="114300" indent="0">
+              <a:buNone/>
+            </a:pPr>
+            <a:endParaRPr lang="en-GB" dirty="0" smtClean="0"/>
+          </a:p>
+          <a:p>
+            <a:pPr marL="114300" indent="0">
+              <a:lnSpc>
+                <a:spcPct val="114000"/>
+              </a:lnSpc>
+              <a:buNone/>
+            </a:pPr>
+            <a:r>
+              <a:rPr lang="en-GB" dirty="0" smtClean="0"/>
+              <a:t>Let’s </a:t>
+            </a:r>
+            <a:r>
+              <a:rPr lang="en-GB" dirty="0"/>
+              <a:t>also compare the impact of different </a:t>
+            </a:r>
+            <a:r>
+              <a:rPr lang="en-GB" b="1" dirty="0" err="1"/>
+              <a:t>binarization</a:t>
+            </a:r>
+            <a:r>
+              <a:rPr lang="en-GB" b="1" dirty="0"/>
+              <a:t> strategies </a:t>
+            </a:r>
+            <a:r>
+              <a:rPr lang="en-GB" dirty="0"/>
+              <a:t>on the interpretability of NN’s architecture.</a:t>
+            </a:r>
+            <a:endParaRPr lang="en-US" dirty="0"/>
+          </a:p>
+        </p:txBody>
+      </p:sp>
+      <p:sp>
+        <p:nvSpPr>
+          <p:cNvPr id="4" name="Slide Number Placeholder 3"/>
+          <p:cNvSpPr>
+            <a:spLocks noGrp="1"/>
+          </p:cNvSpPr>
+          <p:nvPr>
+            <p:ph type="sldNum" idx="12"/>
+          </p:nvPr>
+        </p:nvSpPr>
+        <p:spPr/>
+        <p:txBody>
+          <a:bodyPr/>
+          <a:lstStyle/>
+          <a:p>
+            <a:fld id="{00000000-1234-1234-1234-123412341234}" type="slidenum">
+              <a:rPr lang="en-US" smtClean="0"/>
+              <a:pPr/>
+              <a:t>10</a:t>
+            </a:fld>
+            <a:r>
+              <a:rPr lang="en-US" dirty="0" smtClean="0"/>
+              <a:t>/18</a:t>
+            </a:r>
+            <a:endParaRPr lang="en-US" dirty="0"/>
+          </a:p>
+        </p:txBody>
+      </p:sp>
+    </p:spTree>
+    <p:extLst>
+      <p:ext uri="{BB962C8B-B14F-4D97-AF65-F5344CB8AC3E}">
+        <p14:creationId xmlns:p14="http://schemas.microsoft.com/office/powerpoint/2010/main" val="3978945950"/>
+      </p:ext>
+    </p:extLst>
+  </p:cSld>
+  <p:clrMapOvr>
+    <a:masterClrMapping/>
+  </p:clrMapOvr>
+</p:sld>
+</file>
+
+<file path=ppt/slides/slide11.xml><?xml version="1.0" encoding="utf-8"?>
 <p:sld xmlns:a="http://schemas.openxmlformats.org/drawingml/2006/main" xmlns:r="http://schemas.openxmlformats.org/officeDocument/2006/relationships" xmlns:p="http://schemas.openxmlformats.org/presentationml/2006/main">
   <p:cSld>
     <p:spTree>
@@ -6382,11 +6516,11 @@
             </a:pPr>
             <a:fld id="{00000000-1234-1234-1234-123412341234}" type="slidenum">
               <a:rPr lang="en-US" smtClean="0"/>
-              <a:t>10</a:t>
+              <a:t>11</a:t>
             </a:fld>
             <a:r>
               <a:rPr lang="en-US" dirty="0" smtClean="0"/>
-              <a:t>/16</a:t>
+              <a:t>/18</a:t>
             </a:r>
             <a:endParaRPr lang="en-US" dirty="0"/>
           </a:p>
@@ -6415,7 +6549,7 @@
         <p:spPr>
           <a:xfrm>
             <a:off x="986970" y="1702367"/>
-            <a:ext cx="10159092" cy="4351338"/>
+            <a:ext cx="10159092" cy="4426857"/>
           </a:xfrm>
           <a:prstGeom prst="rect">
             <a:avLst/>
@@ -6425,1691 +6559,7 @@
     </p:spTree>
     <p:extLst>
       <p:ext uri="{BB962C8B-B14F-4D97-AF65-F5344CB8AC3E}">
-        <p14:creationId xmlns:p14="http://schemas.microsoft.com/office/powerpoint/2010/main" val="1004134391"/>
-      </p:ext>
-    </p:extLst>
-  </p:cSld>
-  <p:clrMapOvr>
-    <a:masterClrMapping/>
-  </p:clrMapOvr>
-  <p:timing>
-    <p:tnLst>
-      <p:par>
-        <p:cTn id="1" dur="indefinite" restart="never" nodeType="tmRoot"/>
-      </p:par>
-    </p:tnLst>
-  </p:timing>
-</p:sld>
-</file>
-
-<file path=ppt/slides/slide11.xml><?xml version="1.0" encoding="utf-8"?>
-<p:sld xmlns:a="http://schemas.openxmlformats.org/drawingml/2006/main" xmlns:r="http://schemas.openxmlformats.org/officeDocument/2006/relationships" xmlns:p="http://schemas.openxmlformats.org/presentationml/2006/main">
-  <p:cSld>
-    <p:spTree>
-      <p:nvGrpSpPr>
-        <p:cNvPr id="1" name=""/>
-        <p:cNvGrpSpPr/>
-        <p:nvPr/>
-      </p:nvGrpSpPr>
-      <p:grpSpPr>
-        <a:xfrm>
-          <a:off x="0" y="0"/>
-          <a:ext cx="0" cy="0"/>
-          <a:chOff x="0" y="0"/>
-          <a:chExt cx="0" cy="0"/>
-        </a:xfrm>
-      </p:grpSpPr>
-      <p:sp>
-        <p:nvSpPr>
-          <p:cNvPr id="2" name="Title 1"/>
-          <p:cNvSpPr>
-            <a:spLocks noGrp="1"/>
-          </p:cNvSpPr>
-          <p:nvPr>
-            <p:ph type="title"/>
-          </p:nvPr>
-        </p:nvSpPr>
-        <p:spPr/>
-        <p:txBody>
-          <a:bodyPr/>
-          <a:lstStyle/>
-          <a:p>
-            <a:r>
-              <a:rPr lang="en-GB" dirty="0" smtClean="0"/>
-              <a:t>Model Evaluation</a:t>
-            </a:r>
-            <a:endParaRPr lang="en-US" dirty="0"/>
-          </a:p>
-        </p:txBody>
-      </p:sp>
-      <p:sp>
-        <p:nvSpPr>
-          <p:cNvPr id="3" name="Text Placeholder 2"/>
-          <p:cNvSpPr>
-            <a:spLocks noGrp="1"/>
-          </p:cNvSpPr>
-          <p:nvPr>
-            <p:ph type="body" idx="1"/>
-          </p:nvPr>
-        </p:nvSpPr>
-        <p:spPr>
-          <a:xfrm>
-            <a:off x="986970" y="1702367"/>
-            <a:ext cx="4545612" cy="4351338"/>
-          </a:xfrm>
-        </p:spPr>
-        <p:txBody>
-          <a:bodyPr>
-            <a:normAutofit/>
-          </a:bodyPr>
-          <a:lstStyle/>
-          <a:p>
-            <a:pPr marL="114300" indent="0">
-              <a:buNone/>
-            </a:pPr>
-            <a:endParaRPr lang="en-GB" sz="2400" dirty="0" smtClean="0"/>
-          </a:p>
-          <a:p>
-            <a:pPr marL="114300" indent="0">
-              <a:buNone/>
-            </a:pPr>
-            <a:r>
-              <a:rPr lang="en-GB" sz="2400" dirty="0" smtClean="0"/>
-              <a:t>Let’s look at the performance metrics of the neural network and several other classifiers </a:t>
-            </a:r>
-            <a:r>
-              <a:rPr lang="en-GB" sz="2400" dirty="0"/>
-              <a:t>on the Employee Attrition </a:t>
-            </a:r>
-            <a:r>
-              <a:rPr lang="en-GB" sz="2400" dirty="0" smtClean="0"/>
-              <a:t>dataset and </a:t>
-            </a:r>
-            <a:r>
-              <a:rPr lang="en-GB" sz="2400" smtClean="0"/>
-              <a:t>compare them.</a:t>
-            </a:r>
-            <a:endParaRPr lang="en-US" sz="2400" dirty="0"/>
-          </a:p>
-        </p:txBody>
-      </p:sp>
-      <p:sp>
-        <p:nvSpPr>
-          <p:cNvPr id="4" name="Slide Number Placeholder 3"/>
-          <p:cNvSpPr>
-            <a:spLocks noGrp="1"/>
-          </p:cNvSpPr>
-          <p:nvPr>
-            <p:ph type="sldNum" idx="12"/>
-          </p:nvPr>
-        </p:nvSpPr>
-        <p:spPr/>
-        <p:txBody>
-          <a:bodyPr/>
-          <a:lstStyle/>
-          <a:p>
-            <a:pPr marL="0" lvl="0" indent="0" algn="r" rtl="0">
-              <a:spcBef>
-                <a:spcPts val="0"/>
-              </a:spcBef>
-              <a:spcAft>
-                <a:spcPts val="0"/>
-              </a:spcAft>
-              <a:buNone/>
-            </a:pPr>
-            <a:fld id="{00000000-1234-1234-1234-123412341234}" type="slidenum">
-              <a:rPr lang="en-US" smtClean="0"/>
-              <a:t>11</a:t>
-            </a:fld>
-            <a:r>
-              <a:rPr lang="en-US" dirty="0" smtClean="0"/>
-              <a:t>/16</a:t>
-            </a:r>
-            <a:endParaRPr lang="en-US" dirty="0"/>
-          </a:p>
-        </p:txBody>
-      </p:sp>
-      <p:graphicFrame>
-        <p:nvGraphicFramePr>
-          <p:cNvPr id="5" name="Table 4"/>
-          <p:cNvGraphicFramePr>
-            <a:graphicFrameLocks noGrp="1"/>
-          </p:cNvGraphicFramePr>
-          <p:nvPr>
-            <p:extLst>
-              <p:ext uri="{D42A27DB-BD31-4B8C-83A1-F6EECF244321}">
-                <p14:modId xmlns:p14="http://schemas.microsoft.com/office/powerpoint/2010/main" val="3521625944"/>
-              </p:ext>
-            </p:extLst>
-          </p:nvPr>
-        </p:nvGraphicFramePr>
-        <p:xfrm>
-          <a:off x="5532582" y="2422422"/>
-          <a:ext cx="5267037" cy="2260800"/>
-        </p:xfrm>
-        <a:graphic>
-          <a:graphicData uri="http://schemas.openxmlformats.org/drawingml/2006/table">
-            <a:tbl>
-              <a:tblPr/>
-              <a:tblGrid>
-                <a:gridCol w="2087418">
-                  <a:extLst>
-                    <a:ext uri="{9D8B030D-6E8A-4147-A177-3AD203B41FA5}">
-                      <a16:colId xmlns:a16="http://schemas.microsoft.com/office/drawing/2014/main" val="777982496"/>
-                    </a:ext>
-                  </a:extLst>
-                </a:gridCol>
-                <a:gridCol w="1423940">
-                  <a:extLst>
-                    <a:ext uri="{9D8B030D-6E8A-4147-A177-3AD203B41FA5}">
-                      <a16:colId xmlns:a16="http://schemas.microsoft.com/office/drawing/2014/main" val="4159874210"/>
-                    </a:ext>
-                  </a:extLst>
-                </a:gridCol>
-                <a:gridCol w="1755679">
-                  <a:extLst>
-                    <a:ext uri="{9D8B030D-6E8A-4147-A177-3AD203B41FA5}">
-                      <a16:colId xmlns:a16="http://schemas.microsoft.com/office/drawing/2014/main" val="2656411332"/>
-                    </a:ext>
-                  </a:extLst>
-                </a:gridCol>
-              </a:tblGrid>
-              <a:tr h="432000">
-                <a:tc>
-                  <a:txBody>
-                    <a:bodyPr/>
-                    <a:lstStyle/>
-                    <a:p>
-                      <a:pPr algn="ctr"/>
-                      <a:r>
-                        <a:rPr lang="en-GB" b="1" dirty="0" smtClean="0">
-                          <a:solidFill>
-                            <a:srgbClr val="0F2D69"/>
-                          </a:solidFill>
-                          <a:latin typeface="HSE Sans" panose="02000000000000000000" pitchFamily="50" charset="0"/>
-                        </a:rPr>
-                        <a:t>Classifier</a:t>
-                      </a:r>
-                      <a:endParaRPr lang="en-US" b="1" dirty="0">
-                        <a:solidFill>
-                          <a:srgbClr val="0F2D69"/>
-                        </a:solidFill>
-                        <a:latin typeface="HSE Sans" panose="02000000000000000000" pitchFamily="50" charset="0"/>
-                      </a:endParaRPr>
-                    </a:p>
-                  </a:txBody>
-                  <a:tcPr anchor="ctr">
-                    <a:lnL w="12700" cap="flat" cmpd="sng" algn="ctr">
-                      <a:noFill/>
-                      <a:prstDash val="solid"/>
-                      <a:round/>
-                      <a:headEnd type="none" w="med" len="med"/>
-                      <a:tailEnd type="none" w="med" len="med"/>
-                    </a:lnL>
-                    <a:lnR w="12700" cap="flat" cmpd="sng" algn="ctr">
-                      <a:noFill/>
-                      <a:prstDash val="solid"/>
-                      <a:round/>
-                      <a:headEnd type="none" w="med" len="med"/>
-                      <a:tailEnd type="none" w="med" len="med"/>
-                    </a:lnR>
-                    <a:lnT w="12700" cap="flat" cmpd="sng" algn="ctr">
-                      <a:noFill/>
-                      <a:prstDash val="solid"/>
-                      <a:round/>
-                      <a:headEnd type="none" w="med" len="med"/>
-                      <a:tailEnd type="none" w="med" len="med"/>
-                    </a:lnT>
-                    <a:lnB w="12700" cap="flat" cmpd="sng" algn="ctr">
-                      <a:noFill/>
-                      <a:prstDash val="solid"/>
-                      <a:round/>
-                      <a:headEnd type="none" w="med" len="med"/>
-                      <a:tailEnd type="none" w="med" len="med"/>
-                    </a:lnB>
-                    <a:lnTlToBr w="12700" cmpd="sng">
-                      <a:noFill/>
-                      <a:prstDash val="solid"/>
-                    </a:lnTlToBr>
-                    <a:lnBlToTr w="12700" cmpd="sng">
-                      <a:noFill/>
-                      <a:prstDash val="solid"/>
-                    </a:lnBlToTr>
-                    <a:solidFill>
-                      <a:srgbClr val="FFF07D"/>
-                    </a:solidFill>
-                  </a:tcPr>
-                </a:tc>
-                <a:tc>
-                  <a:txBody>
-                    <a:bodyPr/>
-                    <a:lstStyle/>
-                    <a:p>
-                      <a:pPr algn="ctr" fontAlgn="ctr"/>
-                      <a:r>
-                        <a:rPr lang="en-US" b="1" dirty="0" smtClean="0">
-                          <a:solidFill>
-                            <a:srgbClr val="0F2D69"/>
-                          </a:solidFill>
-                          <a:effectLst/>
-                          <a:latin typeface="HSE Sans" panose="02000000000000000000" pitchFamily="50" charset="0"/>
-                        </a:rPr>
-                        <a:t>f1-macro</a:t>
-                      </a:r>
-                      <a:endParaRPr lang="en-US" b="1" dirty="0">
-                        <a:solidFill>
-                          <a:srgbClr val="0F2D69"/>
-                        </a:solidFill>
-                        <a:effectLst/>
-                        <a:latin typeface="HSE Sans" panose="02000000000000000000" pitchFamily="50" charset="0"/>
-                      </a:endParaRPr>
-                    </a:p>
-                  </a:txBody>
-                  <a:tcPr anchor="ctr">
-                    <a:lnL w="12700" cap="flat" cmpd="sng" algn="ctr">
-                      <a:noFill/>
-                      <a:prstDash val="solid"/>
-                      <a:round/>
-                      <a:headEnd type="none" w="med" len="med"/>
-                      <a:tailEnd type="none" w="med" len="med"/>
-                    </a:lnL>
-                    <a:lnR w="12700" cap="flat" cmpd="sng" algn="ctr">
-                      <a:noFill/>
-                      <a:prstDash val="solid"/>
-                      <a:round/>
-                      <a:headEnd type="none" w="med" len="med"/>
-                      <a:tailEnd type="none" w="med" len="med"/>
-                    </a:lnR>
-                    <a:lnT w="12700" cap="flat" cmpd="sng" algn="ctr">
-                      <a:noFill/>
-                      <a:prstDash val="solid"/>
-                      <a:round/>
-                      <a:headEnd type="none" w="med" len="med"/>
-                      <a:tailEnd type="none" w="med" len="med"/>
-                    </a:lnT>
-                    <a:lnB w="12700" cap="flat" cmpd="sng" algn="ctr">
-                      <a:noFill/>
-                      <a:prstDash val="solid"/>
-                      <a:round/>
-                      <a:headEnd type="none" w="med" len="med"/>
-                      <a:tailEnd type="none" w="med" len="med"/>
-                    </a:lnB>
-                    <a:lnTlToBr w="12700" cmpd="sng">
-                      <a:noFill/>
-                      <a:prstDash val="solid"/>
-                    </a:lnTlToBr>
-                    <a:lnBlToTr w="12700" cmpd="sng">
-                      <a:noFill/>
-                      <a:prstDash val="solid"/>
-                    </a:lnBlToTr>
-                    <a:solidFill>
-                      <a:srgbClr val="FFF07D"/>
-                    </a:solidFill>
-                  </a:tcPr>
-                </a:tc>
-                <a:tc>
-                  <a:txBody>
-                    <a:bodyPr/>
-                    <a:lstStyle/>
-                    <a:p>
-                      <a:pPr algn="ctr" fontAlgn="ctr"/>
-                      <a:r>
-                        <a:rPr lang="en-US" b="1" dirty="0">
-                          <a:solidFill>
-                            <a:srgbClr val="0F2D69"/>
-                          </a:solidFill>
-                          <a:effectLst/>
-                          <a:latin typeface="HSE Sans" panose="02000000000000000000" pitchFamily="50" charset="0"/>
-                        </a:rPr>
-                        <a:t>accuracy</a:t>
-                      </a:r>
-                    </a:p>
-                  </a:txBody>
-                  <a:tcPr anchor="ctr">
-                    <a:lnL w="12700" cap="flat" cmpd="sng" algn="ctr">
-                      <a:noFill/>
-                      <a:prstDash val="solid"/>
-                      <a:round/>
-                      <a:headEnd type="none" w="med" len="med"/>
-                      <a:tailEnd type="none" w="med" len="med"/>
-                    </a:lnL>
-                    <a:lnR w="12700" cap="flat" cmpd="sng" algn="ctr">
-                      <a:noFill/>
-                      <a:prstDash val="solid"/>
-                      <a:round/>
-                      <a:headEnd type="none" w="med" len="med"/>
-                      <a:tailEnd type="none" w="med" len="med"/>
-                    </a:lnR>
-                    <a:lnT w="12700" cap="flat" cmpd="sng" algn="ctr">
-                      <a:noFill/>
-                      <a:prstDash val="solid"/>
-                      <a:round/>
-                      <a:headEnd type="none" w="med" len="med"/>
-                      <a:tailEnd type="none" w="med" len="med"/>
-                    </a:lnT>
-                    <a:lnB w="12700" cap="flat" cmpd="sng" algn="ctr">
-                      <a:noFill/>
-                      <a:prstDash val="solid"/>
-                      <a:round/>
-                      <a:headEnd type="none" w="med" len="med"/>
-                      <a:tailEnd type="none" w="med" len="med"/>
-                    </a:lnB>
-                    <a:lnTlToBr w="12700" cmpd="sng">
-                      <a:noFill/>
-                      <a:prstDash val="solid"/>
-                    </a:lnTlToBr>
-                    <a:lnBlToTr w="12700" cmpd="sng">
-                      <a:noFill/>
-                      <a:prstDash val="solid"/>
-                    </a:lnBlToTr>
-                    <a:solidFill>
-                      <a:srgbClr val="FFF07D"/>
-                    </a:solidFill>
-                  </a:tcPr>
-                </a:tc>
-                <a:extLst>
-                  <a:ext uri="{0D108BD9-81ED-4DB2-BD59-A6C34878D82A}">
-                    <a16:rowId xmlns:a16="http://schemas.microsoft.com/office/drawing/2014/main" val="4184887189"/>
-                  </a:ext>
-                </a:extLst>
-              </a:tr>
-              <a:tr h="0">
-                <a:tc>
-                  <a:txBody>
-                    <a:bodyPr/>
-                    <a:lstStyle/>
-                    <a:p>
-                      <a:pPr algn="l" fontAlgn="ctr"/>
-                      <a:r>
-                        <a:rPr lang="en-US" b="0" dirty="0" err="1" smtClean="0">
-                          <a:solidFill>
-                            <a:srgbClr val="0F2D69"/>
-                          </a:solidFill>
-                          <a:effectLst/>
-                          <a:latin typeface="HSE Sans" panose="02000000000000000000" pitchFamily="50" charset="0"/>
-                        </a:rPr>
-                        <a:t>GaussianNB</a:t>
-                      </a:r>
-                      <a:endParaRPr lang="en-US" b="0" dirty="0">
-                        <a:solidFill>
-                          <a:srgbClr val="0F2D69"/>
-                        </a:solidFill>
-                        <a:effectLst/>
-                        <a:latin typeface="HSE Sans" panose="02000000000000000000" pitchFamily="50" charset="0"/>
-                      </a:endParaRPr>
-                    </a:p>
-                  </a:txBody>
-                  <a:tcPr anchor="ctr">
-                    <a:lnL w="12700" cap="flat" cmpd="sng" algn="ctr">
-                      <a:noFill/>
-                      <a:prstDash val="solid"/>
-                      <a:round/>
-                      <a:headEnd type="none" w="med" len="med"/>
-                      <a:tailEnd type="none" w="med" len="med"/>
-                    </a:lnL>
-                    <a:lnR w="12700" cap="flat" cmpd="sng" algn="ctr">
-                      <a:noFill/>
-                      <a:prstDash val="solid"/>
-                      <a:round/>
-                      <a:headEnd type="none" w="med" len="med"/>
-                      <a:tailEnd type="none" w="med" len="med"/>
-                    </a:lnR>
-                    <a:lnT w="12700" cap="flat" cmpd="sng" algn="ctr">
-                      <a:noFill/>
-                      <a:prstDash val="solid"/>
-                      <a:round/>
-                      <a:headEnd type="none" w="med" len="med"/>
-                      <a:tailEnd type="none" w="med" len="med"/>
-                    </a:lnT>
-                    <a:lnB w="12700" cap="flat" cmpd="sng" algn="ctr">
-                      <a:noFill/>
-                      <a:prstDash val="solid"/>
-                      <a:round/>
-                      <a:headEnd type="none" w="med" len="med"/>
-                      <a:tailEnd type="none" w="med" len="med"/>
-                    </a:lnB>
-                    <a:lnTlToBr w="12700" cmpd="sng">
-                      <a:noFill/>
-                      <a:prstDash val="solid"/>
-                    </a:lnTlToBr>
-                    <a:lnBlToTr w="12700" cmpd="sng">
-                      <a:noFill/>
-                      <a:prstDash val="solid"/>
-                    </a:lnBlToTr>
-                  </a:tcPr>
-                </a:tc>
-                <a:tc>
-                  <a:txBody>
-                    <a:bodyPr/>
-                    <a:lstStyle/>
-                    <a:p>
-                      <a:pPr algn="ctr" fontAlgn="ctr"/>
-                      <a:r>
-                        <a:rPr lang="en-US" dirty="0" smtClean="0">
-                          <a:solidFill>
-                            <a:srgbClr val="0F2D69"/>
-                          </a:solidFill>
-                          <a:effectLst/>
-                          <a:latin typeface="HSE Sans" panose="02000000000000000000" pitchFamily="50" charset="0"/>
-                        </a:rPr>
-                        <a:t>0.8318</a:t>
-                      </a:r>
-                      <a:endParaRPr lang="en-US" dirty="0">
-                        <a:solidFill>
-                          <a:srgbClr val="0F2D69"/>
-                        </a:solidFill>
-                        <a:effectLst/>
-                        <a:latin typeface="HSE Sans" panose="02000000000000000000" pitchFamily="50" charset="0"/>
-                      </a:endParaRPr>
-                    </a:p>
-                  </a:txBody>
-                  <a:tcPr anchor="ctr">
-                    <a:lnL w="12700" cap="flat" cmpd="sng" algn="ctr">
-                      <a:noFill/>
-                      <a:prstDash val="solid"/>
-                      <a:round/>
-                      <a:headEnd type="none" w="med" len="med"/>
-                      <a:tailEnd type="none" w="med" len="med"/>
-                    </a:lnL>
-                    <a:lnR w="12700" cap="flat" cmpd="sng" algn="ctr">
-                      <a:noFill/>
-                      <a:prstDash val="solid"/>
-                      <a:round/>
-                      <a:headEnd type="none" w="med" len="med"/>
-                      <a:tailEnd type="none" w="med" len="med"/>
-                    </a:lnR>
-                    <a:lnT w="12700" cap="flat" cmpd="sng" algn="ctr">
-                      <a:noFill/>
-                      <a:prstDash val="solid"/>
-                      <a:round/>
-                      <a:headEnd type="none" w="med" len="med"/>
-                      <a:tailEnd type="none" w="med" len="med"/>
-                    </a:lnT>
-                    <a:lnB w="12700" cap="flat" cmpd="sng" algn="ctr">
-                      <a:noFill/>
-                      <a:prstDash val="solid"/>
-                      <a:round/>
-                      <a:headEnd type="none" w="med" len="med"/>
-                      <a:tailEnd type="none" w="med" len="med"/>
-                    </a:lnB>
-                    <a:lnTlToBr w="12700" cmpd="sng">
-                      <a:noFill/>
-                      <a:prstDash val="solid"/>
-                    </a:lnTlToBr>
-                    <a:lnBlToTr w="12700" cmpd="sng">
-                      <a:noFill/>
-                      <a:prstDash val="solid"/>
-                    </a:lnBlToTr>
-                  </a:tcPr>
-                </a:tc>
-                <a:tc>
-                  <a:txBody>
-                    <a:bodyPr/>
-                    <a:lstStyle/>
-                    <a:p>
-                      <a:pPr algn="ctr" fontAlgn="ctr"/>
-                      <a:r>
-                        <a:rPr lang="en-US" dirty="0" smtClean="0">
-                          <a:solidFill>
-                            <a:srgbClr val="0F2D69"/>
-                          </a:solidFill>
-                          <a:effectLst/>
-                          <a:latin typeface="HSE Sans" panose="02000000000000000000" pitchFamily="50" charset="0"/>
-                        </a:rPr>
-                        <a:t>0.7567</a:t>
-                      </a:r>
-                      <a:endParaRPr lang="en-US" dirty="0">
-                        <a:solidFill>
-                          <a:srgbClr val="0F2D69"/>
-                        </a:solidFill>
-                        <a:effectLst/>
-                        <a:latin typeface="HSE Sans" panose="02000000000000000000" pitchFamily="50" charset="0"/>
-                      </a:endParaRPr>
-                    </a:p>
-                  </a:txBody>
-                  <a:tcPr anchor="ctr">
-                    <a:lnL w="12700" cap="flat" cmpd="sng" algn="ctr">
-                      <a:noFill/>
-                      <a:prstDash val="solid"/>
-                      <a:round/>
-                      <a:headEnd type="none" w="med" len="med"/>
-                      <a:tailEnd type="none" w="med" len="med"/>
-                    </a:lnL>
-                    <a:lnR w="12700" cap="flat" cmpd="sng" algn="ctr">
-                      <a:noFill/>
-                      <a:prstDash val="solid"/>
-                      <a:round/>
-                      <a:headEnd type="none" w="med" len="med"/>
-                      <a:tailEnd type="none" w="med" len="med"/>
-                    </a:lnR>
-                    <a:lnT w="12700" cap="flat" cmpd="sng" algn="ctr">
-                      <a:noFill/>
-                      <a:prstDash val="solid"/>
-                      <a:round/>
-                      <a:headEnd type="none" w="med" len="med"/>
-                      <a:tailEnd type="none" w="med" len="med"/>
-                    </a:lnT>
-                    <a:lnB w="12700" cap="flat" cmpd="sng" algn="ctr">
-                      <a:noFill/>
-                      <a:prstDash val="solid"/>
-                      <a:round/>
-                      <a:headEnd type="none" w="med" len="med"/>
-                      <a:tailEnd type="none" w="med" len="med"/>
-                    </a:lnB>
-                    <a:lnTlToBr w="12700" cmpd="sng">
-                      <a:noFill/>
-                      <a:prstDash val="solid"/>
-                    </a:lnTlToBr>
-                    <a:lnBlToTr w="12700" cmpd="sng">
-                      <a:noFill/>
-                      <a:prstDash val="solid"/>
-                    </a:lnBlToTr>
-                  </a:tcPr>
-                </a:tc>
-                <a:extLst>
-                  <a:ext uri="{0D108BD9-81ED-4DB2-BD59-A6C34878D82A}">
-                    <a16:rowId xmlns:a16="http://schemas.microsoft.com/office/drawing/2014/main" val="3425428013"/>
-                  </a:ext>
-                </a:extLst>
-              </a:tr>
-              <a:tr h="0">
-                <a:tc>
-                  <a:txBody>
-                    <a:bodyPr/>
-                    <a:lstStyle/>
-                    <a:p>
-                      <a:pPr algn="l" fontAlgn="ctr"/>
-                      <a:r>
-                        <a:rPr lang="en-US" b="0" dirty="0" err="1" smtClean="0">
-                          <a:solidFill>
-                            <a:srgbClr val="0F2D69"/>
-                          </a:solidFill>
-                          <a:effectLst/>
-                          <a:latin typeface="HSE Sans" panose="02000000000000000000" pitchFamily="50" charset="0"/>
-                        </a:rPr>
-                        <a:t>RandomForest</a:t>
-                      </a:r>
-                      <a:endParaRPr lang="en-US" b="0" dirty="0">
-                        <a:solidFill>
-                          <a:srgbClr val="0F2D69"/>
-                        </a:solidFill>
-                        <a:effectLst/>
-                        <a:latin typeface="HSE Sans" panose="02000000000000000000" pitchFamily="50" charset="0"/>
-                      </a:endParaRPr>
-                    </a:p>
-                  </a:txBody>
-                  <a:tcPr anchor="ctr">
-                    <a:lnL w="12700" cap="flat" cmpd="sng" algn="ctr">
-                      <a:noFill/>
-                      <a:prstDash val="solid"/>
-                      <a:round/>
-                      <a:headEnd type="none" w="med" len="med"/>
-                      <a:tailEnd type="none" w="med" len="med"/>
-                    </a:lnL>
-                    <a:lnR w="12700" cap="flat" cmpd="sng" algn="ctr">
-                      <a:noFill/>
-                      <a:prstDash val="solid"/>
-                      <a:round/>
-                      <a:headEnd type="none" w="med" len="med"/>
-                      <a:tailEnd type="none" w="med" len="med"/>
-                    </a:lnR>
-                    <a:lnT w="12700" cap="flat" cmpd="sng" algn="ctr">
-                      <a:noFill/>
-                      <a:prstDash val="solid"/>
-                      <a:round/>
-                      <a:headEnd type="none" w="med" len="med"/>
-                      <a:tailEnd type="none" w="med" len="med"/>
-                    </a:lnT>
-                    <a:lnB w="12700" cap="flat" cmpd="sng" algn="ctr">
-                      <a:noFill/>
-                      <a:prstDash val="solid"/>
-                      <a:round/>
-                      <a:headEnd type="none" w="med" len="med"/>
-                      <a:tailEnd type="none" w="med" len="med"/>
-                    </a:lnB>
-                    <a:lnTlToBr w="12700" cmpd="sng">
-                      <a:noFill/>
-                      <a:prstDash val="solid"/>
-                    </a:lnTlToBr>
-                    <a:lnBlToTr w="12700" cmpd="sng">
-                      <a:noFill/>
-                      <a:prstDash val="solid"/>
-                    </a:lnBlToTr>
-                    <a:solidFill>
-                      <a:srgbClr val="FFF07D"/>
-                    </a:solidFill>
-                  </a:tcPr>
-                </a:tc>
-                <a:tc>
-                  <a:txBody>
-                    <a:bodyPr/>
-                    <a:lstStyle/>
-                    <a:p>
-                      <a:pPr algn="ctr" fontAlgn="ctr"/>
-                      <a:r>
-                        <a:rPr lang="en-US" dirty="0" smtClean="0">
-                          <a:solidFill>
-                            <a:srgbClr val="0F2D69"/>
-                          </a:solidFill>
-                          <a:effectLst/>
-                          <a:latin typeface="HSE Sans" panose="02000000000000000000" pitchFamily="50" charset="0"/>
-                        </a:rPr>
-                        <a:t>0.8889</a:t>
-                      </a:r>
-                      <a:endParaRPr lang="en-US" dirty="0">
-                        <a:solidFill>
-                          <a:srgbClr val="0F2D69"/>
-                        </a:solidFill>
-                        <a:effectLst/>
-                        <a:latin typeface="HSE Sans" panose="02000000000000000000" pitchFamily="50" charset="0"/>
-                      </a:endParaRPr>
-                    </a:p>
-                  </a:txBody>
-                  <a:tcPr anchor="ctr">
-                    <a:lnL w="12700" cap="flat" cmpd="sng" algn="ctr">
-                      <a:noFill/>
-                      <a:prstDash val="solid"/>
-                      <a:round/>
-                      <a:headEnd type="none" w="med" len="med"/>
-                      <a:tailEnd type="none" w="med" len="med"/>
-                    </a:lnL>
-                    <a:lnR w="12700" cap="flat" cmpd="sng" algn="ctr">
-                      <a:noFill/>
-                      <a:prstDash val="solid"/>
-                      <a:round/>
-                      <a:headEnd type="none" w="med" len="med"/>
-                      <a:tailEnd type="none" w="med" len="med"/>
-                    </a:lnR>
-                    <a:lnT w="12700" cap="flat" cmpd="sng" algn="ctr">
-                      <a:noFill/>
-                      <a:prstDash val="solid"/>
-                      <a:round/>
-                      <a:headEnd type="none" w="med" len="med"/>
-                      <a:tailEnd type="none" w="med" len="med"/>
-                    </a:lnT>
-                    <a:lnB w="12700" cap="flat" cmpd="sng" algn="ctr">
-                      <a:noFill/>
-                      <a:prstDash val="solid"/>
-                      <a:round/>
-                      <a:headEnd type="none" w="med" len="med"/>
-                      <a:tailEnd type="none" w="med" len="med"/>
-                    </a:lnB>
-                    <a:lnTlToBr w="12700" cmpd="sng">
-                      <a:noFill/>
-                      <a:prstDash val="solid"/>
-                    </a:lnTlToBr>
-                    <a:lnBlToTr w="12700" cmpd="sng">
-                      <a:noFill/>
-                      <a:prstDash val="solid"/>
-                    </a:lnBlToTr>
-                    <a:solidFill>
-                      <a:srgbClr val="FFF07D"/>
-                    </a:solidFill>
-                  </a:tcPr>
-                </a:tc>
-                <a:tc>
-                  <a:txBody>
-                    <a:bodyPr/>
-                    <a:lstStyle/>
-                    <a:p>
-                      <a:pPr algn="ctr" fontAlgn="ctr"/>
-                      <a:r>
-                        <a:rPr lang="en-US" dirty="0" smtClean="0">
-                          <a:solidFill>
-                            <a:srgbClr val="0F2D69"/>
-                          </a:solidFill>
-                          <a:effectLst/>
-                          <a:latin typeface="HSE Sans" panose="02000000000000000000" pitchFamily="50" charset="0"/>
-                        </a:rPr>
-                        <a:t>0.8383</a:t>
-                      </a:r>
-                      <a:endParaRPr lang="en-US" dirty="0">
-                        <a:solidFill>
-                          <a:srgbClr val="0F2D69"/>
-                        </a:solidFill>
-                        <a:effectLst/>
-                        <a:latin typeface="HSE Sans" panose="02000000000000000000" pitchFamily="50" charset="0"/>
-                      </a:endParaRPr>
-                    </a:p>
-                  </a:txBody>
-                  <a:tcPr anchor="ctr">
-                    <a:lnL w="12700" cap="flat" cmpd="sng" algn="ctr">
-                      <a:noFill/>
-                      <a:prstDash val="solid"/>
-                      <a:round/>
-                      <a:headEnd type="none" w="med" len="med"/>
-                      <a:tailEnd type="none" w="med" len="med"/>
-                    </a:lnL>
-                    <a:lnR w="12700" cap="flat" cmpd="sng" algn="ctr">
-                      <a:noFill/>
-                      <a:prstDash val="solid"/>
-                      <a:round/>
-                      <a:headEnd type="none" w="med" len="med"/>
-                      <a:tailEnd type="none" w="med" len="med"/>
-                    </a:lnR>
-                    <a:lnT w="12700" cap="flat" cmpd="sng" algn="ctr">
-                      <a:noFill/>
-                      <a:prstDash val="solid"/>
-                      <a:round/>
-                      <a:headEnd type="none" w="med" len="med"/>
-                      <a:tailEnd type="none" w="med" len="med"/>
-                    </a:lnT>
-                    <a:lnB w="12700" cap="flat" cmpd="sng" algn="ctr">
-                      <a:noFill/>
-                      <a:prstDash val="solid"/>
-                      <a:round/>
-                      <a:headEnd type="none" w="med" len="med"/>
-                      <a:tailEnd type="none" w="med" len="med"/>
-                    </a:lnB>
-                    <a:lnTlToBr w="12700" cmpd="sng">
-                      <a:noFill/>
-                      <a:prstDash val="solid"/>
-                    </a:lnTlToBr>
-                    <a:lnBlToTr w="12700" cmpd="sng">
-                      <a:noFill/>
-                      <a:prstDash val="solid"/>
-                    </a:lnBlToTr>
-                    <a:solidFill>
-                      <a:srgbClr val="FFF07D"/>
-                    </a:solidFill>
-                  </a:tcPr>
-                </a:tc>
-                <a:extLst>
-                  <a:ext uri="{0D108BD9-81ED-4DB2-BD59-A6C34878D82A}">
-                    <a16:rowId xmlns:a16="http://schemas.microsoft.com/office/drawing/2014/main" val="2011661416"/>
-                  </a:ext>
-                </a:extLst>
-              </a:tr>
-              <a:tr h="0">
-                <a:tc>
-                  <a:txBody>
-                    <a:bodyPr/>
-                    <a:lstStyle/>
-                    <a:p>
-                      <a:pPr algn="l" fontAlgn="ctr"/>
-                      <a:r>
-                        <a:rPr lang="en-US" b="0" dirty="0" err="1" smtClean="0">
-                          <a:solidFill>
-                            <a:srgbClr val="0F2D69"/>
-                          </a:solidFill>
-                          <a:effectLst/>
-                          <a:latin typeface="HSE Sans" panose="02000000000000000000" pitchFamily="50" charset="0"/>
-                        </a:rPr>
-                        <a:t>HistGradientBoosting</a:t>
-                      </a:r>
-                      <a:endParaRPr lang="en-US" b="0" dirty="0">
-                        <a:solidFill>
-                          <a:srgbClr val="0F2D69"/>
-                        </a:solidFill>
-                        <a:effectLst/>
-                        <a:latin typeface="HSE Sans" panose="02000000000000000000" pitchFamily="50" charset="0"/>
-                      </a:endParaRPr>
-                    </a:p>
-                  </a:txBody>
-                  <a:tcPr anchor="ctr">
-                    <a:lnL w="12700" cap="flat" cmpd="sng" algn="ctr">
-                      <a:noFill/>
-                      <a:prstDash val="solid"/>
-                      <a:round/>
-                      <a:headEnd type="none" w="med" len="med"/>
-                      <a:tailEnd type="none" w="med" len="med"/>
-                    </a:lnL>
-                    <a:lnR w="12700" cap="flat" cmpd="sng" algn="ctr">
-                      <a:noFill/>
-                      <a:prstDash val="solid"/>
-                      <a:round/>
-                      <a:headEnd type="none" w="med" len="med"/>
-                      <a:tailEnd type="none" w="med" len="med"/>
-                    </a:lnR>
-                    <a:lnT w="12700" cap="flat" cmpd="sng" algn="ctr">
-                      <a:noFill/>
-                      <a:prstDash val="solid"/>
-                      <a:round/>
-                      <a:headEnd type="none" w="med" len="med"/>
-                      <a:tailEnd type="none" w="med" len="med"/>
-                    </a:lnT>
-                    <a:lnB w="12700" cap="flat" cmpd="sng" algn="ctr">
-                      <a:noFill/>
-                      <a:prstDash val="solid"/>
-                      <a:round/>
-                      <a:headEnd type="none" w="med" len="med"/>
-                      <a:tailEnd type="none" w="med" len="med"/>
-                    </a:lnB>
-                    <a:lnTlToBr w="12700" cmpd="sng">
-                      <a:noFill/>
-                      <a:prstDash val="solid"/>
-                    </a:lnTlToBr>
-                    <a:lnBlToTr w="12700" cmpd="sng">
-                      <a:noFill/>
-                      <a:prstDash val="solid"/>
-                    </a:lnBlToTr>
-                  </a:tcPr>
-                </a:tc>
-                <a:tc>
-                  <a:txBody>
-                    <a:bodyPr/>
-                    <a:lstStyle/>
-                    <a:p>
-                      <a:pPr algn="ctr" fontAlgn="ctr"/>
-                      <a:r>
-                        <a:rPr lang="en-US" dirty="0" smtClean="0">
-                          <a:solidFill>
-                            <a:srgbClr val="0F2D69"/>
-                          </a:solidFill>
-                          <a:effectLst/>
-                          <a:latin typeface="HSE Sans" panose="02000000000000000000" pitchFamily="50" charset="0"/>
-                        </a:rPr>
-                        <a:t>0.8791</a:t>
-                      </a:r>
-                      <a:endParaRPr lang="en-US" dirty="0">
-                        <a:solidFill>
-                          <a:srgbClr val="0F2D69"/>
-                        </a:solidFill>
-                        <a:effectLst/>
-                        <a:latin typeface="HSE Sans" panose="02000000000000000000" pitchFamily="50" charset="0"/>
-                      </a:endParaRPr>
-                    </a:p>
-                  </a:txBody>
-                  <a:tcPr anchor="ctr">
-                    <a:lnL w="12700" cap="flat" cmpd="sng" algn="ctr">
-                      <a:noFill/>
-                      <a:prstDash val="solid"/>
-                      <a:round/>
-                      <a:headEnd type="none" w="med" len="med"/>
-                      <a:tailEnd type="none" w="med" len="med"/>
-                    </a:lnL>
-                    <a:lnR w="12700" cap="flat" cmpd="sng" algn="ctr">
-                      <a:noFill/>
-                      <a:prstDash val="solid"/>
-                      <a:round/>
-                      <a:headEnd type="none" w="med" len="med"/>
-                      <a:tailEnd type="none" w="med" len="med"/>
-                    </a:lnR>
-                    <a:lnT w="12700" cap="flat" cmpd="sng" algn="ctr">
-                      <a:noFill/>
-                      <a:prstDash val="solid"/>
-                      <a:round/>
-                      <a:headEnd type="none" w="med" len="med"/>
-                      <a:tailEnd type="none" w="med" len="med"/>
-                    </a:lnT>
-                    <a:lnB w="12700" cap="flat" cmpd="sng" algn="ctr">
-                      <a:noFill/>
-                      <a:prstDash val="solid"/>
-                      <a:round/>
-                      <a:headEnd type="none" w="med" len="med"/>
-                      <a:tailEnd type="none" w="med" len="med"/>
-                    </a:lnB>
-                    <a:lnTlToBr w="12700" cmpd="sng">
-                      <a:noFill/>
-                      <a:prstDash val="solid"/>
-                    </a:lnTlToBr>
-                    <a:lnBlToTr w="12700" cmpd="sng">
-                      <a:noFill/>
-                      <a:prstDash val="solid"/>
-                    </a:lnBlToTr>
-                  </a:tcPr>
-                </a:tc>
-                <a:tc>
-                  <a:txBody>
-                    <a:bodyPr/>
-                    <a:lstStyle/>
-                    <a:p>
-                      <a:pPr algn="ctr" fontAlgn="ctr"/>
-                      <a:r>
-                        <a:rPr lang="en-US" smtClean="0">
-                          <a:solidFill>
-                            <a:srgbClr val="0F2D69"/>
-                          </a:solidFill>
-                          <a:effectLst/>
-                          <a:latin typeface="HSE Sans" panose="02000000000000000000" pitchFamily="50" charset="0"/>
-                        </a:rPr>
-                        <a:t> 0.8300</a:t>
-                      </a:r>
-                      <a:endParaRPr lang="en-US">
-                        <a:solidFill>
-                          <a:srgbClr val="0F2D69"/>
-                        </a:solidFill>
-                        <a:effectLst/>
-                        <a:latin typeface="HSE Sans" panose="02000000000000000000" pitchFamily="50" charset="0"/>
-                      </a:endParaRPr>
-                    </a:p>
-                  </a:txBody>
-                  <a:tcPr anchor="ctr">
-                    <a:lnL w="12700" cap="flat" cmpd="sng" algn="ctr">
-                      <a:noFill/>
-                      <a:prstDash val="solid"/>
-                      <a:round/>
-                      <a:headEnd type="none" w="med" len="med"/>
-                      <a:tailEnd type="none" w="med" len="med"/>
-                    </a:lnL>
-                    <a:lnR w="12700" cap="flat" cmpd="sng" algn="ctr">
-                      <a:noFill/>
-                      <a:prstDash val="solid"/>
-                      <a:round/>
-                      <a:headEnd type="none" w="med" len="med"/>
-                      <a:tailEnd type="none" w="med" len="med"/>
-                    </a:lnR>
-                    <a:lnT w="12700" cap="flat" cmpd="sng" algn="ctr">
-                      <a:noFill/>
-                      <a:prstDash val="solid"/>
-                      <a:round/>
-                      <a:headEnd type="none" w="med" len="med"/>
-                      <a:tailEnd type="none" w="med" len="med"/>
-                    </a:lnT>
-                    <a:lnB w="12700" cap="flat" cmpd="sng" algn="ctr">
-                      <a:noFill/>
-                      <a:prstDash val="solid"/>
-                      <a:round/>
-                      <a:headEnd type="none" w="med" len="med"/>
-                      <a:tailEnd type="none" w="med" len="med"/>
-                    </a:lnB>
-                    <a:lnTlToBr w="12700" cmpd="sng">
-                      <a:noFill/>
-                      <a:prstDash val="solid"/>
-                    </a:lnTlToBr>
-                    <a:lnBlToTr w="12700" cmpd="sng">
-                      <a:noFill/>
-                      <a:prstDash val="solid"/>
-                    </a:lnBlToTr>
-                  </a:tcPr>
-                </a:tc>
-                <a:extLst>
-                  <a:ext uri="{0D108BD9-81ED-4DB2-BD59-A6C34878D82A}">
-                    <a16:rowId xmlns:a16="http://schemas.microsoft.com/office/drawing/2014/main" val="909643184"/>
-                  </a:ext>
-                </a:extLst>
-              </a:tr>
-              <a:tr h="0">
-                <a:tc>
-                  <a:txBody>
-                    <a:bodyPr/>
-                    <a:lstStyle/>
-                    <a:p>
-                      <a:pPr algn="l" fontAlgn="ctr"/>
-                      <a:r>
-                        <a:rPr lang="en-US" b="0" dirty="0" err="1" smtClean="0">
-                          <a:solidFill>
-                            <a:srgbClr val="0F2D69"/>
-                          </a:solidFill>
-                          <a:effectLst/>
-                          <a:latin typeface="HSE Sans" panose="02000000000000000000" pitchFamily="50" charset="0"/>
-                        </a:rPr>
-                        <a:t>NeuralFCA</a:t>
-                      </a:r>
-                      <a:r>
-                        <a:rPr lang="en-US" b="0" dirty="0" smtClean="0">
-                          <a:solidFill>
-                            <a:srgbClr val="0F2D69"/>
-                          </a:solidFill>
-                          <a:effectLst/>
-                          <a:latin typeface="HSE Sans" panose="02000000000000000000" pitchFamily="50" charset="0"/>
-                        </a:rPr>
-                        <a:t>(base)</a:t>
-                      </a:r>
-                      <a:endParaRPr lang="en-US" b="0" dirty="0">
-                        <a:solidFill>
-                          <a:srgbClr val="0F2D69"/>
-                        </a:solidFill>
-                        <a:effectLst/>
-                        <a:latin typeface="HSE Sans" panose="02000000000000000000" pitchFamily="50" charset="0"/>
-                      </a:endParaRPr>
-                    </a:p>
-                  </a:txBody>
-                  <a:tcPr anchor="ctr">
-                    <a:lnL w="12700" cap="flat" cmpd="sng" algn="ctr">
-                      <a:noFill/>
-                      <a:prstDash val="solid"/>
-                      <a:round/>
-                      <a:headEnd type="none" w="med" len="med"/>
-                      <a:tailEnd type="none" w="med" len="med"/>
-                    </a:lnL>
-                    <a:lnR w="12700" cap="flat" cmpd="sng" algn="ctr">
-                      <a:noFill/>
-                      <a:prstDash val="solid"/>
-                      <a:round/>
-                      <a:headEnd type="none" w="med" len="med"/>
-                      <a:tailEnd type="none" w="med" len="med"/>
-                    </a:lnR>
-                    <a:lnT w="12700" cap="flat" cmpd="sng" algn="ctr">
-                      <a:noFill/>
-                      <a:prstDash val="solid"/>
-                      <a:round/>
-                      <a:headEnd type="none" w="med" len="med"/>
-                      <a:tailEnd type="none" w="med" len="med"/>
-                    </a:lnT>
-                    <a:lnB w="12700" cap="flat" cmpd="sng" algn="ctr">
-                      <a:noFill/>
-                      <a:prstDash val="solid"/>
-                      <a:round/>
-                      <a:headEnd type="none" w="med" len="med"/>
-                      <a:tailEnd type="none" w="med" len="med"/>
-                    </a:lnB>
-                    <a:lnTlToBr w="12700" cmpd="sng">
-                      <a:noFill/>
-                      <a:prstDash val="solid"/>
-                    </a:lnTlToBr>
-                    <a:lnBlToTr w="12700" cmpd="sng">
-                      <a:noFill/>
-                      <a:prstDash val="solid"/>
-                    </a:lnBlToTr>
-                    <a:solidFill>
-                      <a:srgbClr val="FFF07D"/>
-                    </a:solidFill>
-                  </a:tcPr>
-                </a:tc>
-                <a:tc>
-                  <a:txBody>
-                    <a:bodyPr/>
-                    <a:lstStyle/>
-                    <a:p>
-                      <a:pPr algn="ctr" fontAlgn="ctr"/>
-                      <a:r>
-                        <a:rPr lang="en-US" dirty="0" smtClean="0">
-                          <a:solidFill>
-                            <a:srgbClr val="0F2D69"/>
-                          </a:solidFill>
-                          <a:effectLst/>
-                          <a:latin typeface="HSE Sans" panose="02000000000000000000" pitchFamily="50" charset="0"/>
-                        </a:rPr>
-                        <a:t>0.8643</a:t>
-                      </a:r>
-                      <a:endParaRPr lang="en-US" dirty="0">
-                        <a:solidFill>
-                          <a:srgbClr val="0F2D69"/>
-                        </a:solidFill>
-                        <a:effectLst/>
-                        <a:latin typeface="HSE Sans" panose="02000000000000000000" pitchFamily="50" charset="0"/>
-                      </a:endParaRPr>
-                    </a:p>
-                  </a:txBody>
-                  <a:tcPr anchor="ctr">
-                    <a:lnL w="12700" cap="flat" cmpd="sng" algn="ctr">
-                      <a:noFill/>
-                      <a:prstDash val="solid"/>
-                      <a:round/>
-                      <a:headEnd type="none" w="med" len="med"/>
-                      <a:tailEnd type="none" w="med" len="med"/>
-                    </a:lnL>
-                    <a:lnR w="12700" cap="flat" cmpd="sng" algn="ctr">
-                      <a:noFill/>
-                      <a:prstDash val="solid"/>
-                      <a:round/>
-                      <a:headEnd type="none" w="med" len="med"/>
-                      <a:tailEnd type="none" w="med" len="med"/>
-                    </a:lnR>
-                    <a:lnT w="12700" cap="flat" cmpd="sng" algn="ctr">
-                      <a:noFill/>
-                      <a:prstDash val="solid"/>
-                      <a:round/>
-                      <a:headEnd type="none" w="med" len="med"/>
-                      <a:tailEnd type="none" w="med" len="med"/>
-                    </a:lnT>
-                    <a:lnB w="12700" cap="flat" cmpd="sng" algn="ctr">
-                      <a:noFill/>
-                      <a:prstDash val="solid"/>
-                      <a:round/>
-                      <a:headEnd type="none" w="med" len="med"/>
-                      <a:tailEnd type="none" w="med" len="med"/>
-                    </a:lnB>
-                    <a:lnTlToBr w="12700" cmpd="sng">
-                      <a:noFill/>
-                      <a:prstDash val="solid"/>
-                    </a:lnTlToBr>
-                    <a:lnBlToTr w="12700" cmpd="sng">
-                      <a:noFill/>
-                      <a:prstDash val="solid"/>
-                    </a:lnBlToTr>
-                    <a:solidFill>
-                      <a:srgbClr val="FFF07D"/>
-                    </a:solidFill>
-                  </a:tcPr>
-                </a:tc>
-                <a:tc>
-                  <a:txBody>
-                    <a:bodyPr/>
-                    <a:lstStyle/>
-                    <a:p>
-                      <a:pPr algn="ctr" fontAlgn="ctr"/>
-                      <a:r>
-                        <a:rPr lang="en-US" dirty="0" smtClean="0">
-                          <a:solidFill>
-                            <a:srgbClr val="0F2D69"/>
-                          </a:solidFill>
-                          <a:effectLst/>
-                          <a:latin typeface="HSE Sans" panose="02000000000000000000" pitchFamily="50" charset="0"/>
-                        </a:rPr>
-                        <a:t>0.8017</a:t>
-                      </a:r>
-                      <a:endParaRPr lang="en-US" dirty="0">
-                        <a:solidFill>
-                          <a:srgbClr val="0F2D69"/>
-                        </a:solidFill>
-                        <a:effectLst/>
-                        <a:latin typeface="HSE Sans" panose="02000000000000000000" pitchFamily="50" charset="0"/>
-                      </a:endParaRPr>
-                    </a:p>
-                  </a:txBody>
-                  <a:tcPr anchor="ctr">
-                    <a:lnL w="12700" cap="flat" cmpd="sng" algn="ctr">
-                      <a:noFill/>
-                      <a:prstDash val="solid"/>
-                      <a:round/>
-                      <a:headEnd type="none" w="med" len="med"/>
-                      <a:tailEnd type="none" w="med" len="med"/>
-                    </a:lnL>
-                    <a:lnR w="12700" cap="flat" cmpd="sng" algn="ctr">
-                      <a:noFill/>
-                      <a:prstDash val="solid"/>
-                      <a:round/>
-                      <a:headEnd type="none" w="med" len="med"/>
-                      <a:tailEnd type="none" w="med" len="med"/>
-                    </a:lnR>
-                    <a:lnT w="12700" cap="flat" cmpd="sng" algn="ctr">
-                      <a:noFill/>
-                      <a:prstDash val="solid"/>
-                      <a:round/>
-                      <a:headEnd type="none" w="med" len="med"/>
-                      <a:tailEnd type="none" w="med" len="med"/>
-                    </a:lnT>
-                    <a:lnB w="12700" cap="flat" cmpd="sng" algn="ctr">
-                      <a:noFill/>
-                      <a:prstDash val="solid"/>
-                      <a:round/>
-                      <a:headEnd type="none" w="med" len="med"/>
-                      <a:tailEnd type="none" w="med" len="med"/>
-                    </a:lnB>
-                    <a:lnTlToBr w="12700" cmpd="sng">
-                      <a:noFill/>
-                      <a:prstDash val="solid"/>
-                    </a:lnTlToBr>
-                    <a:lnBlToTr w="12700" cmpd="sng">
-                      <a:noFill/>
-                      <a:prstDash val="solid"/>
-                    </a:lnBlToTr>
-                    <a:solidFill>
-                      <a:srgbClr val="FFF07D"/>
-                    </a:solidFill>
-                  </a:tcPr>
-                </a:tc>
-                <a:extLst>
-                  <a:ext uri="{0D108BD9-81ED-4DB2-BD59-A6C34878D82A}">
-                    <a16:rowId xmlns:a16="http://schemas.microsoft.com/office/drawing/2014/main" val="1200820259"/>
-                  </a:ext>
-                </a:extLst>
-              </a:tr>
-              <a:tr h="0">
-                <a:tc>
-                  <a:txBody>
-                    <a:bodyPr/>
-                    <a:lstStyle/>
-                    <a:p>
-                      <a:pPr algn="l" fontAlgn="ctr"/>
-                      <a:r>
-                        <a:rPr lang="en-GB" b="0" dirty="0" err="1" smtClean="0">
-                          <a:solidFill>
-                            <a:srgbClr val="0F2D69"/>
-                          </a:solidFill>
-                          <a:effectLst/>
-                          <a:latin typeface="HSE Sans" panose="02000000000000000000" pitchFamily="50" charset="0"/>
-                        </a:rPr>
-                        <a:t>NeuralFCA</a:t>
-                      </a:r>
-                      <a:r>
-                        <a:rPr lang="en-GB" b="0" dirty="0" smtClean="0">
-                          <a:solidFill>
-                            <a:srgbClr val="0F2D69"/>
-                          </a:solidFill>
-                          <a:effectLst/>
-                          <a:latin typeface="HSE Sans" panose="02000000000000000000" pitchFamily="50" charset="0"/>
-                        </a:rPr>
-                        <a:t>(</a:t>
-                      </a:r>
-                      <a:r>
-                        <a:rPr lang="en-GB" b="0" dirty="0" err="1" smtClean="0">
-                          <a:solidFill>
-                            <a:srgbClr val="0F2D69"/>
-                          </a:solidFill>
-                          <a:effectLst/>
-                          <a:latin typeface="HSE Sans" panose="02000000000000000000" pitchFamily="50" charset="0"/>
-                        </a:rPr>
-                        <a:t>interordinal</a:t>
-                      </a:r>
-                      <a:r>
-                        <a:rPr lang="en-GB" b="0" dirty="0" smtClean="0">
-                          <a:solidFill>
-                            <a:srgbClr val="0F2D69"/>
-                          </a:solidFill>
-                          <a:effectLst/>
-                          <a:latin typeface="HSE Sans" panose="02000000000000000000" pitchFamily="50" charset="0"/>
-                        </a:rPr>
-                        <a:t>)</a:t>
-                      </a:r>
-                      <a:endParaRPr lang="en-US" b="0" dirty="0">
-                        <a:solidFill>
-                          <a:srgbClr val="0F2D69"/>
-                        </a:solidFill>
-                        <a:effectLst/>
-                        <a:latin typeface="HSE Sans" panose="02000000000000000000" pitchFamily="50" charset="0"/>
-                      </a:endParaRPr>
-                    </a:p>
-                  </a:txBody>
-                  <a:tcPr anchor="ctr">
-                    <a:lnL w="12700" cap="flat" cmpd="sng" algn="ctr">
-                      <a:noFill/>
-                      <a:prstDash val="solid"/>
-                      <a:round/>
-                      <a:headEnd type="none" w="med" len="med"/>
-                      <a:tailEnd type="none" w="med" len="med"/>
-                    </a:lnL>
-                    <a:lnR w="12700" cap="flat" cmpd="sng" algn="ctr">
-                      <a:noFill/>
-                      <a:prstDash val="solid"/>
-                      <a:round/>
-                      <a:headEnd type="none" w="med" len="med"/>
-                      <a:tailEnd type="none" w="med" len="med"/>
-                    </a:lnR>
-                    <a:lnT w="12700" cap="flat" cmpd="sng" algn="ctr">
-                      <a:noFill/>
-                      <a:prstDash val="solid"/>
-                      <a:round/>
-                      <a:headEnd type="none" w="med" len="med"/>
-                      <a:tailEnd type="none" w="med" len="med"/>
-                    </a:lnT>
-                    <a:lnB w="12700" cap="flat" cmpd="sng" algn="ctr">
-                      <a:noFill/>
-                      <a:prstDash val="solid"/>
-                      <a:round/>
-                      <a:headEnd type="none" w="med" len="med"/>
-                      <a:tailEnd type="none" w="med" len="med"/>
-                    </a:lnB>
-                    <a:lnTlToBr w="12700" cmpd="sng">
-                      <a:noFill/>
-                      <a:prstDash val="solid"/>
-                    </a:lnTlToBr>
-                    <a:lnBlToTr w="12700" cmpd="sng">
-                      <a:noFill/>
-                      <a:prstDash val="solid"/>
-                    </a:lnBlToTr>
-                  </a:tcPr>
-                </a:tc>
-                <a:tc>
-                  <a:txBody>
-                    <a:bodyPr/>
-                    <a:lstStyle/>
-                    <a:p>
-                      <a:pPr algn="ctr" fontAlgn="ctr"/>
-                      <a:r>
-                        <a:rPr lang="en-US" dirty="0" smtClean="0">
-                          <a:solidFill>
-                            <a:srgbClr val="0F2D69"/>
-                          </a:solidFill>
-                          <a:effectLst/>
-                          <a:latin typeface="HSE Sans" panose="02000000000000000000" pitchFamily="50" charset="0"/>
-                        </a:rPr>
-                        <a:t>0.8707</a:t>
-                      </a:r>
-                      <a:endParaRPr lang="en-US" dirty="0">
-                        <a:solidFill>
-                          <a:srgbClr val="0F2D69"/>
-                        </a:solidFill>
-                        <a:effectLst/>
-                        <a:latin typeface="HSE Sans" panose="02000000000000000000" pitchFamily="50" charset="0"/>
-                      </a:endParaRPr>
-                    </a:p>
-                  </a:txBody>
-                  <a:tcPr anchor="ctr">
-                    <a:lnL w="12700" cap="flat" cmpd="sng" algn="ctr">
-                      <a:noFill/>
-                      <a:prstDash val="solid"/>
-                      <a:round/>
-                      <a:headEnd type="none" w="med" len="med"/>
-                      <a:tailEnd type="none" w="med" len="med"/>
-                    </a:lnL>
-                    <a:lnR w="12700" cap="flat" cmpd="sng" algn="ctr">
-                      <a:noFill/>
-                      <a:prstDash val="solid"/>
-                      <a:round/>
-                      <a:headEnd type="none" w="med" len="med"/>
-                      <a:tailEnd type="none" w="med" len="med"/>
-                    </a:lnR>
-                    <a:lnT w="12700" cap="flat" cmpd="sng" algn="ctr">
-                      <a:noFill/>
-                      <a:prstDash val="solid"/>
-                      <a:round/>
-                      <a:headEnd type="none" w="med" len="med"/>
-                      <a:tailEnd type="none" w="med" len="med"/>
-                    </a:lnT>
-                    <a:lnB w="12700" cap="flat" cmpd="sng" algn="ctr">
-                      <a:noFill/>
-                      <a:prstDash val="solid"/>
-                      <a:round/>
-                      <a:headEnd type="none" w="med" len="med"/>
-                      <a:tailEnd type="none" w="med" len="med"/>
-                    </a:lnB>
-                    <a:lnTlToBr w="12700" cmpd="sng">
-                      <a:noFill/>
-                      <a:prstDash val="solid"/>
-                    </a:lnTlToBr>
-                    <a:lnBlToTr w="12700" cmpd="sng">
-                      <a:noFill/>
-                      <a:prstDash val="solid"/>
-                    </a:lnBlToTr>
-                  </a:tcPr>
-                </a:tc>
-                <a:tc>
-                  <a:txBody>
-                    <a:bodyPr/>
-                    <a:lstStyle/>
-                    <a:p>
-                      <a:pPr algn="ctr" fontAlgn="ctr"/>
-                      <a:r>
-                        <a:rPr lang="en-US" dirty="0" smtClean="0">
-                          <a:solidFill>
-                            <a:srgbClr val="0F2D69"/>
-                          </a:solidFill>
-                          <a:effectLst/>
-                          <a:latin typeface="HSE Sans" panose="02000000000000000000" pitchFamily="50" charset="0"/>
-                        </a:rPr>
-                        <a:t>0.8100</a:t>
-                      </a:r>
-                      <a:endParaRPr lang="en-US" dirty="0">
-                        <a:solidFill>
-                          <a:srgbClr val="0F2D69"/>
-                        </a:solidFill>
-                        <a:effectLst/>
-                        <a:latin typeface="HSE Sans" panose="02000000000000000000" pitchFamily="50" charset="0"/>
-                      </a:endParaRPr>
-                    </a:p>
-                  </a:txBody>
-                  <a:tcPr anchor="ctr">
-                    <a:lnL w="12700" cap="flat" cmpd="sng" algn="ctr">
-                      <a:noFill/>
-                      <a:prstDash val="solid"/>
-                      <a:round/>
-                      <a:headEnd type="none" w="med" len="med"/>
-                      <a:tailEnd type="none" w="med" len="med"/>
-                    </a:lnL>
-                    <a:lnR w="12700" cap="flat" cmpd="sng" algn="ctr">
-                      <a:noFill/>
-                      <a:prstDash val="solid"/>
-                      <a:round/>
-                      <a:headEnd type="none" w="med" len="med"/>
-                      <a:tailEnd type="none" w="med" len="med"/>
-                    </a:lnR>
-                    <a:lnT w="12700" cap="flat" cmpd="sng" algn="ctr">
-                      <a:noFill/>
-                      <a:prstDash val="solid"/>
-                      <a:round/>
-                      <a:headEnd type="none" w="med" len="med"/>
-                      <a:tailEnd type="none" w="med" len="med"/>
-                    </a:lnT>
-                    <a:lnB w="12700" cap="flat" cmpd="sng" algn="ctr">
-                      <a:noFill/>
-                      <a:prstDash val="solid"/>
-                      <a:round/>
-                      <a:headEnd type="none" w="med" len="med"/>
-                      <a:tailEnd type="none" w="med" len="med"/>
-                    </a:lnB>
-                    <a:lnTlToBr w="12700" cmpd="sng">
-                      <a:noFill/>
-                      <a:prstDash val="solid"/>
-                    </a:lnTlToBr>
-                    <a:lnBlToTr w="12700" cmpd="sng">
-                      <a:noFill/>
-                      <a:prstDash val="solid"/>
-                    </a:lnBlToTr>
-                  </a:tcPr>
-                </a:tc>
-                <a:extLst>
-                  <a:ext uri="{0D108BD9-81ED-4DB2-BD59-A6C34878D82A}">
-                    <a16:rowId xmlns:a16="http://schemas.microsoft.com/office/drawing/2014/main" val="1242152232"/>
-                  </a:ext>
-                </a:extLst>
-              </a:tr>
-              <a:tr h="0">
-                <a:tc>
-                  <a:txBody>
-                    <a:bodyPr/>
-                    <a:lstStyle/>
-                    <a:p>
-                      <a:pPr marL="0" marR="0" lvl="0" indent="0" algn="l" defTabSz="914400" rtl="0" eaLnBrk="1" fontAlgn="ctr" latinLnBrk="0" hangingPunct="1">
-                        <a:lnSpc>
-                          <a:spcPct val="100000"/>
-                        </a:lnSpc>
-                        <a:spcBef>
-                          <a:spcPts val="0"/>
-                        </a:spcBef>
-                        <a:spcAft>
-                          <a:spcPts val="0"/>
-                        </a:spcAft>
-                        <a:buClr>
-                          <a:srgbClr val="000000"/>
-                        </a:buClr>
-                        <a:buSzTx/>
-                        <a:buFont typeface="Arial"/>
-                        <a:buNone/>
-                        <a:tabLst/>
-                        <a:defRPr/>
-                      </a:pPr>
-                      <a:r>
-                        <a:rPr lang="en-GB" b="0" dirty="0" err="1" smtClean="0">
-                          <a:solidFill>
-                            <a:srgbClr val="0F2D69"/>
-                          </a:solidFill>
-                          <a:effectLst/>
-                          <a:latin typeface="HSE Sans" panose="02000000000000000000" pitchFamily="50" charset="0"/>
-                        </a:rPr>
-                        <a:t>NeuralFCA</a:t>
-                      </a:r>
-                      <a:r>
-                        <a:rPr lang="en-GB" b="0" dirty="0" smtClean="0">
-                          <a:solidFill>
-                            <a:srgbClr val="0F2D69"/>
-                          </a:solidFill>
-                          <a:effectLst/>
-                          <a:latin typeface="HSE Sans" panose="02000000000000000000" pitchFamily="50" charset="0"/>
-                        </a:rPr>
-                        <a:t>(coarse)</a:t>
-                      </a:r>
-                      <a:endParaRPr lang="en-US" b="0" dirty="0" smtClean="0">
-                        <a:solidFill>
-                          <a:srgbClr val="0F2D69"/>
-                        </a:solidFill>
-                        <a:effectLst/>
-                        <a:latin typeface="HSE Sans" panose="02000000000000000000" pitchFamily="50" charset="0"/>
-                      </a:endParaRPr>
-                    </a:p>
-                  </a:txBody>
-                  <a:tcPr anchor="ctr">
-                    <a:lnL w="12700" cap="flat" cmpd="sng" algn="ctr">
-                      <a:noFill/>
-                      <a:prstDash val="solid"/>
-                      <a:round/>
-                      <a:headEnd type="none" w="med" len="med"/>
-                      <a:tailEnd type="none" w="med" len="med"/>
-                    </a:lnL>
-                    <a:lnR w="12700" cap="flat" cmpd="sng" algn="ctr">
-                      <a:noFill/>
-                      <a:prstDash val="solid"/>
-                      <a:round/>
-                      <a:headEnd type="none" w="med" len="med"/>
-                      <a:tailEnd type="none" w="med" len="med"/>
-                    </a:lnR>
-                    <a:lnT w="12700" cap="flat" cmpd="sng" algn="ctr">
-                      <a:noFill/>
-                      <a:prstDash val="solid"/>
-                      <a:round/>
-                      <a:headEnd type="none" w="med" len="med"/>
-                      <a:tailEnd type="none" w="med" len="med"/>
-                    </a:lnT>
-                    <a:lnB w="12700" cap="flat" cmpd="sng" algn="ctr">
-                      <a:noFill/>
-                      <a:prstDash val="solid"/>
-                      <a:round/>
-                      <a:headEnd type="none" w="med" len="med"/>
-                      <a:tailEnd type="none" w="med" len="med"/>
-                    </a:lnB>
-                    <a:lnTlToBr w="12700" cmpd="sng">
-                      <a:noFill/>
-                      <a:prstDash val="solid"/>
-                    </a:lnTlToBr>
-                    <a:lnBlToTr w="12700" cmpd="sng">
-                      <a:noFill/>
-                      <a:prstDash val="solid"/>
-                    </a:lnBlToTr>
-                    <a:solidFill>
-                      <a:srgbClr val="FFF07D"/>
-                    </a:solidFill>
-                  </a:tcPr>
-                </a:tc>
-                <a:tc>
-                  <a:txBody>
-                    <a:bodyPr/>
-                    <a:lstStyle/>
-                    <a:p>
-                      <a:pPr algn="ctr" fontAlgn="ctr"/>
-                      <a:r>
-                        <a:rPr lang="en-US" dirty="0" smtClean="0">
-                          <a:solidFill>
-                            <a:srgbClr val="0F2D69"/>
-                          </a:solidFill>
-                          <a:effectLst/>
-                          <a:latin typeface="HSE Sans" panose="02000000000000000000" pitchFamily="50" charset="0"/>
-                        </a:rPr>
-                        <a:t>0.9001</a:t>
-                      </a:r>
-                      <a:endParaRPr lang="en-US" dirty="0">
-                        <a:solidFill>
-                          <a:srgbClr val="0F2D69"/>
-                        </a:solidFill>
-                        <a:effectLst/>
-                        <a:latin typeface="HSE Sans" panose="02000000000000000000" pitchFamily="50" charset="0"/>
-                      </a:endParaRPr>
-                    </a:p>
-                  </a:txBody>
-                  <a:tcPr anchor="ctr">
-                    <a:lnL w="12700" cap="flat" cmpd="sng" algn="ctr">
-                      <a:noFill/>
-                      <a:prstDash val="solid"/>
-                      <a:round/>
-                      <a:headEnd type="none" w="med" len="med"/>
-                      <a:tailEnd type="none" w="med" len="med"/>
-                    </a:lnL>
-                    <a:lnR w="12700" cap="flat" cmpd="sng" algn="ctr">
-                      <a:noFill/>
-                      <a:prstDash val="solid"/>
-                      <a:round/>
-                      <a:headEnd type="none" w="med" len="med"/>
-                      <a:tailEnd type="none" w="med" len="med"/>
-                    </a:lnR>
-                    <a:lnT w="12700" cap="flat" cmpd="sng" algn="ctr">
-                      <a:noFill/>
-                      <a:prstDash val="solid"/>
-                      <a:round/>
-                      <a:headEnd type="none" w="med" len="med"/>
-                      <a:tailEnd type="none" w="med" len="med"/>
-                    </a:lnT>
-                    <a:lnB w="12700" cap="flat" cmpd="sng" algn="ctr">
-                      <a:noFill/>
-                      <a:prstDash val="solid"/>
-                      <a:round/>
-                      <a:headEnd type="none" w="med" len="med"/>
-                      <a:tailEnd type="none" w="med" len="med"/>
-                    </a:lnB>
-                    <a:lnTlToBr w="12700" cmpd="sng">
-                      <a:noFill/>
-                      <a:prstDash val="solid"/>
-                    </a:lnTlToBr>
-                    <a:lnBlToTr w="12700" cmpd="sng">
-                      <a:noFill/>
-                      <a:prstDash val="solid"/>
-                    </a:lnBlToTr>
-                    <a:solidFill>
-                      <a:srgbClr val="FFF07D"/>
-                    </a:solidFill>
-                  </a:tcPr>
-                </a:tc>
-                <a:tc>
-                  <a:txBody>
-                    <a:bodyPr/>
-                    <a:lstStyle/>
-                    <a:p>
-                      <a:pPr algn="ctr" fontAlgn="ctr"/>
-                      <a:r>
-                        <a:rPr lang="en-US" dirty="0" smtClean="0">
-                          <a:solidFill>
-                            <a:srgbClr val="0F2D69"/>
-                          </a:solidFill>
-                          <a:effectLst/>
-                          <a:latin typeface="HSE Sans" panose="02000000000000000000" pitchFamily="50" charset="0"/>
-                        </a:rPr>
-                        <a:t>0.8550</a:t>
-                      </a:r>
-                      <a:endParaRPr lang="en-US" dirty="0">
-                        <a:solidFill>
-                          <a:srgbClr val="0F2D69"/>
-                        </a:solidFill>
-                        <a:effectLst/>
-                        <a:latin typeface="HSE Sans" panose="02000000000000000000" pitchFamily="50" charset="0"/>
-                      </a:endParaRPr>
-                    </a:p>
-                  </a:txBody>
-                  <a:tcPr anchor="ctr">
-                    <a:lnL w="12700" cap="flat" cmpd="sng" algn="ctr">
-                      <a:noFill/>
-                      <a:prstDash val="solid"/>
-                      <a:round/>
-                      <a:headEnd type="none" w="med" len="med"/>
-                      <a:tailEnd type="none" w="med" len="med"/>
-                    </a:lnL>
-                    <a:lnR w="12700" cap="flat" cmpd="sng" algn="ctr">
-                      <a:noFill/>
-                      <a:prstDash val="solid"/>
-                      <a:round/>
-                      <a:headEnd type="none" w="med" len="med"/>
-                      <a:tailEnd type="none" w="med" len="med"/>
-                    </a:lnR>
-                    <a:lnT w="12700" cap="flat" cmpd="sng" algn="ctr">
-                      <a:noFill/>
-                      <a:prstDash val="solid"/>
-                      <a:round/>
-                      <a:headEnd type="none" w="med" len="med"/>
-                      <a:tailEnd type="none" w="med" len="med"/>
-                    </a:lnT>
-                    <a:lnB w="12700" cap="flat" cmpd="sng" algn="ctr">
-                      <a:noFill/>
-                      <a:prstDash val="solid"/>
-                      <a:round/>
-                      <a:headEnd type="none" w="med" len="med"/>
-                      <a:tailEnd type="none" w="med" len="med"/>
-                    </a:lnB>
-                    <a:lnTlToBr w="12700" cmpd="sng">
-                      <a:noFill/>
-                      <a:prstDash val="solid"/>
-                    </a:lnTlToBr>
-                    <a:lnBlToTr w="12700" cmpd="sng">
-                      <a:noFill/>
-                      <a:prstDash val="solid"/>
-                    </a:lnBlToTr>
-                    <a:solidFill>
-                      <a:srgbClr val="FFF07D"/>
-                    </a:solidFill>
-                  </a:tcPr>
-                </a:tc>
-                <a:extLst>
-                  <a:ext uri="{0D108BD9-81ED-4DB2-BD59-A6C34878D82A}">
-                    <a16:rowId xmlns:a16="http://schemas.microsoft.com/office/drawing/2014/main" val="2305477826"/>
-                  </a:ext>
-                </a:extLst>
-              </a:tr>
-            </a:tbl>
-          </a:graphicData>
-        </a:graphic>
-      </p:graphicFrame>
-    </p:spTree>
-    <p:extLst>
-      <p:ext uri="{BB962C8B-B14F-4D97-AF65-F5344CB8AC3E}">
-        <p14:creationId xmlns:p14="http://schemas.microsoft.com/office/powerpoint/2010/main" val="4046253658"/>
+        <p14:creationId xmlns:p14="http://schemas.microsoft.com/office/powerpoint/2010/main" val="2035722306"/>
       </p:ext>
     </p:extLst>
   </p:cSld>
@@ -8181,6 +6631,1844 @@
           <a:bodyPr/>
           <a:lstStyle/>
           <a:p>
+            <a:endParaRPr lang="en-US"/>
+          </a:p>
+        </p:txBody>
+      </p:sp>
+      <p:sp>
+        <p:nvSpPr>
+          <p:cNvPr id="4" name="Slide Number Placeholder 3"/>
+          <p:cNvSpPr>
+            <a:spLocks noGrp="1"/>
+          </p:cNvSpPr>
+          <p:nvPr>
+            <p:ph type="sldNum" idx="12"/>
+          </p:nvPr>
+        </p:nvSpPr>
+        <p:spPr/>
+        <p:txBody>
+          <a:bodyPr/>
+          <a:lstStyle/>
+          <a:p>
+            <a:pPr marL="0" lvl="0" indent="0" algn="r" rtl="0">
+              <a:spcBef>
+                <a:spcPts val="0"/>
+              </a:spcBef>
+              <a:spcAft>
+                <a:spcPts val="0"/>
+              </a:spcAft>
+              <a:buNone/>
+            </a:pPr>
+            <a:fld id="{00000000-1234-1234-1234-123412341234}" type="slidenum">
+              <a:rPr lang="en-US" smtClean="0"/>
+              <a:t>12</a:t>
+            </a:fld>
+            <a:r>
+              <a:rPr lang="en-US" dirty="0" smtClean="0"/>
+              <a:t>/18</a:t>
+            </a:r>
+            <a:endParaRPr lang="en-US" dirty="0"/>
+          </a:p>
+        </p:txBody>
+      </p:sp>
+      <p:pic>
+        <p:nvPicPr>
+          <p:cNvPr id="5" name="Picture 4"/>
+          <p:cNvPicPr>
+            <a:picLocks noChangeAspect="1"/>
+          </p:cNvPicPr>
+          <p:nvPr/>
+        </p:nvPicPr>
+        <p:blipFill>
+          <a:blip r:embed="rId2">
+            <a:extLst>
+              <a:ext uri="{28A0092B-C50C-407E-A947-70E740481C1C}">
+                <a14:useLocalDpi xmlns:a14="http://schemas.microsoft.com/office/drawing/2010/main" val="0"/>
+              </a:ext>
+            </a:extLst>
+          </a:blip>
+          <a:stretch>
+            <a:fillRect/>
+          </a:stretch>
+        </p:blipFill>
+        <p:spPr>
+          <a:xfrm>
+            <a:off x="986970" y="1702367"/>
+            <a:ext cx="10159092" cy="4351338"/>
+          </a:xfrm>
+          <a:prstGeom prst="rect">
+            <a:avLst/>
+          </a:prstGeom>
+        </p:spPr>
+      </p:pic>
+    </p:spTree>
+    <p:extLst>
+      <p:ext uri="{BB962C8B-B14F-4D97-AF65-F5344CB8AC3E}">
+        <p14:creationId xmlns:p14="http://schemas.microsoft.com/office/powerpoint/2010/main" val="1004134391"/>
+      </p:ext>
+    </p:extLst>
+  </p:cSld>
+  <p:clrMapOvr>
+    <a:masterClrMapping/>
+  </p:clrMapOvr>
+  <p:timing>
+    <p:tnLst>
+      <p:par>
+        <p:cTn id="1" dur="indefinite" restart="never" nodeType="tmRoot"/>
+      </p:par>
+    </p:tnLst>
+  </p:timing>
+</p:sld>
+</file>
+
+<file path=ppt/slides/slide13.xml><?xml version="1.0" encoding="utf-8"?>
+<p:sld xmlns:a="http://schemas.openxmlformats.org/drawingml/2006/main" xmlns:r="http://schemas.openxmlformats.org/officeDocument/2006/relationships" xmlns:p="http://schemas.openxmlformats.org/presentationml/2006/main">
+  <p:cSld>
+    <p:spTree>
+      <p:nvGrpSpPr>
+        <p:cNvPr id="1" name=""/>
+        <p:cNvGrpSpPr/>
+        <p:nvPr/>
+      </p:nvGrpSpPr>
+      <p:grpSpPr>
+        <a:xfrm>
+          <a:off x="0" y="0"/>
+          <a:ext cx="0" cy="0"/>
+          <a:chOff x="0" y="0"/>
+          <a:chExt cx="0" cy="0"/>
+        </a:xfrm>
+      </p:grpSpPr>
+      <p:sp>
+        <p:nvSpPr>
+          <p:cNvPr id="2" name="Title 1"/>
+          <p:cNvSpPr>
+            <a:spLocks noGrp="1"/>
+          </p:cNvSpPr>
+          <p:nvPr>
+            <p:ph type="title"/>
+          </p:nvPr>
+        </p:nvSpPr>
+        <p:spPr/>
+        <p:txBody>
+          <a:bodyPr/>
+          <a:lstStyle/>
+          <a:p>
+            <a:r>
+              <a:rPr lang="en-GB" dirty="0" smtClean="0"/>
+              <a:t>Model Evaluation</a:t>
+            </a:r>
+            <a:endParaRPr lang="en-US" dirty="0"/>
+          </a:p>
+        </p:txBody>
+      </p:sp>
+      <p:sp>
+        <p:nvSpPr>
+          <p:cNvPr id="3" name="Text Placeholder 2"/>
+          <p:cNvSpPr>
+            <a:spLocks noGrp="1"/>
+          </p:cNvSpPr>
+          <p:nvPr>
+            <p:ph type="body" idx="1"/>
+          </p:nvPr>
+        </p:nvSpPr>
+        <p:spPr>
+          <a:xfrm>
+            <a:off x="986970" y="1702367"/>
+            <a:ext cx="4545612" cy="4351338"/>
+          </a:xfrm>
+        </p:spPr>
+        <p:txBody>
+          <a:bodyPr>
+            <a:normAutofit/>
+          </a:bodyPr>
+          <a:lstStyle/>
+          <a:p>
+            <a:pPr marL="114300" indent="0">
+              <a:buNone/>
+            </a:pPr>
+            <a:endParaRPr lang="en-GB" sz="2400" dirty="0" smtClean="0"/>
+          </a:p>
+          <a:p>
+            <a:pPr marL="114300" indent="0">
+              <a:lnSpc>
+                <a:spcPct val="114000"/>
+              </a:lnSpc>
+              <a:buNone/>
+            </a:pPr>
+            <a:r>
+              <a:rPr lang="en-GB" sz="2400" dirty="0"/>
+              <a:t>Let’s look at the performance metrics of the neural network and several </a:t>
+            </a:r>
+            <a:r>
+              <a:rPr lang="en-GB" sz="2400" b="1" dirty="0"/>
+              <a:t>other classifiers </a:t>
+            </a:r>
+            <a:r>
+              <a:rPr lang="en-GB" sz="2400" dirty="0"/>
+              <a:t>on the Employee Attrition dataset.</a:t>
+            </a:r>
+            <a:endParaRPr lang="en-US" sz="2400" dirty="0"/>
+          </a:p>
+        </p:txBody>
+      </p:sp>
+      <p:sp>
+        <p:nvSpPr>
+          <p:cNvPr id="4" name="Slide Number Placeholder 3"/>
+          <p:cNvSpPr>
+            <a:spLocks noGrp="1"/>
+          </p:cNvSpPr>
+          <p:nvPr>
+            <p:ph type="sldNum" idx="12"/>
+          </p:nvPr>
+        </p:nvSpPr>
+        <p:spPr/>
+        <p:txBody>
+          <a:bodyPr/>
+          <a:lstStyle/>
+          <a:p>
+            <a:pPr marL="0" lvl="0" indent="0" algn="r" rtl="0">
+              <a:spcBef>
+                <a:spcPts val="0"/>
+              </a:spcBef>
+              <a:spcAft>
+                <a:spcPts val="0"/>
+              </a:spcAft>
+              <a:buNone/>
+            </a:pPr>
+            <a:fld id="{00000000-1234-1234-1234-123412341234}" type="slidenum">
+              <a:rPr lang="en-US" smtClean="0"/>
+              <a:t>13</a:t>
+            </a:fld>
+            <a:r>
+              <a:rPr lang="en-US" dirty="0" smtClean="0"/>
+              <a:t>/18</a:t>
+            </a:r>
+            <a:endParaRPr lang="en-US" dirty="0"/>
+          </a:p>
+        </p:txBody>
+      </p:sp>
+      <p:graphicFrame>
+        <p:nvGraphicFramePr>
+          <p:cNvPr id="5" name="Table 4"/>
+          <p:cNvGraphicFramePr>
+            <a:graphicFrameLocks noGrp="1"/>
+          </p:cNvGraphicFramePr>
+          <p:nvPr>
+            <p:extLst>
+              <p:ext uri="{D42A27DB-BD31-4B8C-83A1-F6EECF244321}">
+                <p14:modId xmlns:p14="http://schemas.microsoft.com/office/powerpoint/2010/main" val="1612505456"/>
+              </p:ext>
+            </p:extLst>
+          </p:nvPr>
+        </p:nvGraphicFramePr>
+        <p:xfrm>
+          <a:off x="5532582" y="2422422"/>
+          <a:ext cx="5267037" cy="2260800"/>
+        </p:xfrm>
+        <a:graphic>
+          <a:graphicData uri="http://schemas.openxmlformats.org/drawingml/2006/table">
+            <a:tbl>
+              <a:tblPr/>
+              <a:tblGrid>
+                <a:gridCol w="2087418">
+                  <a:extLst>
+                    <a:ext uri="{9D8B030D-6E8A-4147-A177-3AD203B41FA5}">
+                      <a16:colId xmlns:a16="http://schemas.microsoft.com/office/drawing/2014/main" val="777982496"/>
+                    </a:ext>
+                  </a:extLst>
+                </a:gridCol>
+                <a:gridCol w="1423940">
+                  <a:extLst>
+                    <a:ext uri="{9D8B030D-6E8A-4147-A177-3AD203B41FA5}">
+                      <a16:colId xmlns:a16="http://schemas.microsoft.com/office/drawing/2014/main" val="4159874210"/>
+                    </a:ext>
+                  </a:extLst>
+                </a:gridCol>
+                <a:gridCol w="1755679">
+                  <a:extLst>
+                    <a:ext uri="{9D8B030D-6E8A-4147-A177-3AD203B41FA5}">
+                      <a16:colId xmlns:a16="http://schemas.microsoft.com/office/drawing/2014/main" val="2656411332"/>
+                    </a:ext>
+                  </a:extLst>
+                </a:gridCol>
+              </a:tblGrid>
+              <a:tr h="432000">
+                <a:tc>
+                  <a:txBody>
+                    <a:bodyPr/>
+                    <a:lstStyle/>
+                    <a:p>
+                      <a:pPr algn="ctr"/>
+                      <a:r>
+                        <a:rPr lang="en-GB" b="1" dirty="0" smtClean="0">
+                          <a:solidFill>
+                            <a:srgbClr val="0F2D69"/>
+                          </a:solidFill>
+                          <a:latin typeface="HSE Sans" panose="02000000000000000000" pitchFamily="50" charset="0"/>
+                        </a:rPr>
+                        <a:t>Classifier</a:t>
+                      </a:r>
+                      <a:endParaRPr lang="en-US" b="1" dirty="0">
+                        <a:solidFill>
+                          <a:srgbClr val="0F2D69"/>
+                        </a:solidFill>
+                        <a:latin typeface="HSE Sans" panose="02000000000000000000" pitchFamily="50" charset="0"/>
+                      </a:endParaRPr>
+                    </a:p>
+                  </a:txBody>
+                  <a:tcPr anchor="ctr">
+                    <a:lnL w="12700" cap="flat" cmpd="sng" algn="ctr">
+                      <a:noFill/>
+                      <a:prstDash val="solid"/>
+                      <a:round/>
+                      <a:headEnd type="none" w="med" len="med"/>
+                      <a:tailEnd type="none" w="med" len="med"/>
+                    </a:lnL>
+                    <a:lnR w="12700" cap="flat" cmpd="sng" algn="ctr">
+                      <a:noFill/>
+                      <a:prstDash val="solid"/>
+                      <a:round/>
+                      <a:headEnd type="none" w="med" len="med"/>
+                      <a:tailEnd type="none" w="med" len="med"/>
+                    </a:lnR>
+                    <a:lnT w="12700" cap="flat" cmpd="sng" algn="ctr">
+                      <a:noFill/>
+                      <a:prstDash val="solid"/>
+                      <a:round/>
+                      <a:headEnd type="none" w="med" len="med"/>
+                      <a:tailEnd type="none" w="med" len="med"/>
+                    </a:lnT>
+                    <a:lnB w="12700" cap="flat" cmpd="sng" algn="ctr">
+                      <a:noFill/>
+                      <a:prstDash val="solid"/>
+                      <a:round/>
+                      <a:headEnd type="none" w="med" len="med"/>
+                      <a:tailEnd type="none" w="med" len="med"/>
+                    </a:lnB>
+                    <a:lnTlToBr w="12700" cmpd="sng">
+                      <a:noFill/>
+                      <a:prstDash val="solid"/>
+                    </a:lnTlToBr>
+                    <a:lnBlToTr w="12700" cmpd="sng">
+                      <a:noFill/>
+                      <a:prstDash val="solid"/>
+                    </a:lnBlToTr>
+                    <a:solidFill>
+                      <a:srgbClr val="FFF07D"/>
+                    </a:solidFill>
+                  </a:tcPr>
+                </a:tc>
+                <a:tc>
+                  <a:txBody>
+                    <a:bodyPr/>
+                    <a:lstStyle/>
+                    <a:p>
+                      <a:pPr algn="ctr" fontAlgn="ctr"/>
+                      <a:r>
+                        <a:rPr lang="en-US" b="1" dirty="0" smtClean="0">
+                          <a:solidFill>
+                            <a:srgbClr val="0F2D69"/>
+                          </a:solidFill>
+                          <a:effectLst/>
+                          <a:latin typeface="HSE Sans" panose="02000000000000000000" pitchFamily="50" charset="0"/>
+                        </a:rPr>
+                        <a:t>f1-macro</a:t>
+                      </a:r>
+                      <a:endParaRPr lang="en-US" b="1" dirty="0">
+                        <a:solidFill>
+                          <a:srgbClr val="0F2D69"/>
+                        </a:solidFill>
+                        <a:effectLst/>
+                        <a:latin typeface="HSE Sans" panose="02000000000000000000" pitchFamily="50" charset="0"/>
+                      </a:endParaRPr>
+                    </a:p>
+                  </a:txBody>
+                  <a:tcPr anchor="ctr">
+                    <a:lnL w="12700" cap="flat" cmpd="sng" algn="ctr">
+                      <a:noFill/>
+                      <a:prstDash val="solid"/>
+                      <a:round/>
+                      <a:headEnd type="none" w="med" len="med"/>
+                      <a:tailEnd type="none" w="med" len="med"/>
+                    </a:lnL>
+                    <a:lnR w="12700" cap="flat" cmpd="sng" algn="ctr">
+                      <a:noFill/>
+                      <a:prstDash val="solid"/>
+                      <a:round/>
+                      <a:headEnd type="none" w="med" len="med"/>
+                      <a:tailEnd type="none" w="med" len="med"/>
+                    </a:lnR>
+                    <a:lnT w="12700" cap="flat" cmpd="sng" algn="ctr">
+                      <a:noFill/>
+                      <a:prstDash val="solid"/>
+                      <a:round/>
+                      <a:headEnd type="none" w="med" len="med"/>
+                      <a:tailEnd type="none" w="med" len="med"/>
+                    </a:lnT>
+                    <a:lnB w="12700" cap="flat" cmpd="sng" algn="ctr">
+                      <a:noFill/>
+                      <a:prstDash val="solid"/>
+                      <a:round/>
+                      <a:headEnd type="none" w="med" len="med"/>
+                      <a:tailEnd type="none" w="med" len="med"/>
+                    </a:lnB>
+                    <a:lnTlToBr w="12700" cmpd="sng">
+                      <a:noFill/>
+                      <a:prstDash val="solid"/>
+                    </a:lnTlToBr>
+                    <a:lnBlToTr w="12700" cmpd="sng">
+                      <a:noFill/>
+                      <a:prstDash val="solid"/>
+                    </a:lnBlToTr>
+                    <a:solidFill>
+                      <a:srgbClr val="FFF07D"/>
+                    </a:solidFill>
+                  </a:tcPr>
+                </a:tc>
+                <a:tc>
+                  <a:txBody>
+                    <a:bodyPr/>
+                    <a:lstStyle/>
+                    <a:p>
+                      <a:pPr algn="ctr" fontAlgn="ctr"/>
+                      <a:r>
+                        <a:rPr lang="en-US" b="1" dirty="0">
+                          <a:solidFill>
+                            <a:srgbClr val="0F2D69"/>
+                          </a:solidFill>
+                          <a:effectLst/>
+                          <a:latin typeface="HSE Sans" panose="02000000000000000000" pitchFamily="50" charset="0"/>
+                        </a:rPr>
+                        <a:t>accuracy</a:t>
+                      </a:r>
+                    </a:p>
+                  </a:txBody>
+                  <a:tcPr anchor="ctr">
+                    <a:lnL w="12700" cap="flat" cmpd="sng" algn="ctr">
+                      <a:noFill/>
+                      <a:prstDash val="solid"/>
+                      <a:round/>
+                      <a:headEnd type="none" w="med" len="med"/>
+                      <a:tailEnd type="none" w="med" len="med"/>
+                    </a:lnL>
+                    <a:lnR w="12700" cap="flat" cmpd="sng" algn="ctr">
+                      <a:noFill/>
+                      <a:prstDash val="solid"/>
+                      <a:round/>
+                      <a:headEnd type="none" w="med" len="med"/>
+                      <a:tailEnd type="none" w="med" len="med"/>
+                    </a:lnR>
+                    <a:lnT w="12700" cap="flat" cmpd="sng" algn="ctr">
+                      <a:noFill/>
+                      <a:prstDash val="solid"/>
+                      <a:round/>
+                      <a:headEnd type="none" w="med" len="med"/>
+                      <a:tailEnd type="none" w="med" len="med"/>
+                    </a:lnT>
+                    <a:lnB w="12700" cap="flat" cmpd="sng" algn="ctr">
+                      <a:noFill/>
+                      <a:prstDash val="solid"/>
+                      <a:round/>
+                      <a:headEnd type="none" w="med" len="med"/>
+                      <a:tailEnd type="none" w="med" len="med"/>
+                    </a:lnB>
+                    <a:lnTlToBr w="12700" cmpd="sng">
+                      <a:noFill/>
+                      <a:prstDash val="solid"/>
+                    </a:lnTlToBr>
+                    <a:lnBlToTr w="12700" cmpd="sng">
+                      <a:noFill/>
+                      <a:prstDash val="solid"/>
+                    </a:lnBlToTr>
+                    <a:solidFill>
+                      <a:srgbClr val="FFF07D"/>
+                    </a:solidFill>
+                  </a:tcPr>
+                </a:tc>
+                <a:extLst>
+                  <a:ext uri="{0D108BD9-81ED-4DB2-BD59-A6C34878D82A}">
+                    <a16:rowId xmlns:a16="http://schemas.microsoft.com/office/drawing/2014/main" val="4184887189"/>
+                  </a:ext>
+                </a:extLst>
+              </a:tr>
+              <a:tr h="0">
+                <a:tc>
+                  <a:txBody>
+                    <a:bodyPr/>
+                    <a:lstStyle/>
+                    <a:p>
+                      <a:pPr algn="l" fontAlgn="ctr"/>
+                      <a:r>
+                        <a:rPr lang="en-US" b="0" dirty="0" err="1" smtClean="0">
+                          <a:solidFill>
+                            <a:srgbClr val="0F2D69"/>
+                          </a:solidFill>
+                          <a:effectLst/>
+                          <a:latin typeface="HSE Sans" panose="02000000000000000000" pitchFamily="50" charset="0"/>
+                        </a:rPr>
+                        <a:t>GaussianNB</a:t>
+                      </a:r>
+                      <a:endParaRPr lang="en-US" b="0" dirty="0">
+                        <a:solidFill>
+                          <a:srgbClr val="0F2D69"/>
+                        </a:solidFill>
+                        <a:effectLst/>
+                        <a:latin typeface="HSE Sans" panose="02000000000000000000" pitchFamily="50" charset="0"/>
+                      </a:endParaRPr>
+                    </a:p>
+                  </a:txBody>
+                  <a:tcPr anchor="ctr">
+                    <a:lnL w="12700" cap="flat" cmpd="sng" algn="ctr">
+                      <a:noFill/>
+                      <a:prstDash val="solid"/>
+                      <a:round/>
+                      <a:headEnd type="none" w="med" len="med"/>
+                      <a:tailEnd type="none" w="med" len="med"/>
+                    </a:lnL>
+                    <a:lnR w="12700" cap="flat" cmpd="sng" algn="ctr">
+                      <a:noFill/>
+                      <a:prstDash val="solid"/>
+                      <a:round/>
+                      <a:headEnd type="none" w="med" len="med"/>
+                      <a:tailEnd type="none" w="med" len="med"/>
+                    </a:lnR>
+                    <a:lnT w="12700" cap="flat" cmpd="sng" algn="ctr">
+                      <a:noFill/>
+                      <a:prstDash val="solid"/>
+                      <a:round/>
+                      <a:headEnd type="none" w="med" len="med"/>
+                      <a:tailEnd type="none" w="med" len="med"/>
+                    </a:lnT>
+                    <a:lnB w="12700" cap="flat" cmpd="sng" algn="ctr">
+                      <a:noFill/>
+                      <a:prstDash val="solid"/>
+                      <a:round/>
+                      <a:headEnd type="none" w="med" len="med"/>
+                      <a:tailEnd type="none" w="med" len="med"/>
+                    </a:lnB>
+                    <a:lnTlToBr w="12700" cmpd="sng">
+                      <a:noFill/>
+                      <a:prstDash val="solid"/>
+                    </a:lnTlToBr>
+                    <a:lnBlToTr w="12700" cmpd="sng">
+                      <a:noFill/>
+                      <a:prstDash val="solid"/>
+                    </a:lnBlToTr>
+                  </a:tcPr>
+                </a:tc>
+                <a:tc>
+                  <a:txBody>
+                    <a:bodyPr/>
+                    <a:lstStyle/>
+                    <a:p>
+                      <a:pPr algn="ctr" fontAlgn="ctr"/>
+                      <a:r>
+                        <a:rPr lang="en-US" dirty="0" smtClean="0">
+                          <a:solidFill>
+                            <a:srgbClr val="0F2D69"/>
+                          </a:solidFill>
+                          <a:effectLst/>
+                          <a:latin typeface="HSE Sans" panose="02000000000000000000" pitchFamily="50" charset="0"/>
+                        </a:rPr>
+                        <a:t>0.8318</a:t>
+                      </a:r>
+                      <a:endParaRPr lang="en-US" dirty="0">
+                        <a:solidFill>
+                          <a:srgbClr val="0F2D69"/>
+                        </a:solidFill>
+                        <a:effectLst/>
+                        <a:latin typeface="HSE Sans" panose="02000000000000000000" pitchFamily="50" charset="0"/>
+                      </a:endParaRPr>
+                    </a:p>
+                  </a:txBody>
+                  <a:tcPr anchor="ctr">
+                    <a:lnL w="12700" cap="flat" cmpd="sng" algn="ctr">
+                      <a:noFill/>
+                      <a:prstDash val="solid"/>
+                      <a:round/>
+                      <a:headEnd type="none" w="med" len="med"/>
+                      <a:tailEnd type="none" w="med" len="med"/>
+                    </a:lnL>
+                    <a:lnR w="12700" cap="flat" cmpd="sng" algn="ctr">
+                      <a:noFill/>
+                      <a:prstDash val="solid"/>
+                      <a:round/>
+                      <a:headEnd type="none" w="med" len="med"/>
+                      <a:tailEnd type="none" w="med" len="med"/>
+                    </a:lnR>
+                    <a:lnT w="12700" cap="flat" cmpd="sng" algn="ctr">
+                      <a:noFill/>
+                      <a:prstDash val="solid"/>
+                      <a:round/>
+                      <a:headEnd type="none" w="med" len="med"/>
+                      <a:tailEnd type="none" w="med" len="med"/>
+                    </a:lnT>
+                    <a:lnB w="12700" cap="flat" cmpd="sng" algn="ctr">
+                      <a:noFill/>
+                      <a:prstDash val="solid"/>
+                      <a:round/>
+                      <a:headEnd type="none" w="med" len="med"/>
+                      <a:tailEnd type="none" w="med" len="med"/>
+                    </a:lnB>
+                    <a:lnTlToBr w="12700" cmpd="sng">
+                      <a:noFill/>
+                      <a:prstDash val="solid"/>
+                    </a:lnTlToBr>
+                    <a:lnBlToTr w="12700" cmpd="sng">
+                      <a:noFill/>
+                      <a:prstDash val="solid"/>
+                    </a:lnBlToTr>
+                  </a:tcPr>
+                </a:tc>
+                <a:tc>
+                  <a:txBody>
+                    <a:bodyPr/>
+                    <a:lstStyle/>
+                    <a:p>
+                      <a:pPr algn="ctr" fontAlgn="ctr"/>
+                      <a:r>
+                        <a:rPr lang="en-US" dirty="0" smtClean="0">
+                          <a:solidFill>
+                            <a:srgbClr val="0F2D69"/>
+                          </a:solidFill>
+                          <a:effectLst/>
+                          <a:latin typeface="HSE Sans" panose="02000000000000000000" pitchFamily="50" charset="0"/>
+                        </a:rPr>
+                        <a:t>0.7567</a:t>
+                      </a:r>
+                      <a:endParaRPr lang="en-US" dirty="0">
+                        <a:solidFill>
+                          <a:srgbClr val="0F2D69"/>
+                        </a:solidFill>
+                        <a:effectLst/>
+                        <a:latin typeface="HSE Sans" panose="02000000000000000000" pitchFamily="50" charset="0"/>
+                      </a:endParaRPr>
+                    </a:p>
+                  </a:txBody>
+                  <a:tcPr anchor="ctr">
+                    <a:lnL w="12700" cap="flat" cmpd="sng" algn="ctr">
+                      <a:noFill/>
+                      <a:prstDash val="solid"/>
+                      <a:round/>
+                      <a:headEnd type="none" w="med" len="med"/>
+                      <a:tailEnd type="none" w="med" len="med"/>
+                    </a:lnL>
+                    <a:lnR w="12700" cap="flat" cmpd="sng" algn="ctr">
+                      <a:noFill/>
+                      <a:prstDash val="solid"/>
+                      <a:round/>
+                      <a:headEnd type="none" w="med" len="med"/>
+                      <a:tailEnd type="none" w="med" len="med"/>
+                    </a:lnR>
+                    <a:lnT w="12700" cap="flat" cmpd="sng" algn="ctr">
+                      <a:noFill/>
+                      <a:prstDash val="solid"/>
+                      <a:round/>
+                      <a:headEnd type="none" w="med" len="med"/>
+                      <a:tailEnd type="none" w="med" len="med"/>
+                    </a:lnT>
+                    <a:lnB w="12700" cap="flat" cmpd="sng" algn="ctr">
+                      <a:noFill/>
+                      <a:prstDash val="solid"/>
+                      <a:round/>
+                      <a:headEnd type="none" w="med" len="med"/>
+                      <a:tailEnd type="none" w="med" len="med"/>
+                    </a:lnB>
+                    <a:lnTlToBr w="12700" cmpd="sng">
+                      <a:noFill/>
+                      <a:prstDash val="solid"/>
+                    </a:lnTlToBr>
+                    <a:lnBlToTr w="12700" cmpd="sng">
+                      <a:noFill/>
+                      <a:prstDash val="solid"/>
+                    </a:lnBlToTr>
+                  </a:tcPr>
+                </a:tc>
+                <a:extLst>
+                  <a:ext uri="{0D108BD9-81ED-4DB2-BD59-A6C34878D82A}">
+                    <a16:rowId xmlns:a16="http://schemas.microsoft.com/office/drawing/2014/main" val="3425428013"/>
+                  </a:ext>
+                </a:extLst>
+              </a:tr>
+              <a:tr h="0">
+                <a:tc>
+                  <a:txBody>
+                    <a:bodyPr/>
+                    <a:lstStyle/>
+                    <a:p>
+                      <a:pPr algn="l" fontAlgn="ctr"/>
+                      <a:r>
+                        <a:rPr lang="en-US" b="0" dirty="0" err="1" smtClean="0">
+                          <a:solidFill>
+                            <a:srgbClr val="0F2D69"/>
+                          </a:solidFill>
+                          <a:effectLst/>
+                          <a:latin typeface="HSE Sans" panose="02000000000000000000" pitchFamily="50" charset="0"/>
+                        </a:rPr>
+                        <a:t>RandomForest</a:t>
+                      </a:r>
+                      <a:endParaRPr lang="en-US" b="0" dirty="0">
+                        <a:solidFill>
+                          <a:srgbClr val="0F2D69"/>
+                        </a:solidFill>
+                        <a:effectLst/>
+                        <a:latin typeface="HSE Sans" panose="02000000000000000000" pitchFamily="50" charset="0"/>
+                      </a:endParaRPr>
+                    </a:p>
+                  </a:txBody>
+                  <a:tcPr anchor="ctr">
+                    <a:lnL w="12700" cap="flat" cmpd="sng" algn="ctr">
+                      <a:noFill/>
+                      <a:prstDash val="solid"/>
+                      <a:round/>
+                      <a:headEnd type="none" w="med" len="med"/>
+                      <a:tailEnd type="none" w="med" len="med"/>
+                    </a:lnL>
+                    <a:lnR w="12700" cap="flat" cmpd="sng" algn="ctr">
+                      <a:noFill/>
+                      <a:prstDash val="solid"/>
+                      <a:round/>
+                      <a:headEnd type="none" w="med" len="med"/>
+                      <a:tailEnd type="none" w="med" len="med"/>
+                    </a:lnR>
+                    <a:lnT w="12700" cap="flat" cmpd="sng" algn="ctr">
+                      <a:noFill/>
+                      <a:prstDash val="solid"/>
+                      <a:round/>
+                      <a:headEnd type="none" w="med" len="med"/>
+                      <a:tailEnd type="none" w="med" len="med"/>
+                    </a:lnT>
+                    <a:lnB w="12700" cap="flat" cmpd="sng" algn="ctr">
+                      <a:noFill/>
+                      <a:prstDash val="solid"/>
+                      <a:round/>
+                      <a:headEnd type="none" w="med" len="med"/>
+                      <a:tailEnd type="none" w="med" len="med"/>
+                    </a:lnB>
+                    <a:lnTlToBr w="12700" cmpd="sng">
+                      <a:noFill/>
+                      <a:prstDash val="solid"/>
+                    </a:lnTlToBr>
+                    <a:lnBlToTr w="12700" cmpd="sng">
+                      <a:noFill/>
+                      <a:prstDash val="solid"/>
+                    </a:lnBlToTr>
+                    <a:solidFill>
+                      <a:srgbClr val="FFF07D"/>
+                    </a:solidFill>
+                  </a:tcPr>
+                </a:tc>
+                <a:tc>
+                  <a:txBody>
+                    <a:bodyPr/>
+                    <a:lstStyle/>
+                    <a:p>
+                      <a:pPr algn="ctr" fontAlgn="ctr"/>
+                      <a:r>
+                        <a:rPr lang="en-US" dirty="0" smtClean="0">
+                          <a:solidFill>
+                            <a:srgbClr val="0F2D69"/>
+                          </a:solidFill>
+                          <a:effectLst/>
+                          <a:latin typeface="HSE Sans" panose="02000000000000000000" pitchFamily="50" charset="0"/>
+                        </a:rPr>
+                        <a:t>0.8889</a:t>
+                      </a:r>
+                      <a:endParaRPr lang="en-US" dirty="0">
+                        <a:solidFill>
+                          <a:srgbClr val="0F2D69"/>
+                        </a:solidFill>
+                        <a:effectLst/>
+                        <a:latin typeface="HSE Sans" panose="02000000000000000000" pitchFamily="50" charset="0"/>
+                      </a:endParaRPr>
+                    </a:p>
+                  </a:txBody>
+                  <a:tcPr anchor="ctr">
+                    <a:lnL w="12700" cap="flat" cmpd="sng" algn="ctr">
+                      <a:noFill/>
+                      <a:prstDash val="solid"/>
+                      <a:round/>
+                      <a:headEnd type="none" w="med" len="med"/>
+                      <a:tailEnd type="none" w="med" len="med"/>
+                    </a:lnL>
+                    <a:lnR w="12700" cap="flat" cmpd="sng" algn="ctr">
+                      <a:noFill/>
+                      <a:prstDash val="solid"/>
+                      <a:round/>
+                      <a:headEnd type="none" w="med" len="med"/>
+                      <a:tailEnd type="none" w="med" len="med"/>
+                    </a:lnR>
+                    <a:lnT w="12700" cap="flat" cmpd="sng" algn="ctr">
+                      <a:noFill/>
+                      <a:prstDash val="solid"/>
+                      <a:round/>
+                      <a:headEnd type="none" w="med" len="med"/>
+                      <a:tailEnd type="none" w="med" len="med"/>
+                    </a:lnT>
+                    <a:lnB w="12700" cap="flat" cmpd="sng" algn="ctr">
+                      <a:noFill/>
+                      <a:prstDash val="solid"/>
+                      <a:round/>
+                      <a:headEnd type="none" w="med" len="med"/>
+                      <a:tailEnd type="none" w="med" len="med"/>
+                    </a:lnB>
+                    <a:lnTlToBr w="12700" cmpd="sng">
+                      <a:noFill/>
+                      <a:prstDash val="solid"/>
+                    </a:lnTlToBr>
+                    <a:lnBlToTr w="12700" cmpd="sng">
+                      <a:noFill/>
+                      <a:prstDash val="solid"/>
+                    </a:lnBlToTr>
+                    <a:solidFill>
+                      <a:srgbClr val="FFF07D"/>
+                    </a:solidFill>
+                  </a:tcPr>
+                </a:tc>
+                <a:tc>
+                  <a:txBody>
+                    <a:bodyPr/>
+                    <a:lstStyle/>
+                    <a:p>
+                      <a:pPr algn="ctr" fontAlgn="ctr"/>
+                      <a:r>
+                        <a:rPr lang="en-US" dirty="0" smtClean="0">
+                          <a:solidFill>
+                            <a:srgbClr val="0F2D69"/>
+                          </a:solidFill>
+                          <a:effectLst/>
+                          <a:latin typeface="HSE Sans" panose="02000000000000000000" pitchFamily="50" charset="0"/>
+                        </a:rPr>
+                        <a:t>0.8383</a:t>
+                      </a:r>
+                      <a:endParaRPr lang="en-US" dirty="0">
+                        <a:solidFill>
+                          <a:srgbClr val="0F2D69"/>
+                        </a:solidFill>
+                        <a:effectLst/>
+                        <a:latin typeface="HSE Sans" panose="02000000000000000000" pitchFamily="50" charset="0"/>
+                      </a:endParaRPr>
+                    </a:p>
+                  </a:txBody>
+                  <a:tcPr anchor="ctr">
+                    <a:lnL w="12700" cap="flat" cmpd="sng" algn="ctr">
+                      <a:noFill/>
+                      <a:prstDash val="solid"/>
+                      <a:round/>
+                      <a:headEnd type="none" w="med" len="med"/>
+                      <a:tailEnd type="none" w="med" len="med"/>
+                    </a:lnL>
+                    <a:lnR w="12700" cap="flat" cmpd="sng" algn="ctr">
+                      <a:noFill/>
+                      <a:prstDash val="solid"/>
+                      <a:round/>
+                      <a:headEnd type="none" w="med" len="med"/>
+                      <a:tailEnd type="none" w="med" len="med"/>
+                    </a:lnR>
+                    <a:lnT w="12700" cap="flat" cmpd="sng" algn="ctr">
+                      <a:noFill/>
+                      <a:prstDash val="solid"/>
+                      <a:round/>
+                      <a:headEnd type="none" w="med" len="med"/>
+                      <a:tailEnd type="none" w="med" len="med"/>
+                    </a:lnT>
+                    <a:lnB w="12700" cap="flat" cmpd="sng" algn="ctr">
+                      <a:noFill/>
+                      <a:prstDash val="solid"/>
+                      <a:round/>
+                      <a:headEnd type="none" w="med" len="med"/>
+                      <a:tailEnd type="none" w="med" len="med"/>
+                    </a:lnB>
+                    <a:lnTlToBr w="12700" cmpd="sng">
+                      <a:noFill/>
+                      <a:prstDash val="solid"/>
+                    </a:lnTlToBr>
+                    <a:lnBlToTr w="12700" cmpd="sng">
+                      <a:noFill/>
+                      <a:prstDash val="solid"/>
+                    </a:lnBlToTr>
+                    <a:solidFill>
+                      <a:srgbClr val="FFF07D"/>
+                    </a:solidFill>
+                  </a:tcPr>
+                </a:tc>
+                <a:extLst>
+                  <a:ext uri="{0D108BD9-81ED-4DB2-BD59-A6C34878D82A}">
+                    <a16:rowId xmlns:a16="http://schemas.microsoft.com/office/drawing/2014/main" val="2011661416"/>
+                  </a:ext>
+                </a:extLst>
+              </a:tr>
+              <a:tr h="0">
+                <a:tc>
+                  <a:txBody>
+                    <a:bodyPr/>
+                    <a:lstStyle/>
+                    <a:p>
+                      <a:pPr algn="l" fontAlgn="ctr"/>
+                      <a:r>
+                        <a:rPr lang="en-US" b="0" dirty="0" err="1" smtClean="0">
+                          <a:solidFill>
+                            <a:srgbClr val="0F2D69"/>
+                          </a:solidFill>
+                          <a:effectLst/>
+                          <a:latin typeface="HSE Sans" panose="02000000000000000000" pitchFamily="50" charset="0"/>
+                        </a:rPr>
+                        <a:t>HistGradientBoosting</a:t>
+                      </a:r>
+                      <a:endParaRPr lang="en-US" b="0" dirty="0">
+                        <a:solidFill>
+                          <a:srgbClr val="0F2D69"/>
+                        </a:solidFill>
+                        <a:effectLst/>
+                        <a:latin typeface="HSE Sans" panose="02000000000000000000" pitchFamily="50" charset="0"/>
+                      </a:endParaRPr>
+                    </a:p>
+                  </a:txBody>
+                  <a:tcPr anchor="ctr">
+                    <a:lnL w="12700" cap="flat" cmpd="sng" algn="ctr">
+                      <a:noFill/>
+                      <a:prstDash val="solid"/>
+                      <a:round/>
+                      <a:headEnd type="none" w="med" len="med"/>
+                      <a:tailEnd type="none" w="med" len="med"/>
+                    </a:lnL>
+                    <a:lnR w="12700" cap="flat" cmpd="sng" algn="ctr">
+                      <a:noFill/>
+                      <a:prstDash val="solid"/>
+                      <a:round/>
+                      <a:headEnd type="none" w="med" len="med"/>
+                      <a:tailEnd type="none" w="med" len="med"/>
+                    </a:lnR>
+                    <a:lnT w="12700" cap="flat" cmpd="sng" algn="ctr">
+                      <a:noFill/>
+                      <a:prstDash val="solid"/>
+                      <a:round/>
+                      <a:headEnd type="none" w="med" len="med"/>
+                      <a:tailEnd type="none" w="med" len="med"/>
+                    </a:lnT>
+                    <a:lnB w="12700" cap="flat" cmpd="sng" algn="ctr">
+                      <a:noFill/>
+                      <a:prstDash val="solid"/>
+                      <a:round/>
+                      <a:headEnd type="none" w="med" len="med"/>
+                      <a:tailEnd type="none" w="med" len="med"/>
+                    </a:lnB>
+                    <a:lnTlToBr w="12700" cmpd="sng">
+                      <a:noFill/>
+                      <a:prstDash val="solid"/>
+                    </a:lnTlToBr>
+                    <a:lnBlToTr w="12700" cmpd="sng">
+                      <a:noFill/>
+                      <a:prstDash val="solid"/>
+                    </a:lnBlToTr>
+                  </a:tcPr>
+                </a:tc>
+                <a:tc>
+                  <a:txBody>
+                    <a:bodyPr/>
+                    <a:lstStyle/>
+                    <a:p>
+                      <a:pPr algn="ctr" fontAlgn="ctr"/>
+                      <a:r>
+                        <a:rPr lang="en-US" dirty="0" smtClean="0">
+                          <a:solidFill>
+                            <a:srgbClr val="0F2D69"/>
+                          </a:solidFill>
+                          <a:effectLst/>
+                          <a:latin typeface="HSE Sans" panose="02000000000000000000" pitchFamily="50" charset="0"/>
+                        </a:rPr>
+                        <a:t>0.8791</a:t>
+                      </a:r>
+                      <a:endParaRPr lang="en-US" dirty="0">
+                        <a:solidFill>
+                          <a:srgbClr val="0F2D69"/>
+                        </a:solidFill>
+                        <a:effectLst/>
+                        <a:latin typeface="HSE Sans" panose="02000000000000000000" pitchFamily="50" charset="0"/>
+                      </a:endParaRPr>
+                    </a:p>
+                  </a:txBody>
+                  <a:tcPr anchor="ctr">
+                    <a:lnL w="12700" cap="flat" cmpd="sng" algn="ctr">
+                      <a:noFill/>
+                      <a:prstDash val="solid"/>
+                      <a:round/>
+                      <a:headEnd type="none" w="med" len="med"/>
+                      <a:tailEnd type="none" w="med" len="med"/>
+                    </a:lnL>
+                    <a:lnR w="12700" cap="flat" cmpd="sng" algn="ctr">
+                      <a:noFill/>
+                      <a:prstDash val="solid"/>
+                      <a:round/>
+                      <a:headEnd type="none" w="med" len="med"/>
+                      <a:tailEnd type="none" w="med" len="med"/>
+                    </a:lnR>
+                    <a:lnT w="12700" cap="flat" cmpd="sng" algn="ctr">
+                      <a:noFill/>
+                      <a:prstDash val="solid"/>
+                      <a:round/>
+                      <a:headEnd type="none" w="med" len="med"/>
+                      <a:tailEnd type="none" w="med" len="med"/>
+                    </a:lnT>
+                    <a:lnB w="12700" cap="flat" cmpd="sng" algn="ctr">
+                      <a:noFill/>
+                      <a:prstDash val="solid"/>
+                      <a:round/>
+                      <a:headEnd type="none" w="med" len="med"/>
+                      <a:tailEnd type="none" w="med" len="med"/>
+                    </a:lnB>
+                    <a:lnTlToBr w="12700" cmpd="sng">
+                      <a:noFill/>
+                      <a:prstDash val="solid"/>
+                    </a:lnTlToBr>
+                    <a:lnBlToTr w="12700" cmpd="sng">
+                      <a:noFill/>
+                      <a:prstDash val="solid"/>
+                    </a:lnBlToTr>
+                  </a:tcPr>
+                </a:tc>
+                <a:tc>
+                  <a:txBody>
+                    <a:bodyPr/>
+                    <a:lstStyle/>
+                    <a:p>
+                      <a:pPr algn="ctr" fontAlgn="ctr"/>
+                      <a:r>
+                        <a:rPr lang="en-US" smtClean="0">
+                          <a:solidFill>
+                            <a:srgbClr val="0F2D69"/>
+                          </a:solidFill>
+                          <a:effectLst/>
+                          <a:latin typeface="HSE Sans" panose="02000000000000000000" pitchFamily="50" charset="0"/>
+                        </a:rPr>
+                        <a:t> 0.8300</a:t>
+                      </a:r>
+                      <a:endParaRPr lang="en-US">
+                        <a:solidFill>
+                          <a:srgbClr val="0F2D69"/>
+                        </a:solidFill>
+                        <a:effectLst/>
+                        <a:latin typeface="HSE Sans" panose="02000000000000000000" pitchFamily="50" charset="0"/>
+                      </a:endParaRPr>
+                    </a:p>
+                  </a:txBody>
+                  <a:tcPr anchor="ctr">
+                    <a:lnL w="12700" cap="flat" cmpd="sng" algn="ctr">
+                      <a:noFill/>
+                      <a:prstDash val="solid"/>
+                      <a:round/>
+                      <a:headEnd type="none" w="med" len="med"/>
+                      <a:tailEnd type="none" w="med" len="med"/>
+                    </a:lnL>
+                    <a:lnR w="12700" cap="flat" cmpd="sng" algn="ctr">
+                      <a:noFill/>
+                      <a:prstDash val="solid"/>
+                      <a:round/>
+                      <a:headEnd type="none" w="med" len="med"/>
+                      <a:tailEnd type="none" w="med" len="med"/>
+                    </a:lnR>
+                    <a:lnT w="12700" cap="flat" cmpd="sng" algn="ctr">
+                      <a:noFill/>
+                      <a:prstDash val="solid"/>
+                      <a:round/>
+                      <a:headEnd type="none" w="med" len="med"/>
+                      <a:tailEnd type="none" w="med" len="med"/>
+                    </a:lnT>
+                    <a:lnB w="12700" cap="flat" cmpd="sng" algn="ctr">
+                      <a:noFill/>
+                      <a:prstDash val="solid"/>
+                      <a:round/>
+                      <a:headEnd type="none" w="med" len="med"/>
+                      <a:tailEnd type="none" w="med" len="med"/>
+                    </a:lnB>
+                    <a:lnTlToBr w="12700" cmpd="sng">
+                      <a:noFill/>
+                      <a:prstDash val="solid"/>
+                    </a:lnTlToBr>
+                    <a:lnBlToTr w="12700" cmpd="sng">
+                      <a:noFill/>
+                      <a:prstDash val="solid"/>
+                    </a:lnBlToTr>
+                  </a:tcPr>
+                </a:tc>
+                <a:extLst>
+                  <a:ext uri="{0D108BD9-81ED-4DB2-BD59-A6C34878D82A}">
+                    <a16:rowId xmlns:a16="http://schemas.microsoft.com/office/drawing/2014/main" val="909643184"/>
+                  </a:ext>
+                </a:extLst>
+              </a:tr>
+              <a:tr h="0">
+                <a:tc>
+                  <a:txBody>
+                    <a:bodyPr/>
+                    <a:lstStyle/>
+                    <a:p>
+                      <a:pPr algn="l" fontAlgn="ctr"/>
+                      <a:r>
+                        <a:rPr lang="en-US" b="0" dirty="0" err="1" smtClean="0">
+                          <a:solidFill>
+                            <a:srgbClr val="0F2D69"/>
+                          </a:solidFill>
+                          <a:effectLst/>
+                          <a:latin typeface="HSE Sans" panose="02000000000000000000" pitchFamily="50" charset="0"/>
+                        </a:rPr>
+                        <a:t>NeuralFCA</a:t>
+                      </a:r>
+                      <a:r>
+                        <a:rPr lang="en-US" b="0" dirty="0" smtClean="0">
+                          <a:solidFill>
+                            <a:srgbClr val="0F2D69"/>
+                          </a:solidFill>
+                          <a:effectLst/>
+                          <a:latin typeface="HSE Sans" panose="02000000000000000000" pitchFamily="50" charset="0"/>
+                        </a:rPr>
+                        <a:t>(base)</a:t>
+                      </a:r>
+                      <a:endParaRPr lang="en-US" b="0" dirty="0">
+                        <a:solidFill>
+                          <a:srgbClr val="0F2D69"/>
+                        </a:solidFill>
+                        <a:effectLst/>
+                        <a:latin typeface="HSE Sans" panose="02000000000000000000" pitchFamily="50" charset="0"/>
+                      </a:endParaRPr>
+                    </a:p>
+                  </a:txBody>
+                  <a:tcPr anchor="ctr">
+                    <a:lnL w="12700" cap="flat" cmpd="sng" algn="ctr">
+                      <a:noFill/>
+                      <a:prstDash val="solid"/>
+                      <a:round/>
+                      <a:headEnd type="none" w="med" len="med"/>
+                      <a:tailEnd type="none" w="med" len="med"/>
+                    </a:lnL>
+                    <a:lnR w="12700" cap="flat" cmpd="sng" algn="ctr">
+                      <a:noFill/>
+                      <a:prstDash val="solid"/>
+                      <a:round/>
+                      <a:headEnd type="none" w="med" len="med"/>
+                      <a:tailEnd type="none" w="med" len="med"/>
+                    </a:lnR>
+                    <a:lnT w="12700" cap="flat" cmpd="sng" algn="ctr">
+                      <a:noFill/>
+                      <a:prstDash val="solid"/>
+                      <a:round/>
+                      <a:headEnd type="none" w="med" len="med"/>
+                      <a:tailEnd type="none" w="med" len="med"/>
+                    </a:lnT>
+                    <a:lnB w="12700" cap="flat" cmpd="sng" algn="ctr">
+                      <a:noFill/>
+                      <a:prstDash val="solid"/>
+                      <a:round/>
+                      <a:headEnd type="none" w="med" len="med"/>
+                      <a:tailEnd type="none" w="med" len="med"/>
+                    </a:lnB>
+                    <a:lnTlToBr w="12700" cmpd="sng">
+                      <a:noFill/>
+                      <a:prstDash val="solid"/>
+                    </a:lnTlToBr>
+                    <a:lnBlToTr w="12700" cmpd="sng">
+                      <a:noFill/>
+                      <a:prstDash val="solid"/>
+                    </a:lnBlToTr>
+                    <a:solidFill>
+                      <a:srgbClr val="FFF07D"/>
+                    </a:solidFill>
+                  </a:tcPr>
+                </a:tc>
+                <a:tc>
+                  <a:txBody>
+                    <a:bodyPr/>
+                    <a:lstStyle/>
+                    <a:p>
+                      <a:pPr algn="ctr" fontAlgn="ctr"/>
+                      <a:r>
+                        <a:rPr lang="en-US" dirty="0" smtClean="0">
+                          <a:solidFill>
+                            <a:srgbClr val="0F2D69"/>
+                          </a:solidFill>
+                          <a:effectLst/>
+                          <a:latin typeface="HSE Sans" panose="02000000000000000000" pitchFamily="50" charset="0"/>
+                        </a:rPr>
+                        <a:t>0.8643</a:t>
+                      </a:r>
+                      <a:endParaRPr lang="en-US" dirty="0">
+                        <a:solidFill>
+                          <a:srgbClr val="0F2D69"/>
+                        </a:solidFill>
+                        <a:effectLst/>
+                        <a:latin typeface="HSE Sans" panose="02000000000000000000" pitchFamily="50" charset="0"/>
+                      </a:endParaRPr>
+                    </a:p>
+                  </a:txBody>
+                  <a:tcPr anchor="ctr">
+                    <a:lnL w="12700" cap="flat" cmpd="sng" algn="ctr">
+                      <a:noFill/>
+                      <a:prstDash val="solid"/>
+                      <a:round/>
+                      <a:headEnd type="none" w="med" len="med"/>
+                      <a:tailEnd type="none" w="med" len="med"/>
+                    </a:lnL>
+                    <a:lnR w="12700" cap="flat" cmpd="sng" algn="ctr">
+                      <a:noFill/>
+                      <a:prstDash val="solid"/>
+                      <a:round/>
+                      <a:headEnd type="none" w="med" len="med"/>
+                      <a:tailEnd type="none" w="med" len="med"/>
+                    </a:lnR>
+                    <a:lnT w="12700" cap="flat" cmpd="sng" algn="ctr">
+                      <a:noFill/>
+                      <a:prstDash val="solid"/>
+                      <a:round/>
+                      <a:headEnd type="none" w="med" len="med"/>
+                      <a:tailEnd type="none" w="med" len="med"/>
+                    </a:lnT>
+                    <a:lnB w="12700" cap="flat" cmpd="sng" algn="ctr">
+                      <a:noFill/>
+                      <a:prstDash val="solid"/>
+                      <a:round/>
+                      <a:headEnd type="none" w="med" len="med"/>
+                      <a:tailEnd type="none" w="med" len="med"/>
+                    </a:lnB>
+                    <a:lnTlToBr w="12700" cmpd="sng">
+                      <a:noFill/>
+                      <a:prstDash val="solid"/>
+                    </a:lnTlToBr>
+                    <a:lnBlToTr w="12700" cmpd="sng">
+                      <a:noFill/>
+                      <a:prstDash val="solid"/>
+                    </a:lnBlToTr>
+                    <a:solidFill>
+                      <a:srgbClr val="FFF07D"/>
+                    </a:solidFill>
+                  </a:tcPr>
+                </a:tc>
+                <a:tc>
+                  <a:txBody>
+                    <a:bodyPr/>
+                    <a:lstStyle/>
+                    <a:p>
+                      <a:pPr algn="ctr" fontAlgn="ctr"/>
+                      <a:r>
+                        <a:rPr lang="en-US" dirty="0" smtClean="0">
+                          <a:solidFill>
+                            <a:srgbClr val="0F2D69"/>
+                          </a:solidFill>
+                          <a:effectLst/>
+                          <a:latin typeface="HSE Sans" panose="02000000000000000000" pitchFamily="50" charset="0"/>
+                        </a:rPr>
+                        <a:t>0.8017</a:t>
+                      </a:r>
+                      <a:endParaRPr lang="en-US" dirty="0">
+                        <a:solidFill>
+                          <a:srgbClr val="0F2D69"/>
+                        </a:solidFill>
+                        <a:effectLst/>
+                        <a:latin typeface="HSE Sans" panose="02000000000000000000" pitchFamily="50" charset="0"/>
+                      </a:endParaRPr>
+                    </a:p>
+                  </a:txBody>
+                  <a:tcPr anchor="ctr">
+                    <a:lnL w="12700" cap="flat" cmpd="sng" algn="ctr">
+                      <a:noFill/>
+                      <a:prstDash val="solid"/>
+                      <a:round/>
+                      <a:headEnd type="none" w="med" len="med"/>
+                      <a:tailEnd type="none" w="med" len="med"/>
+                    </a:lnL>
+                    <a:lnR w="12700" cap="flat" cmpd="sng" algn="ctr">
+                      <a:noFill/>
+                      <a:prstDash val="solid"/>
+                      <a:round/>
+                      <a:headEnd type="none" w="med" len="med"/>
+                      <a:tailEnd type="none" w="med" len="med"/>
+                    </a:lnR>
+                    <a:lnT w="12700" cap="flat" cmpd="sng" algn="ctr">
+                      <a:noFill/>
+                      <a:prstDash val="solid"/>
+                      <a:round/>
+                      <a:headEnd type="none" w="med" len="med"/>
+                      <a:tailEnd type="none" w="med" len="med"/>
+                    </a:lnT>
+                    <a:lnB w="12700" cap="flat" cmpd="sng" algn="ctr">
+                      <a:noFill/>
+                      <a:prstDash val="solid"/>
+                      <a:round/>
+                      <a:headEnd type="none" w="med" len="med"/>
+                      <a:tailEnd type="none" w="med" len="med"/>
+                    </a:lnB>
+                    <a:lnTlToBr w="12700" cmpd="sng">
+                      <a:noFill/>
+                      <a:prstDash val="solid"/>
+                    </a:lnTlToBr>
+                    <a:lnBlToTr w="12700" cmpd="sng">
+                      <a:noFill/>
+                      <a:prstDash val="solid"/>
+                    </a:lnBlToTr>
+                    <a:solidFill>
+                      <a:srgbClr val="FFF07D"/>
+                    </a:solidFill>
+                  </a:tcPr>
+                </a:tc>
+                <a:extLst>
+                  <a:ext uri="{0D108BD9-81ED-4DB2-BD59-A6C34878D82A}">
+                    <a16:rowId xmlns:a16="http://schemas.microsoft.com/office/drawing/2014/main" val="1200820259"/>
+                  </a:ext>
+                </a:extLst>
+              </a:tr>
+              <a:tr h="0">
+                <a:tc>
+                  <a:txBody>
+                    <a:bodyPr/>
+                    <a:lstStyle/>
+                    <a:p>
+                      <a:pPr algn="l" fontAlgn="ctr"/>
+                      <a:r>
+                        <a:rPr lang="en-GB" b="0" dirty="0" err="1" smtClean="0">
+                          <a:solidFill>
+                            <a:srgbClr val="0F2D69"/>
+                          </a:solidFill>
+                          <a:effectLst/>
+                          <a:latin typeface="HSE Sans" panose="02000000000000000000" pitchFamily="50" charset="0"/>
+                        </a:rPr>
+                        <a:t>NeuralFCA</a:t>
+                      </a:r>
+                      <a:r>
+                        <a:rPr lang="en-GB" b="0" dirty="0" smtClean="0">
+                          <a:solidFill>
+                            <a:srgbClr val="0F2D69"/>
+                          </a:solidFill>
+                          <a:effectLst/>
+                          <a:latin typeface="HSE Sans" panose="02000000000000000000" pitchFamily="50" charset="0"/>
+                        </a:rPr>
+                        <a:t>(</a:t>
+                      </a:r>
+                      <a:r>
+                        <a:rPr lang="en-GB" b="0" dirty="0" err="1" smtClean="0">
+                          <a:solidFill>
+                            <a:srgbClr val="0F2D69"/>
+                          </a:solidFill>
+                          <a:effectLst/>
+                          <a:latin typeface="HSE Sans" panose="02000000000000000000" pitchFamily="50" charset="0"/>
+                        </a:rPr>
+                        <a:t>interordinal</a:t>
+                      </a:r>
+                      <a:r>
+                        <a:rPr lang="en-GB" b="0" dirty="0" smtClean="0">
+                          <a:solidFill>
+                            <a:srgbClr val="0F2D69"/>
+                          </a:solidFill>
+                          <a:effectLst/>
+                          <a:latin typeface="HSE Sans" panose="02000000000000000000" pitchFamily="50" charset="0"/>
+                        </a:rPr>
+                        <a:t>)</a:t>
+                      </a:r>
+                      <a:endParaRPr lang="en-US" b="0" dirty="0">
+                        <a:solidFill>
+                          <a:srgbClr val="0F2D69"/>
+                        </a:solidFill>
+                        <a:effectLst/>
+                        <a:latin typeface="HSE Sans" panose="02000000000000000000" pitchFamily="50" charset="0"/>
+                      </a:endParaRPr>
+                    </a:p>
+                  </a:txBody>
+                  <a:tcPr anchor="ctr">
+                    <a:lnL w="12700" cap="flat" cmpd="sng" algn="ctr">
+                      <a:noFill/>
+                      <a:prstDash val="solid"/>
+                      <a:round/>
+                      <a:headEnd type="none" w="med" len="med"/>
+                      <a:tailEnd type="none" w="med" len="med"/>
+                    </a:lnL>
+                    <a:lnR w="12700" cap="flat" cmpd="sng" algn="ctr">
+                      <a:noFill/>
+                      <a:prstDash val="solid"/>
+                      <a:round/>
+                      <a:headEnd type="none" w="med" len="med"/>
+                      <a:tailEnd type="none" w="med" len="med"/>
+                    </a:lnR>
+                    <a:lnT w="12700" cap="flat" cmpd="sng" algn="ctr">
+                      <a:noFill/>
+                      <a:prstDash val="solid"/>
+                      <a:round/>
+                      <a:headEnd type="none" w="med" len="med"/>
+                      <a:tailEnd type="none" w="med" len="med"/>
+                    </a:lnT>
+                    <a:lnB w="12700" cap="flat" cmpd="sng" algn="ctr">
+                      <a:noFill/>
+                      <a:prstDash val="solid"/>
+                      <a:round/>
+                      <a:headEnd type="none" w="med" len="med"/>
+                      <a:tailEnd type="none" w="med" len="med"/>
+                    </a:lnB>
+                    <a:lnTlToBr w="12700" cmpd="sng">
+                      <a:noFill/>
+                      <a:prstDash val="solid"/>
+                    </a:lnTlToBr>
+                    <a:lnBlToTr w="12700" cmpd="sng">
+                      <a:noFill/>
+                      <a:prstDash val="solid"/>
+                    </a:lnBlToTr>
+                  </a:tcPr>
+                </a:tc>
+                <a:tc>
+                  <a:txBody>
+                    <a:bodyPr/>
+                    <a:lstStyle/>
+                    <a:p>
+                      <a:pPr algn="ctr" fontAlgn="ctr"/>
+                      <a:r>
+                        <a:rPr lang="en-US" dirty="0" smtClean="0">
+                          <a:solidFill>
+                            <a:srgbClr val="0F2D69"/>
+                          </a:solidFill>
+                          <a:effectLst/>
+                          <a:latin typeface="HSE Sans" panose="02000000000000000000" pitchFamily="50" charset="0"/>
+                        </a:rPr>
+                        <a:t>0.8707</a:t>
+                      </a:r>
+                      <a:endParaRPr lang="en-US" dirty="0">
+                        <a:solidFill>
+                          <a:srgbClr val="0F2D69"/>
+                        </a:solidFill>
+                        <a:effectLst/>
+                        <a:latin typeface="HSE Sans" panose="02000000000000000000" pitchFamily="50" charset="0"/>
+                      </a:endParaRPr>
+                    </a:p>
+                  </a:txBody>
+                  <a:tcPr anchor="ctr">
+                    <a:lnL w="12700" cap="flat" cmpd="sng" algn="ctr">
+                      <a:noFill/>
+                      <a:prstDash val="solid"/>
+                      <a:round/>
+                      <a:headEnd type="none" w="med" len="med"/>
+                      <a:tailEnd type="none" w="med" len="med"/>
+                    </a:lnL>
+                    <a:lnR w="12700" cap="flat" cmpd="sng" algn="ctr">
+                      <a:noFill/>
+                      <a:prstDash val="solid"/>
+                      <a:round/>
+                      <a:headEnd type="none" w="med" len="med"/>
+                      <a:tailEnd type="none" w="med" len="med"/>
+                    </a:lnR>
+                    <a:lnT w="12700" cap="flat" cmpd="sng" algn="ctr">
+                      <a:noFill/>
+                      <a:prstDash val="solid"/>
+                      <a:round/>
+                      <a:headEnd type="none" w="med" len="med"/>
+                      <a:tailEnd type="none" w="med" len="med"/>
+                    </a:lnT>
+                    <a:lnB w="12700" cap="flat" cmpd="sng" algn="ctr">
+                      <a:noFill/>
+                      <a:prstDash val="solid"/>
+                      <a:round/>
+                      <a:headEnd type="none" w="med" len="med"/>
+                      <a:tailEnd type="none" w="med" len="med"/>
+                    </a:lnB>
+                    <a:lnTlToBr w="12700" cmpd="sng">
+                      <a:noFill/>
+                      <a:prstDash val="solid"/>
+                    </a:lnTlToBr>
+                    <a:lnBlToTr w="12700" cmpd="sng">
+                      <a:noFill/>
+                      <a:prstDash val="solid"/>
+                    </a:lnBlToTr>
+                  </a:tcPr>
+                </a:tc>
+                <a:tc>
+                  <a:txBody>
+                    <a:bodyPr/>
+                    <a:lstStyle/>
+                    <a:p>
+                      <a:pPr algn="ctr" fontAlgn="ctr"/>
+                      <a:r>
+                        <a:rPr lang="en-US" dirty="0" smtClean="0">
+                          <a:solidFill>
+                            <a:srgbClr val="0F2D69"/>
+                          </a:solidFill>
+                          <a:effectLst/>
+                          <a:latin typeface="HSE Sans" panose="02000000000000000000" pitchFamily="50" charset="0"/>
+                        </a:rPr>
+                        <a:t>0.8100</a:t>
+                      </a:r>
+                      <a:endParaRPr lang="en-US" dirty="0">
+                        <a:solidFill>
+                          <a:srgbClr val="0F2D69"/>
+                        </a:solidFill>
+                        <a:effectLst/>
+                        <a:latin typeface="HSE Sans" panose="02000000000000000000" pitchFamily="50" charset="0"/>
+                      </a:endParaRPr>
+                    </a:p>
+                  </a:txBody>
+                  <a:tcPr anchor="ctr">
+                    <a:lnL w="12700" cap="flat" cmpd="sng" algn="ctr">
+                      <a:noFill/>
+                      <a:prstDash val="solid"/>
+                      <a:round/>
+                      <a:headEnd type="none" w="med" len="med"/>
+                      <a:tailEnd type="none" w="med" len="med"/>
+                    </a:lnL>
+                    <a:lnR w="12700" cap="flat" cmpd="sng" algn="ctr">
+                      <a:noFill/>
+                      <a:prstDash val="solid"/>
+                      <a:round/>
+                      <a:headEnd type="none" w="med" len="med"/>
+                      <a:tailEnd type="none" w="med" len="med"/>
+                    </a:lnR>
+                    <a:lnT w="12700" cap="flat" cmpd="sng" algn="ctr">
+                      <a:noFill/>
+                      <a:prstDash val="solid"/>
+                      <a:round/>
+                      <a:headEnd type="none" w="med" len="med"/>
+                      <a:tailEnd type="none" w="med" len="med"/>
+                    </a:lnT>
+                    <a:lnB w="12700" cap="flat" cmpd="sng" algn="ctr">
+                      <a:noFill/>
+                      <a:prstDash val="solid"/>
+                      <a:round/>
+                      <a:headEnd type="none" w="med" len="med"/>
+                      <a:tailEnd type="none" w="med" len="med"/>
+                    </a:lnB>
+                    <a:lnTlToBr w="12700" cmpd="sng">
+                      <a:noFill/>
+                      <a:prstDash val="solid"/>
+                    </a:lnTlToBr>
+                    <a:lnBlToTr w="12700" cmpd="sng">
+                      <a:noFill/>
+                      <a:prstDash val="solid"/>
+                    </a:lnBlToTr>
+                  </a:tcPr>
+                </a:tc>
+                <a:extLst>
+                  <a:ext uri="{0D108BD9-81ED-4DB2-BD59-A6C34878D82A}">
+                    <a16:rowId xmlns:a16="http://schemas.microsoft.com/office/drawing/2014/main" val="1242152232"/>
+                  </a:ext>
+                </a:extLst>
+              </a:tr>
+              <a:tr h="0">
+                <a:tc>
+                  <a:txBody>
+                    <a:bodyPr/>
+                    <a:lstStyle/>
+                    <a:p>
+                      <a:pPr marL="0" marR="0" lvl="0" indent="0" algn="l" defTabSz="914400" rtl="0" eaLnBrk="1" fontAlgn="ctr" latinLnBrk="0" hangingPunct="1">
+                        <a:lnSpc>
+                          <a:spcPct val="100000"/>
+                        </a:lnSpc>
+                        <a:spcBef>
+                          <a:spcPts val="0"/>
+                        </a:spcBef>
+                        <a:spcAft>
+                          <a:spcPts val="0"/>
+                        </a:spcAft>
+                        <a:buClr>
+                          <a:srgbClr val="000000"/>
+                        </a:buClr>
+                        <a:buSzTx/>
+                        <a:buFont typeface="Arial"/>
+                        <a:buNone/>
+                        <a:tabLst/>
+                        <a:defRPr/>
+                      </a:pPr>
+                      <a:r>
+                        <a:rPr lang="en-GB" b="0" dirty="0" err="1" smtClean="0">
+                          <a:solidFill>
+                            <a:srgbClr val="0F2D69"/>
+                          </a:solidFill>
+                          <a:effectLst/>
+                          <a:latin typeface="HSE Sans" panose="02000000000000000000" pitchFamily="50" charset="0"/>
+                        </a:rPr>
+                        <a:t>NeuralFCA</a:t>
+                      </a:r>
+                      <a:r>
+                        <a:rPr lang="en-GB" b="0" dirty="0" smtClean="0">
+                          <a:solidFill>
+                            <a:srgbClr val="0F2D69"/>
+                          </a:solidFill>
+                          <a:effectLst/>
+                          <a:latin typeface="HSE Sans" panose="02000000000000000000" pitchFamily="50" charset="0"/>
+                        </a:rPr>
+                        <a:t>(fine</a:t>
+                      </a:r>
+                      <a:r>
+                        <a:rPr lang="en-GB" b="0" dirty="0" smtClean="0">
+                          <a:solidFill>
+                            <a:srgbClr val="0F2D69"/>
+                          </a:solidFill>
+                          <a:effectLst/>
+                          <a:latin typeface="HSE Sans" panose="02000000000000000000" pitchFamily="50" charset="0"/>
+                        </a:rPr>
+                        <a:t>)</a:t>
+                      </a:r>
+                      <a:endParaRPr lang="en-US" b="0" dirty="0" smtClean="0">
+                        <a:solidFill>
+                          <a:srgbClr val="0F2D69"/>
+                        </a:solidFill>
+                        <a:effectLst/>
+                        <a:latin typeface="HSE Sans" panose="02000000000000000000" pitchFamily="50" charset="0"/>
+                      </a:endParaRPr>
+                    </a:p>
+                  </a:txBody>
+                  <a:tcPr anchor="ctr">
+                    <a:lnL w="12700" cap="flat" cmpd="sng" algn="ctr">
+                      <a:noFill/>
+                      <a:prstDash val="solid"/>
+                      <a:round/>
+                      <a:headEnd type="none" w="med" len="med"/>
+                      <a:tailEnd type="none" w="med" len="med"/>
+                    </a:lnL>
+                    <a:lnR w="12700" cap="flat" cmpd="sng" algn="ctr">
+                      <a:noFill/>
+                      <a:prstDash val="solid"/>
+                      <a:round/>
+                      <a:headEnd type="none" w="med" len="med"/>
+                      <a:tailEnd type="none" w="med" len="med"/>
+                    </a:lnR>
+                    <a:lnT w="12700" cap="flat" cmpd="sng" algn="ctr">
+                      <a:noFill/>
+                      <a:prstDash val="solid"/>
+                      <a:round/>
+                      <a:headEnd type="none" w="med" len="med"/>
+                      <a:tailEnd type="none" w="med" len="med"/>
+                    </a:lnT>
+                    <a:lnB w="12700" cap="flat" cmpd="sng" algn="ctr">
+                      <a:noFill/>
+                      <a:prstDash val="solid"/>
+                      <a:round/>
+                      <a:headEnd type="none" w="med" len="med"/>
+                      <a:tailEnd type="none" w="med" len="med"/>
+                    </a:lnB>
+                    <a:lnTlToBr w="12700" cmpd="sng">
+                      <a:noFill/>
+                      <a:prstDash val="solid"/>
+                    </a:lnTlToBr>
+                    <a:lnBlToTr w="12700" cmpd="sng">
+                      <a:noFill/>
+                      <a:prstDash val="solid"/>
+                    </a:lnBlToTr>
+                    <a:solidFill>
+                      <a:srgbClr val="FFF07D"/>
+                    </a:solidFill>
+                  </a:tcPr>
+                </a:tc>
+                <a:tc>
+                  <a:txBody>
+                    <a:bodyPr/>
+                    <a:lstStyle/>
+                    <a:p>
+                      <a:pPr algn="ctr" fontAlgn="ctr"/>
+                      <a:r>
+                        <a:rPr lang="en-US" dirty="0" smtClean="0">
+                          <a:solidFill>
+                            <a:srgbClr val="0F2D69"/>
+                          </a:solidFill>
+                          <a:effectLst/>
+                          <a:latin typeface="HSE Sans" panose="02000000000000000000" pitchFamily="50" charset="0"/>
+                        </a:rPr>
+                        <a:t>0.9001</a:t>
+                      </a:r>
+                      <a:endParaRPr lang="en-US" dirty="0">
+                        <a:solidFill>
+                          <a:srgbClr val="0F2D69"/>
+                        </a:solidFill>
+                        <a:effectLst/>
+                        <a:latin typeface="HSE Sans" panose="02000000000000000000" pitchFamily="50" charset="0"/>
+                      </a:endParaRPr>
+                    </a:p>
+                  </a:txBody>
+                  <a:tcPr anchor="ctr">
+                    <a:lnL w="12700" cap="flat" cmpd="sng" algn="ctr">
+                      <a:noFill/>
+                      <a:prstDash val="solid"/>
+                      <a:round/>
+                      <a:headEnd type="none" w="med" len="med"/>
+                      <a:tailEnd type="none" w="med" len="med"/>
+                    </a:lnL>
+                    <a:lnR w="12700" cap="flat" cmpd="sng" algn="ctr">
+                      <a:noFill/>
+                      <a:prstDash val="solid"/>
+                      <a:round/>
+                      <a:headEnd type="none" w="med" len="med"/>
+                      <a:tailEnd type="none" w="med" len="med"/>
+                    </a:lnR>
+                    <a:lnT w="12700" cap="flat" cmpd="sng" algn="ctr">
+                      <a:noFill/>
+                      <a:prstDash val="solid"/>
+                      <a:round/>
+                      <a:headEnd type="none" w="med" len="med"/>
+                      <a:tailEnd type="none" w="med" len="med"/>
+                    </a:lnT>
+                    <a:lnB w="12700" cap="flat" cmpd="sng" algn="ctr">
+                      <a:noFill/>
+                      <a:prstDash val="solid"/>
+                      <a:round/>
+                      <a:headEnd type="none" w="med" len="med"/>
+                      <a:tailEnd type="none" w="med" len="med"/>
+                    </a:lnB>
+                    <a:lnTlToBr w="12700" cmpd="sng">
+                      <a:noFill/>
+                      <a:prstDash val="solid"/>
+                    </a:lnTlToBr>
+                    <a:lnBlToTr w="12700" cmpd="sng">
+                      <a:noFill/>
+                      <a:prstDash val="solid"/>
+                    </a:lnBlToTr>
+                    <a:solidFill>
+                      <a:srgbClr val="FFF07D"/>
+                    </a:solidFill>
+                  </a:tcPr>
+                </a:tc>
+                <a:tc>
+                  <a:txBody>
+                    <a:bodyPr/>
+                    <a:lstStyle/>
+                    <a:p>
+                      <a:pPr algn="ctr" fontAlgn="ctr"/>
+                      <a:r>
+                        <a:rPr lang="en-US" dirty="0" smtClean="0">
+                          <a:solidFill>
+                            <a:srgbClr val="0F2D69"/>
+                          </a:solidFill>
+                          <a:effectLst/>
+                          <a:latin typeface="HSE Sans" panose="02000000000000000000" pitchFamily="50" charset="0"/>
+                        </a:rPr>
+                        <a:t>0.8550</a:t>
+                      </a:r>
+                      <a:endParaRPr lang="en-US" dirty="0">
+                        <a:solidFill>
+                          <a:srgbClr val="0F2D69"/>
+                        </a:solidFill>
+                        <a:effectLst/>
+                        <a:latin typeface="HSE Sans" panose="02000000000000000000" pitchFamily="50" charset="0"/>
+                      </a:endParaRPr>
+                    </a:p>
+                  </a:txBody>
+                  <a:tcPr anchor="ctr">
+                    <a:lnL w="12700" cap="flat" cmpd="sng" algn="ctr">
+                      <a:noFill/>
+                      <a:prstDash val="solid"/>
+                      <a:round/>
+                      <a:headEnd type="none" w="med" len="med"/>
+                      <a:tailEnd type="none" w="med" len="med"/>
+                    </a:lnL>
+                    <a:lnR w="12700" cap="flat" cmpd="sng" algn="ctr">
+                      <a:noFill/>
+                      <a:prstDash val="solid"/>
+                      <a:round/>
+                      <a:headEnd type="none" w="med" len="med"/>
+                      <a:tailEnd type="none" w="med" len="med"/>
+                    </a:lnR>
+                    <a:lnT w="12700" cap="flat" cmpd="sng" algn="ctr">
+                      <a:noFill/>
+                      <a:prstDash val="solid"/>
+                      <a:round/>
+                      <a:headEnd type="none" w="med" len="med"/>
+                      <a:tailEnd type="none" w="med" len="med"/>
+                    </a:lnT>
+                    <a:lnB w="12700" cap="flat" cmpd="sng" algn="ctr">
+                      <a:noFill/>
+                      <a:prstDash val="solid"/>
+                      <a:round/>
+                      <a:headEnd type="none" w="med" len="med"/>
+                      <a:tailEnd type="none" w="med" len="med"/>
+                    </a:lnB>
+                    <a:lnTlToBr w="12700" cmpd="sng">
+                      <a:noFill/>
+                      <a:prstDash val="solid"/>
+                    </a:lnTlToBr>
+                    <a:lnBlToTr w="12700" cmpd="sng">
+                      <a:noFill/>
+                      <a:prstDash val="solid"/>
+                    </a:lnBlToTr>
+                    <a:solidFill>
+                      <a:srgbClr val="FFF07D"/>
+                    </a:solidFill>
+                  </a:tcPr>
+                </a:tc>
+                <a:extLst>
+                  <a:ext uri="{0D108BD9-81ED-4DB2-BD59-A6C34878D82A}">
+                    <a16:rowId xmlns:a16="http://schemas.microsoft.com/office/drawing/2014/main" val="2305477826"/>
+                  </a:ext>
+                </a:extLst>
+              </a:tr>
+            </a:tbl>
+          </a:graphicData>
+        </a:graphic>
+      </p:graphicFrame>
+    </p:spTree>
+    <p:extLst>
+      <p:ext uri="{BB962C8B-B14F-4D97-AF65-F5344CB8AC3E}">
+        <p14:creationId xmlns:p14="http://schemas.microsoft.com/office/powerpoint/2010/main" val="4046253658"/>
+      </p:ext>
+    </p:extLst>
+  </p:cSld>
+  <p:clrMapOvr>
+    <a:masterClrMapping/>
+  </p:clrMapOvr>
+  <p:timing>
+    <p:tnLst>
+      <p:par>
+        <p:cTn id="1" dur="indefinite" restart="never" nodeType="tmRoot"/>
+      </p:par>
+    </p:tnLst>
+  </p:timing>
+</p:sld>
+</file>
+
+<file path=ppt/slides/slide14.xml><?xml version="1.0" encoding="utf-8"?>
+<p:sld xmlns:a="http://schemas.openxmlformats.org/drawingml/2006/main" xmlns:r="http://schemas.openxmlformats.org/officeDocument/2006/relationships" xmlns:p="http://schemas.openxmlformats.org/presentationml/2006/main">
+  <p:cSld>
+    <p:spTree>
+      <p:nvGrpSpPr>
+        <p:cNvPr id="1" name=""/>
+        <p:cNvGrpSpPr/>
+        <p:nvPr/>
+      </p:nvGrpSpPr>
+      <p:grpSpPr>
+        <a:xfrm>
+          <a:off x="0" y="0"/>
+          <a:ext cx="0" cy="0"/>
+          <a:chOff x="0" y="0"/>
+          <a:chExt cx="0" cy="0"/>
+        </a:xfrm>
+      </p:grpSpPr>
+      <p:sp>
+        <p:nvSpPr>
+          <p:cNvPr id="2" name="Title 1"/>
+          <p:cNvSpPr>
+            <a:spLocks noGrp="1"/>
+          </p:cNvSpPr>
+          <p:nvPr>
+            <p:ph type="title"/>
+          </p:nvPr>
+        </p:nvSpPr>
+        <p:spPr/>
+        <p:txBody>
+          <a:bodyPr/>
+          <a:lstStyle/>
+          <a:p>
+            <a:r>
+              <a:rPr lang="en-GB" dirty="0" smtClean="0"/>
+              <a:t>Model Evaluation</a:t>
+            </a:r>
+            <a:endParaRPr lang="en-US" dirty="0"/>
+          </a:p>
+        </p:txBody>
+      </p:sp>
+      <p:sp>
+        <p:nvSpPr>
+          <p:cNvPr id="3" name="Text Placeholder 2"/>
+          <p:cNvSpPr>
+            <a:spLocks noGrp="1"/>
+          </p:cNvSpPr>
+          <p:nvPr>
+            <p:ph type="body" idx="1"/>
+          </p:nvPr>
+        </p:nvSpPr>
+        <p:spPr/>
+        <p:txBody>
+          <a:bodyPr/>
+          <a:lstStyle/>
+          <a:p>
             <a:pPr marL="114300" indent="0">
               <a:buNone/>
             </a:pPr>
@@ -8226,11 +8514,11 @@
             </a:pPr>
             <a:fld id="{00000000-1234-1234-1234-123412341234}" type="slidenum">
               <a:rPr lang="en-US" smtClean="0"/>
-              <a:t>12</a:t>
+              <a:t>14</a:t>
             </a:fld>
             <a:r>
               <a:rPr lang="en-US" dirty="0" smtClean="0"/>
-              <a:t>/16</a:t>
+              <a:t>/18</a:t>
             </a:r>
             <a:endParaRPr lang="en-US" dirty="0"/>
           </a:p>
@@ -10447,7 +10735,7 @@
 </p:sld>
 </file>
 
-<file path=ppt/slides/slide13.xml><?xml version="1.0" encoding="utf-8"?>
+<file path=ppt/slides/slide15.xml><?xml version="1.0" encoding="utf-8"?>
 <p:sld xmlns:a="http://schemas.openxmlformats.org/drawingml/2006/main" xmlns:r="http://schemas.openxmlformats.org/officeDocument/2006/relationships" xmlns:p="http://schemas.openxmlformats.org/presentationml/2006/main">
   <p:cSld>
     <p:spTree>
@@ -10532,11 +10820,11 @@
             </a:pPr>
             <a:fld id="{00000000-1234-1234-1234-123412341234}" type="slidenum">
               <a:rPr lang="en-US" smtClean="0"/>
-              <a:t>13</a:t>
+              <a:t>15</a:t>
             </a:fld>
             <a:r>
               <a:rPr lang="en-US" dirty="0" smtClean="0"/>
-              <a:t>/16</a:t>
+              <a:t>/18</a:t>
             </a:r>
             <a:endParaRPr lang="en-US" dirty="0"/>
           </a:p>
@@ -10592,7 +10880,7 @@
 </p:sld>
 </file>
 
-<file path=ppt/slides/slide14.xml><?xml version="1.0" encoding="utf-8"?>
+<file path=ppt/slides/slide16.xml><?xml version="1.0" encoding="utf-8"?>
 <p:sld xmlns:a="http://schemas.openxmlformats.org/drawingml/2006/main" xmlns:r="http://schemas.openxmlformats.org/officeDocument/2006/relationships" xmlns:p="http://schemas.openxmlformats.org/presentationml/2006/main">
   <p:cSld>
     <p:spTree>
@@ -10701,9 +10989,21 @@
               </a:spcBef>
               <a:buNone/>
             </a:pPr>
+            <a:endParaRPr lang="en-GB" sz="2400" dirty="0" smtClean="0"/>
+          </a:p>
+          <a:p>
+            <a:pPr marL="0" lvl="0" indent="0" algn="just">
+              <a:lnSpc>
+                <a:spcPct val="115000"/>
+              </a:lnSpc>
+              <a:spcBef>
+                <a:spcPts val="0"/>
+              </a:spcBef>
+              <a:buNone/>
+            </a:pPr>
             <a:r>
-              <a:rPr lang="en-GB" sz="2400" dirty="0"/>
-              <a:t>Coarser </a:t>
+              <a:rPr lang="en-GB" sz="2400" dirty="0" smtClean="0"/>
+              <a:t>Finer </a:t>
             </a:r>
             <a:r>
               <a:rPr lang="en-GB" sz="2400" dirty="0" err="1"/>
@@ -10735,47 +11035,15 @@
             </a:r>
             <a:r>
               <a:rPr lang="en-GB" sz="2400" dirty="0"/>
-              <a:t> encoding with similar number of nodes, however this </a:t>
+              <a:t> encoding with similar number of nodes, however this comes </a:t>
             </a:r>
             <a:r>
-              <a:rPr lang="en-GB" sz="2400" dirty="0" smtClean="0"/>
-              <a:t>comes </a:t>
-            </a:r>
-            <a:r>
-              <a:rPr lang="en-GB" sz="2400" b="1" dirty="0" smtClean="0"/>
+              <a:rPr lang="en-GB" sz="2400" b="1" dirty="0"/>
               <a:t>at the cost of interpretability</a:t>
             </a:r>
             <a:r>
-              <a:rPr lang="en-GB" sz="2400" dirty="0" smtClean="0"/>
-              <a:t>. </a:t>
-            </a:r>
-            <a:r>
               <a:rPr lang="en-GB" sz="2400" dirty="0"/>
-              <a:t>Increasing the number of formal concepts used </a:t>
-            </a:r>
-            <a:r>
-              <a:rPr lang="en-GB" sz="2400" dirty="0" smtClean="0"/>
-              <a:t>to </a:t>
-            </a:r>
-            <a:r>
-              <a:rPr lang="en-GB" sz="2400" dirty="0"/>
-              <a:t>construct the concept lattice does not improve the model's performance; on the contrary, it seems to correlate with decrease in classification performance. Furthermore, the NN architecture used in </a:t>
-            </a:r>
-            <a:r>
-              <a:rPr lang="en-GB" sz="2400" dirty="0" smtClean="0"/>
-              <a:t>this work struggles </a:t>
-            </a:r>
-            <a:r>
-              <a:rPr lang="en-GB" sz="2400" dirty="0"/>
-              <a:t>with overfitting </a:t>
-            </a:r>
-            <a:r>
-              <a:rPr lang="en-GB" sz="2400" dirty="0" smtClean="0"/>
-              <a:t>on </a:t>
-            </a:r>
-            <a:r>
-              <a:rPr lang="en-GB" sz="2400" dirty="0"/>
-              <a:t>skewed data as exemplified by the Estonia Disaster dataset.</a:t>
+              <a:t>. Increasing the number of formal concepts used to construct the concept lattice does not improve the model's performance; on the contrary, it seems to correlate with decrease in classification performance. Furthermore, the NN architecture used in this work struggles with overfitting on skewed data as exemplified by the Estonia Disaster dataset.</a:t>
             </a:r>
             <a:endParaRPr dirty="0"/>
           </a:p>
@@ -10814,11 +11082,11 @@
             <a:fld id="{00000000-1234-1234-1234-123412341234}" type="slidenum">
               <a:rPr lang="en-US" smtClean="0"/>
               <a:pPr lvl="0"/>
-              <a:t>14</a:t>
+              <a:t>16</a:t>
             </a:fld>
             <a:r>
               <a:rPr lang="en-US" dirty="0" smtClean="0"/>
-              <a:t>/16</a:t>
+              <a:t>/18</a:t>
             </a:r>
             <a:endParaRPr dirty="0"/>
           </a:p>
@@ -10839,7 +11107,7 @@
 </p:sld>
 </file>
 
-<file path=ppt/slides/slide15.xml><?xml version="1.0" encoding="utf-8"?>
+<file path=ppt/slides/slide17.xml><?xml version="1.0" encoding="utf-8"?>
 <p:sld xmlns:a="http://schemas.openxmlformats.org/drawingml/2006/main" xmlns:r="http://schemas.openxmlformats.org/officeDocument/2006/relationships" xmlns:p="http://schemas.openxmlformats.org/presentationml/2006/main">
   <p:cSld>
     <p:spTree>
@@ -10897,25 +11165,35 @@
             <a:pPr marL="114300" indent="0">
               <a:buNone/>
             </a:pPr>
+            <a:endParaRPr lang="en-GB" dirty="0" smtClean="0"/>
+          </a:p>
+          <a:p>
+            <a:pPr marL="114300" indent="0">
+              <a:buNone/>
+            </a:pPr>
             <a:r>
               <a:rPr lang="en-GB" dirty="0"/>
               <a:t>Neural Networks based on concept lattices perform </a:t>
             </a:r>
             <a:r>
               <a:rPr lang="en-GB" b="1" dirty="0"/>
-              <a:t>on par with several ensemble models</a:t>
+              <a:t>on par with several ensemble models </a:t>
             </a:r>
             <a:r>
               <a:rPr lang="en-GB" dirty="0"/>
-              <a:t> and show promise in some machine learning applications. As exemplified by the Estonia Disaster dataset, these NNs can show connections between various features and their impact on its final decision, hence </a:t>
+              <a:t>and show promise in some machine learning applications. As exemplified by the Estonia Disaster dataset, these NNs can show connections between various features and their impact on its final decision, hence </a:t>
             </a:r>
             <a:r>
-              <a:rPr lang="en-GB" b="1" dirty="0"/>
+              <a:rPr lang="en-GB" b="1" dirty="0" smtClean="0"/>
               <a:t>improving human interpretability</a:t>
             </a:r>
             <a:r>
+              <a:rPr lang="en-GB" dirty="0" smtClean="0"/>
+              <a:t> </a:t>
+            </a:r>
+            <a:r>
               <a:rPr lang="en-GB" dirty="0"/>
-              <a:t> of their inner workings.</a:t>
+              <a:t>of their inner workings.</a:t>
             </a:r>
             <a:endParaRPr lang="en-US" dirty="0"/>
           </a:p>
@@ -10947,11 +11225,11 @@
             </a:pPr>
             <a:fld id="{00000000-1234-1234-1234-123412341234}" type="slidenum">
               <a:rPr lang="en-US" smtClean="0"/>
-              <a:t>15</a:t>
+              <a:t>17</a:t>
             </a:fld>
             <a:r>
               <a:rPr lang="en-US" dirty="0" smtClean="0"/>
-              <a:t>/16</a:t>
+              <a:t>/18</a:t>
             </a:r>
             <a:endParaRPr lang="en-US" dirty="0"/>
           </a:p>
@@ -10977,7 +11255,7 @@
 </p:sld>
 </file>
 
-<file path=ppt/slides/slide16.xml><?xml version="1.0" encoding="utf-8"?>
+<file path=ppt/slides/slide18.xml><?xml version="1.0" encoding="utf-8"?>
 <p:sld xmlns:a="http://schemas.openxmlformats.org/drawingml/2006/main" xmlns:r="http://schemas.openxmlformats.org/officeDocument/2006/relationships" xmlns:p="http://schemas.openxmlformats.org/presentationml/2006/main">
   <p:cSld>
     <p:spTree>
@@ -11157,11 +11435,11 @@
             <a:fld id="{00000000-1234-1234-1234-123412341234}" type="slidenum">
               <a:rPr lang="en-US" smtClean="0"/>
               <a:pPr lvl="0"/>
-              <a:t>16</a:t>
+              <a:t>18</a:t>
             </a:fld>
             <a:r>
               <a:rPr lang="en-US" dirty="0" smtClean="0"/>
-              <a:t>/16</a:t>
+              <a:t>/18</a:t>
             </a:r>
             <a:endParaRPr dirty="0"/>
           </a:p>
@@ -11296,8 +11574,31 @@
               <a:buChar char="●"/>
             </a:pPr>
             <a:r>
+              <a:rPr lang="en-US" dirty="0" smtClean="0"/>
+              <a:t>Introduction</a:t>
+            </a:r>
+          </a:p>
+          <a:p>
+            <a:pPr marL="457200" lvl="0" indent="-342900" algn="l" rtl="0">
+              <a:lnSpc>
+                <a:spcPct val="115000"/>
+              </a:lnSpc>
+              <a:spcBef>
+                <a:spcPts val="0"/>
+              </a:spcBef>
+              <a:spcAft>
+                <a:spcPts val="0"/>
+              </a:spcAft>
+              <a:buSzPts val="1800"/>
+              <a:buChar char="●"/>
+            </a:pPr>
+            <a:r>
+              <a:rPr lang="en-US" dirty="0" smtClean="0"/>
+              <a:t>Problem </a:t>
+            </a:r>
+            <a:r>
               <a:rPr lang="en-US" dirty="0"/>
-              <a:t>Problem Statement</a:t>
+              <a:t>Statement</a:t>
             </a:r>
             <a:endParaRPr dirty="0"/>
           </a:p>
@@ -11420,7 +11721,7 @@
             </a:fld>
             <a:r>
               <a:rPr lang="en-US" dirty="0" smtClean="0"/>
-              <a:t>/16</a:t>
+              <a:t>/18</a:t>
             </a:r>
             <a:endParaRPr dirty="0"/>
           </a:p>
@@ -11442,6 +11743,150 @@
 </file>
 
 <file path=ppt/slides/slide3.xml><?xml version="1.0" encoding="utf-8"?>
+<p:sld xmlns:a="http://schemas.openxmlformats.org/drawingml/2006/main" xmlns:r="http://schemas.openxmlformats.org/officeDocument/2006/relationships" xmlns:p="http://schemas.openxmlformats.org/presentationml/2006/main">
+  <p:cSld>
+    <p:spTree>
+      <p:nvGrpSpPr>
+        <p:cNvPr id="1" name=""/>
+        <p:cNvGrpSpPr/>
+        <p:nvPr/>
+      </p:nvGrpSpPr>
+      <p:grpSpPr>
+        <a:xfrm>
+          <a:off x="0" y="0"/>
+          <a:ext cx="0" cy="0"/>
+          <a:chOff x="0" y="0"/>
+          <a:chExt cx="0" cy="0"/>
+        </a:xfrm>
+      </p:grpSpPr>
+      <p:sp>
+        <p:nvSpPr>
+          <p:cNvPr id="2" name="Title 1"/>
+          <p:cNvSpPr>
+            <a:spLocks noGrp="1"/>
+          </p:cNvSpPr>
+          <p:nvPr>
+            <p:ph type="title"/>
+          </p:nvPr>
+        </p:nvSpPr>
+        <p:spPr/>
+        <p:txBody>
+          <a:bodyPr/>
+          <a:lstStyle/>
+          <a:p>
+            <a:r>
+              <a:rPr lang="en-US" dirty="0"/>
+              <a:t>Introduction</a:t>
+            </a:r>
+          </a:p>
+        </p:txBody>
+      </p:sp>
+      <p:sp>
+        <p:nvSpPr>
+          <p:cNvPr id="3" name="Text Placeholder 2"/>
+          <p:cNvSpPr>
+            <a:spLocks noGrp="1"/>
+          </p:cNvSpPr>
+          <p:nvPr>
+            <p:ph type="body" idx="1"/>
+          </p:nvPr>
+        </p:nvSpPr>
+        <p:spPr/>
+        <p:txBody>
+          <a:bodyPr/>
+          <a:lstStyle/>
+          <a:p>
+            <a:endParaRPr lang="en-GB" dirty="0" smtClean="0"/>
+          </a:p>
+          <a:p>
+            <a:pPr marL="114300" indent="0">
+              <a:lnSpc>
+                <a:spcPct val="114000"/>
+              </a:lnSpc>
+              <a:buNone/>
+            </a:pPr>
+            <a:r>
+              <a:rPr lang="en-GB" sz="2400" dirty="0" smtClean="0"/>
+              <a:t>The </a:t>
+            </a:r>
+            <a:r>
+              <a:rPr lang="en-GB" sz="2400" dirty="0"/>
+              <a:t>overarching goal of this homework is to implement a </a:t>
+            </a:r>
+            <a:r>
+              <a:rPr lang="en-GB" sz="2400" b="1" dirty="0"/>
+              <a:t>merge</a:t>
+            </a:r>
+            <a:r>
+              <a:rPr lang="en-GB" sz="2400" dirty="0"/>
+              <a:t> of machine learning and formal concept analysis. This can be done by basing the neural network(NN) architecture on the </a:t>
+            </a:r>
+            <a:r>
+              <a:rPr lang="en-GB" sz="2400" b="1" dirty="0" smtClean="0"/>
+              <a:t>covering relation </a:t>
+            </a:r>
+            <a:r>
+              <a:rPr lang="en-GB" sz="2400" dirty="0" smtClean="0"/>
+              <a:t>(</a:t>
+            </a:r>
+            <a:r>
+              <a:rPr lang="en-GB" sz="2400" dirty="0"/>
+              <a:t>graph of the diagram) of a lattice coming from monotone Galois connections as proposed by </a:t>
+            </a:r>
+            <a:r>
+              <a:rPr lang="en-GB" sz="2400" dirty="0" err="1"/>
+              <a:t>Kuznetsov</a:t>
+            </a:r>
+            <a:r>
+              <a:rPr lang="en-GB" sz="2400" dirty="0"/>
+              <a:t> and his colleagues [1].</a:t>
+            </a:r>
+            <a:endParaRPr lang="en-US" sz="2400" dirty="0"/>
+          </a:p>
+        </p:txBody>
+      </p:sp>
+      <p:sp>
+        <p:nvSpPr>
+          <p:cNvPr id="4" name="Slide Number Placeholder 3"/>
+          <p:cNvSpPr>
+            <a:spLocks noGrp="1"/>
+          </p:cNvSpPr>
+          <p:nvPr>
+            <p:ph type="sldNum" idx="12"/>
+          </p:nvPr>
+        </p:nvSpPr>
+        <p:spPr/>
+        <p:txBody>
+          <a:bodyPr/>
+          <a:lstStyle/>
+          <a:p>
+            <a:fld id="{00000000-1234-1234-1234-123412341234}" type="slidenum">
+              <a:rPr lang="en-US" smtClean="0"/>
+              <a:pPr/>
+              <a:t>3</a:t>
+            </a:fld>
+            <a:r>
+              <a:rPr lang="en-US" dirty="0" smtClean="0"/>
+              <a:t>/18</a:t>
+            </a:r>
+            <a:endParaRPr lang="en-US" dirty="0"/>
+          </a:p>
+        </p:txBody>
+      </p:sp>
+    </p:spTree>
+    <p:extLst>
+      <p:ext uri="{BB962C8B-B14F-4D97-AF65-F5344CB8AC3E}">
+        <p14:creationId xmlns:p14="http://schemas.microsoft.com/office/powerpoint/2010/main" val="2022082409"/>
+      </p:ext>
+    </p:extLst>
+  </p:cSld>
+  <p:clrMapOvr>
+    <a:masterClrMapping/>
+  </p:clrMapOvr>
+</p:sld>
+</file>
+
+<file path=ppt/slides/slide4.xml><?xml version="1.0" encoding="utf-8"?>
 <p:sld xmlns:a="http://schemas.openxmlformats.org/drawingml/2006/main" xmlns:r="http://schemas.openxmlformats.org/officeDocument/2006/relationships" xmlns:p="http://schemas.openxmlformats.org/presentationml/2006/main">
   <p:cSld>
     <p:spTree>
@@ -11572,15 +12017,7 @@
             </a:pPr>
             <a:r>
               <a:rPr lang="en-GB" sz="2400" dirty="0"/>
-              <a:t>The overarching task of this homework is to implement a merger of machine learning and formal concept analysis</a:t>
-            </a:r>
-            <a:r>
-              <a:rPr lang="en-GB" sz="2400" dirty="0" smtClean="0"/>
-              <a:t>. For this, </a:t>
-            </a:r>
-            <a:r>
-              <a:rPr lang="en-GB" sz="2400" dirty="0"/>
-              <a:t>a dataset has to be chosen, its data </a:t>
+              <a:t>For this task a dataset has to be chosen, its data </a:t>
             </a:r>
             <a:r>
               <a:rPr lang="en-GB" sz="2400" dirty="0" err="1"/>
@@ -11588,35 +12025,31 @@
             </a:r>
             <a:r>
               <a:rPr lang="en-GB" sz="2400" dirty="0"/>
-              <a:t> </a:t>
+              <a:t> using scaling (</a:t>
             </a:r>
             <a:r>
-              <a:rPr lang="en-GB" sz="2400" dirty="0" smtClean="0"/>
-              <a:t>using </a:t>
-            </a:r>
-            <a:r>
-              <a:rPr lang="en-GB" sz="2400" dirty="0"/>
-              <a:t>scaling </a:t>
-            </a:r>
-            <a:r>
-              <a:rPr lang="en-GB" sz="2400" dirty="0" smtClean="0"/>
-              <a:t>(</a:t>
-            </a:r>
-            <a:r>
-              <a:rPr lang="en-GB" sz="2400" dirty="0" err="1" smtClean="0"/>
+              <a:rPr lang="en-GB" sz="2400" dirty="0" err="1"/>
               <a:t>binarization</a:t>
             </a:r>
             <a:r>
               <a:rPr lang="en-GB" sz="2400" dirty="0"/>
-              <a:t>) strategy </a:t>
+              <a:t>) strategy of choice, and finally the target attribute defined. Then, a </a:t>
             </a:r>
             <a:r>
-              <a:rPr lang="en-GB" sz="2400" dirty="0" smtClean="0"/>
-              <a:t>of choice, </a:t>
+              <a:rPr lang="en-GB" sz="2400" b="1" dirty="0"/>
+              <a:t>comparison</a:t>
             </a:r>
             <a:r>
               <a:rPr lang="en-GB" sz="2400" dirty="0"/>
-              <a:t>and finally the target attribute defined. Then, a comparison between several standard classification methods and NN should be made by calculating performance metrics best suited for the dataset.</a:t>
+              <a:t> between several standard classification methods and the neural network produced as the result of this homework should be made by calculating </a:t>
+            </a:r>
+            <a:r>
+              <a:rPr lang="en-GB" sz="2400" b="1" dirty="0"/>
+              <a:t>performance metrics </a:t>
+            </a:r>
+            <a:r>
+              <a:rPr lang="en-GB" sz="2400" dirty="0"/>
+              <a:t>best suited for the dataset.</a:t>
             </a:r>
             <a:endParaRPr sz="2400" dirty="0"/>
           </a:p>
@@ -11655,11 +12088,11 @@
             <a:fld id="{00000000-1234-1234-1234-123412341234}" type="slidenum">
               <a:rPr lang="en-US" smtClean="0"/>
               <a:pPr lvl="0"/>
-              <a:t>3</a:t>
+              <a:t>4</a:t>
             </a:fld>
             <a:r>
               <a:rPr lang="en-US" dirty="0" smtClean="0"/>
-              <a:t>/16</a:t>
+              <a:t>/18</a:t>
             </a:r>
             <a:endParaRPr dirty="0"/>
           </a:p>
@@ -11680,7 +12113,7 @@
 </p:sld>
 </file>
 
-<file path=ppt/slides/slide4.xml><?xml version="1.0" encoding="utf-8"?>
+<file path=ppt/slides/slide5.xml><?xml version="1.0" encoding="utf-8"?>
 <p:sld xmlns:a="http://schemas.openxmlformats.org/drawingml/2006/main" xmlns:r="http://schemas.openxmlformats.org/officeDocument/2006/relationships" xmlns:p="http://schemas.openxmlformats.org/presentationml/2006/main">
   <p:cSld>
     <p:spTree>
@@ -11768,11 +12201,11 @@
             <a:fld id="{00000000-1234-1234-1234-123412341234}" type="slidenum">
               <a:rPr lang="en-US" smtClean="0"/>
               <a:pPr lvl="0"/>
-              <a:t>4</a:t>
+              <a:t>5</a:t>
             </a:fld>
             <a:r>
               <a:rPr lang="en-US" dirty="0" smtClean="0"/>
-              <a:t>/16</a:t>
+              <a:t>/18</a:t>
             </a:r>
             <a:endParaRPr dirty="0"/>
           </a:p>
@@ -11794,6 +12227,9 @@
           <a:lstStyle/>
           <a:p>
             <a:pPr marL="114300" indent="0">
+              <a:lnSpc>
+                <a:spcPct val="114000"/>
+              </a:lnSpc>
               <a:buNone/>
             </a:pPr>
             <a:r>
@@ -14646,7 +15082,7 @@
 </p:sld>
 </file>
 
-<file path=ppt/slides/slide5.xml><?xml version="1.0" encoding="utf-8"?>
+<file path=ppt/slides/slide6.xml><?xml version="1.0" encoding="utf-8"?>
 <p:sld xmlns:a="http://schemas.openxmlformats.org/drawingml/2006/main" xmlns:r="http://schemas.openxmlformats.org/officeDocument/2006/relationships" xmlns:p="http://schemas.openxmlformats.org/presentationml/2006/main">
   <p:cSld>
     <p:spTree>
@@ -14707,11 +15143,22 @@
           </a:p>
           <a:p>
             <a:pPr marL="114300" indent="0">
+              <a:lnSpc>
+                <a:spcPct val="114000"/>
+              </a:lnSpc>
               <a:buNone/>
             </a:pPr>
             <a:r>
               <a:rPr lang="en-GB" dirty="0" smtClean="0"/>
-              <a:t>Let’s see how the number of concepts used impacts the interpretability of a neural network</a:t>
+              <a:t>Let’s see how the number of concepts used impacts the </a:t>
+            </a:r>
+            <a:r>
+              <a:rPr lang="en-GB" b="1" dirty="0" smtClean="0"/>
+              <a:t>interpretability</a:t>
+            </a:r>
+            <a:r>
+              <a:rPr lang="en-GB" dirty="0" smtClean="0"/>
+              <a:t> of a neural network</a:t>
             </a:r>
             <a:endParaRPr lang="en-US" dirty="0"/>
           </a:p>
@@ -14743,11 +15190,11 @@
             </a:pPr>
             <a:fld id="{00000000-1234-1234-1234-123412341234}" type="slidenum">
               <a:rPr lang="en-US" smtClean="0"/>
-              <a:t>5</a:t>
+              <a:t>6</a:t>
             </a:fld>
             <a:r>
               <a:rPr lang="en-US" dirty="0" smtClean="0"/>
-              <a:t>/16</a:t>
+              <a:t>/18</a:t>
             </a:r>
             <a:endParaRPr lang="en-US" dirty="0"/>
           </a:p>
@@ -14757,151 +15204,6 @@
     <p:extLst>
       <p:ext uri="{BB962C8B-B14F-4D97-AF65-F5344CB8AC3E}">
         <p14:creationId xmlns:p14="http://schemas.microsoft.com/office/powerpoint/2010/main" val="3030218802"/>
-      </p:ext>
-    </p:extLst>
-  </p:cSld>
-  <p:clrMapOvr>
-    <a:masterClrMapping/>
-  </p:clrMapOvr>
-  <p:timing>
-    <p:tnLst>
-      <p:par>
-        <p:cTn id="1" dur="indefinite" restart="never" nodeType="tmRoot"/>
-      </p:par>
-    </p:tnLst>
-  </p:timing>
-</p:sld>
-</file>
-
-<file path=ppt/slides/slide6.xml><?xml version="1.0" encoding="utf-8"?>
-<p:sld xmlns:a="http://schemas.openxmlformats.org/drawingml/2006/main" xmlns:r="http://schemas.openxmlformats.org/officeDocument/2006/relationships" xmlns:p="http://schemas.openxmlformats.org/presentationml/2006/main">
-  <p:cSld>
-    <p:spTree>
-      <p:nvGrpSpPr>
-        <p:cNvPr id="1" name=""/>
-        <p:cNvGrpSpPr/>
-        <p:nvPr/>
-      </p:nvGrpSpPr>
-      <p:grpSpPr>
-        <a:xfrm>
-          <a:off x="0" y="0"/>
-          <a:ext cx="0" cy="0"/>
-          <a:chOff x="0" y="0"/>
-          <a:chExt cx="0" cy="0"/>
-        </a:xfrm>
-      </p:grpSpPr>
-      <p:sp>
-        <p:nvSpPr>
-          <p:cNvPr id="2" name="Title 1"/>
-          <p:cNvSpPr>
-            <a:spLocks noGrp="1"/>
-          </p:cNvSpPr>
-          <p:nvPr>
-            <p:ph type="title"/>
-          </p:nvPr>
-        </p:nvSpPr>
-        <p:spPr/>
-        <p:txBody>
-          <a:bodyPr/>
-          <a:lstStyle/>
-          <a:p>
-            <a:r>
-              <a:rPr lang="en-GB" dirty="0" smtClean="0"/>
-              <a:t>Model Evaluation</a:t>
-            </a:r>
-            <a:endParaRPr lang="en-US" dirty="0"/>
-          </a:p>
-        </p:txBody>
-      </p:sp>
-      <p:sp>
-        <p:nvSpPr>
-          <p:cNvPr id="3" name="Text Placeholder 2"/>
-          <p:cNvSpPr>
-            <a:spLocks noGrp="1"/>
-          </p:cNvSpPr>
-          <p:nvPr>
-            <p:ph type="body" idx="1"/>
-          </p:nvPr>
-        </p:nvSpPr>
-        <p:spPr/>
-        <p:txBody>
-          <a:bodyPr/>
-          <a:lstStyle/>
-          <a:p>
-            <a:endParaRPr lang="en-US" dirty="0"/>
-          </a:p>
-        </p:txBody>
-      </p:sp>
-      <p:sp>
-        <p:nvSpPr>
-          <p:cNvPr id="4" name="Slide Number Placeholder 3"/>
-          <p:cNvSpPr>
-            <a:spLocks noGrp="1"/>
-          </p:cNvSpPr>
-          <p:nvPr>
-            <p:ph type="sldNum" idx="12"/>
-          </p:nvPr>
-        </p:nvSpPr>
-        <p:spPr/>
-        <p:txBody>
-          <a:bodyPr/>
-          <a:lstStyle/>
-          <a:p>
-            <a:pPr marL="0" lvl="0" indent="0" algn="r" rtl="0">
-              <a:spcBef>
-                <a:spcPts val="0"/>
-              </a:spcBef>
-              <a:spcAft>
-                <a:spcPts val="0"/>
-              </a:spcAft>
-              <a:buNone/>
-            </a:pPr>
-            <a:fld id="{00000000-1234-1234-1234-123412341234}" type="slidenum">
-              <a:rPr lang="en-US" smtClean="0"/>
-              <a:t>6</a:t>
-            </a:fld>
-            <a:r>
-              <a:rPr lang="en-US" dirty="0" smtClean="0"/>
-              <a:t>/16</a:t>
-            </a:r>
-            <a:endParaRPr lang="en-US" dirty="0"/>
-          </a:p>
-        </p:txBody>
-      </p:sp>
-      <p:pic>
-        <p:nvPicPr>
-          <p:cNvPr id="7" name="Picture 6"/>
-          <p:cNvPicPr>
-            <a:picLocks noChangeAspect="1"/>
-          </p:cNvPicPr>
-          <p:nvPr/>
-        </p:nvPicPr>
-        <p:blipFill>
-          <a:blip r:embed="rId2">
-            <a:extLst>
-              <a:ext uri="{28A0092B-C50C-407E-A947-70E740481C1C}">
-                <a14:useLocalDpi xmlns:a14="http://schemas.microsoft.com/office/drawing/2010/main" val="0"/>
-              </a:ext>
-            </a:extLst>
-          </a:blip>
-          <a:stretch>
-            <a:fillRect/>
-          </a:stretch>
-        </p:blipFill>
-        <p:spPr>
-          <a:xfrm>
-            <a:off x="986971" y="1702367"/>
-            <a:ext cx="10159092" cy="4351338"/>
-          </a:xfrm>
-          <a:prstGeom prst="rect">
-            <a:avLst/>
-          </a:prstGeom>
-        </p:spPr>
-      </p:pic>
-    </p:spTree>
-    <p:extLst>
-      <p:ext uri="{BB962C8B-B14F-4D97-AF65-F5344CB8AC3E}">
-        <p14:creationId xmlns:p14="http://schemas.microsoft.com/office/powerpoint/2010/main" val="2810563969"/>
       </p:ext>
     </p:extLst>
   </p:cSld>
@@ -15007,7 +15309,152 @@
             </a:fld>
             <a:r>
               <a:rPr lang="en-US" dirty="0" smtClean="0"/>
-              <a:t>/16</a:t>
+              <a:t>/18</a:t>
+            </a:r>
+            <a:endParaRPr lang="en-US" dirty="0"/>
+          </a:p>
+        </p:txBody>
+      </p:sp>
+      <p:pic>
+        <p:nvPicPr>
+          <p:cNvPr id="7" name="Picture 6"/>
+          <p:cNvPicPr>
+            <a:picLocks noChangeAspect="1"/>
+          </p:cNvPicPr>
+          <p:nvPr/>
+        </p:nvPicPr>
+        <p:blipFill>
+          <a:blip r:embed="rId2">
+            <a:extLst>
+              <a:ext uri="{28A0092B-C50C-407E-A947-70E740481C1C}">
+                <a14:useLocalDpi xmlns:a14="http://schemas.microsoft.com/office/drawing/2010/main" val="0"/>
+              </a:ext>
+            </a:extLst>
+          </a:blip>
+          <a:stretch>
+            <a:fillRect/>
+          </a:stretch>
+        </p:blipFill>
+        <p:spPr>
+          <a:xfrm>
+            <a:off x="986971" y="1702367"/>
+            <a:ext cx="10159092" cy="4351338"/>
+          </a:xfrm>
+          <a:prstGeom prst="rect">
+            <a:avLst/>
+          </a:prstGeom>
+        </p:spPr>
+      </p:pic>
+    </p:spTree>
+    <p:extLst>
+      <p:ext uri="{BB962C8B-B14F-4D97-AF65-F5344CB8AC3E}">
+        <p14:creationId xmlns:p14="http://schemas.microsoft.com/office/powerpoint/2010/main" val="2810563969"/>
+      </p:ext>
+    </p:extLst>
+  </p:cSld>
+  <p:clrMapOvr>
+    <a:masterClrMapping/>
+  </p:clrMapOvr>
+  <p:timing>
+    <p:tnLst>
+      <p:par>
+        <p:cTn id="1" dur="indefinite" restart="never" nodeType="tmRoot"/>
+      </p:par>
+    </p:tnLst>
+  </p:timing>
+</p:sld>
+</file>
+
+<file path=ppt/slides/slide8.xml><?xml version="1.0" encoding="utf-8"?>
+<p:sld xmlns:a="http://schemas.openxmlformats.org/drawingml/2006/main" xmlns:r="http://schemas.openxmlformats.org/officeDocument/2006/relationships" xmlns:p="http://schemas.openxmlformats.org/presentationml/2006/main">
+  <p:cSld>
+    <p:spTree>
+      <p:nvGrpSpPr>
+        <p:cNvPr id="1" name=""/>
+        <p:cNvGrpSpPr/>
+        <p:nvPr/>
+      </p:nvGrpSpPr>
+      <p:grpSpPr>
+        <a:xfrm>
+          <a:off x="0" y="0"/>
+          <a:ext cx="0" cy="0"/>
+          <a:chOff x="0" y="0"/>
+          <a:chExt cx="0" cy="0"/>
+        </a:xfrm>
+      </p:grpSpPr>
+      <p:sp>
+        <p:nvSpPr>
+          <p:cNvPr id="2" name="Title 1"/>
+          <p:cNvSpPr>
+            <a:spLocks noGrp="1"/>
+          </p:cNvSpPr>
+          <p:nvPr>
+            <p:ph type="title"/>
+          </p:nvPr>
+        </p:nvSpPr>
+        <p:spPr/>
+        <p:txBody>
+          <a:bodyPr/>
+          <a:lstStyle/>
+          <a:p>
+            <a:r>
+              <a:rPr lang="en-GB" dirty="0" smtClean="0"/>
+              <a:t>Model Evaluation</a:t>
+            </a:r>
+            <a:endParaRPr lang="en-US" dirty="0"/>
+          </a:p>
+        </p:txBody>
+      </p:sp>
+      <p:sp>
+        <p:nvSpPr>
+          <p:cNvPr id="3" name="Text Placeholder 2"/>
+          <p:cNvSpPr>
+            <a:spLocks noGrp="1"/>
+          </p:cNvSpPr>
+          <p:nvPr>
+            <p:ph type="body" idx="1"/>
+          </p:nvPr>
+        </p:nvSpPr>
+        <p:spPr/>
+        <p:txBody>
+          <a:bodyPr/>
+          <a:lstStyle/>
+          <a:p>
+            <a:endParaRPr lang="en-US" dirty="0"/>
+          </a:p>
+        </p:txBody>
+      </p:sp>
+      <p:sp>
+        <p:nvSpPr>
+          <p:cNvPr id="4" name="Slide Number Placeholder 3"/>
+          <p:cNvSpPr>
+            <a:spLocks noGrp="1"/>
+          </p:cNvSpPr>
+          <p:nvPr>
+            <p:ph type="sldNum" idx="12"/>
+          </p:nvPr>
+        </p:nvSpPr>
+        <p:spPr/>
+        <p:txBody>
+          <a:bodyPr/>
+          <a:lstStyle/>
+          <a:p>
+            <a:pPr marL="0" lvl="0" indent="0" algn="r" rtl="0">
+              <a:spcBef>
+                <a:spcPts val="0"/>
+              </a:spcBef>
+              <a:spcAft>
+                <a:spcPts val="0"/>
+              </a:spcAft>
+              <a:buNone/>
+            </a:pPr>
+            <a:fld id="{00000000-1234-1234-1234-123412341234}" type="slidenum">
+              <a:rPr lang="en-US" smtClean="0"/>
+              <a:t>8</a:t>
+            </a:fld>
+            <a:r>
+              <a:rPr lang="en-US" dirty="0" smtClean="0"/>
+              <a:t>/18</a:t>
             </a:r>
             <a:endParaRPr lang="en-US" dirty="0"/>
           </a:p>
@@ -15063,7 +15510,7 @@
 </p:sld>
 </file>
 
-<file path=ppt/slides/slide8.xml><?xml version="1.0" encoding="utf-8"?>
+<file path=ppt/slides/slide9.xml><?xml version="1.0" encoding="utf-8"?>
 <p:sld xmlns:a="http://schemas.openxmlformats.org/drawingml/2006/main" xmlns:r="http://schemas.openxmlformats.org/officeDocument/2006/relationships" xmlns:p="http://schemas.openxmlformats.org/presentationml/2006/main">
   <p:cSld>
     <p:spTree>
@@ -15122,12 +15569,16 @@
               <a:buNone/>
             </a:pPr>
             <a:r>
-              <a:rPr lang="en-GB" dirty="0" smtClean="0"/>
-              <a:t>Let’</a:t>
+              <a:rPr lang="en-GB" dirty="0"/>
+              <a:t>The impact of an increase in </a:t>
             </a:r>
             <a:r>
-              <a:rPr lang="en-US" dirty="0" smtClean="0"/>
-              <a:t>s consider the impact of an increase in the number of concepts used on performance metrics too:</a:t>
+              <a:rPr lang="en-GB" b="1" dirty="0"/>
+              <a:t>number of concepts </a:t>
+            </a:r>
+            <a:r>
+              <a:rPr lang="en-GB" dirty="0"/>
+              <a:t>used on performance metrics has to be considered too:</a:t>
             </a:r>
             <a:endParaRPr lang="en-GB" dirty="0" smtClean="0"/>
           </a:p>
@@ -15159,11 +15610,11 @@
             </a:pPr>
             <a:fld id="{00000000-1234-1234-1234-123412341234}" type="slidenum">
               <a:rPr lang="en-US" smtClean="0"/>
-              <a:t>8</a:t>
+              <a:t>9</a:t>
             </a:fld>
             <a:r>
               <a:rPr lang="en-US" dirty="0" smtClean="0"/>
-              <a:t>/16</a:t>
+              <a:t>/18</a:t>
             </a:r>
             <a:endParaRPr lang="en-US" dirty="0"/>
           </a:p>
@@ -15233,151 +15684,6 @@
     <p:extLst>
       <p:ext uri="{BB962C8B-B14F-4D97-AF65-F5344CB8AC3E}">
         <p14:creationId xmlns:p14="http://schemas.microsoft.com/office/powerpoint/2010/main" val="1802321285"/>
-      </p:ext>
-    </p:extLst>
-  </p:cSld>
-  <p:clrMapOvr>
-    <a:masterClrMapping/>
-  </p:clrMapOvr>
-  <p:timing>
-    <p:tnLst>
-      <p:par>
-        <p:cTn id="1" dur="indefinite" restart="never" nodeType="tmRoot"/>
-      </p:par>
-    </p:tnLst>
-  </p:timing>
-</p:sld>
-</file>
-
-<file path=ppt/slides/slide9.xml><?xml version="1.0" encoding="utf-8"?>
-<p:sld xmlns:a="http://schemas.openxmlformats.org/drawingml/2006/main" xmlns:r="http://schemas.openxmlformats.org/officeDocument/2006/relationships" xmlns:p="http://schemas.openxmlformats.org/presentationml/2006/main">
-  <p:cSld>
-    <p:spTree>
-      <p:nvGrpSpPr>
-        <p:cNvPr id="1" name=""/>
-        <p:cNvGrpSpPr/>
-        <p:nvPr/>
-      </p:nvGrpSpPr>
-      <p:grpSpPr>
-        <a:xfrm>
-          <a:off x="0" y="0"/>
-          <a:ext cx="0" cy="0"/>
-          <a:chOff x="0" y="0"/>
-          <a:chExt cx="0" cy="0"/>
-        </a:xfrm>
-      </p:grpSpPr>
-      <p:sp>
-        <p:nvSpPr>
-          <p:cNvPr id="2" name="Title 1"/>
-          <p:cNvSpPr>
-            <a:spLocks noGrp="1"/>
-          </p:cNvSpPr>
-          <p:nvPr>
-            <p:ph type="title"/>
-          </p:nvPr>
-        </p:nvSpPr>
-        <p:spPr/>
-        <p:txBody>
-          <a:bodyPr/>
-          <a:lstStyle/>
-          <a:p>
-            <a:r>
-              <a:rPr lang="en-GB" dirty="0" smtClean="0"/>
-              <a:t>Model Evaluation</a:t>
-            </a:r>
-            <a:endParaRPr lang="en-US" dirty="0"/>
-          </a:p>
-        </p:txBody>
-      </p:sp>
-      <p:sp>
-        <p:nvSpPr>
-          <p:cNvPr id="3" name="Text Placeholder 2"/>
-          <p:cNvSpPr>
-            <a:spLocks noGrp="1"/>
-          </p:cNvSpPr>
-          <p:nvPr>
-            <p:ph type="body" idx="1"/>
-          </p:nvPr>
-        </p:nvSpPr>
-        <p:spPr/>
-        <p:txBody>
-          <a:bodyPr/>
-          <a:lstStyle/>
-          <a:p>
-            <a:endParaRPr lang="en-US"/>
-          </a:p>
-        </p:txBody>
-      </p:sp>
-      <p:sp>
-        <p:nvSpPr>
-          <p:cNvPr id="4" name="Slide Number Placeholder 3"/>
-          <p:cNvSpPr>
-            <a:spLocks noGrp="1"/>
-          </p:cNvSpPr>
-          <p:nvPr>
-            <p:ph type="sldNum" idx="12"/>
-          </p:nvPr>
-        </p:nvSpPr>
-        <p:spPr/>
-        <p:txBody>
-          <a:bodyPr/>
-          <a:lstStyle/>
-          <a:p>
-            <a:pPr marL="0" lvl="0" indent="0" algn="r" rtl="0">
-              <a:spcBef>
-                <a:spcPts val="0"/>
-              </a:spcBef>
-              <a:spcAft>
-                <a:spcPts val="0"/>
-              </a:spcAft>
-              <a:buNone/>
-            </a:pPr>
-            <a:fld id="{00000000-1234-1234-1234-123412341234}" type="slidenum">
-              <a:rPr lang="en-US" smtClean="0"/>
-              <a:t>9</a:t>
-            </a:fld>
-            <a:r>
-              <a:rPr lang="en-US" dirty="0" smtClean="0"/>
-              <a:t>/16</a:t>
-            </a:r>
-            <a:endParaRPr lang="en-US" dirty="0"/>
-          </a:p>
-        </p:txBody>
-      </p:sp>
-      <p:pic>
-        <p:nvPicPr>
-          <p:cNvPr id="5" name="Picture 4"/>
-          <p:cNvPicPr>
-            <a:picLocks noChangeAspect="1"/>
-          </p:cNvPicPr>
-          <p:nvPr/>
-        </p:nvPicPr>
-        <p:blipFill>
-          <a:blip r:embed="rId2">
-            <a:extLst>
-              <a:ext uri="{28A0092B-C50C-407E-A947-70E740481C1C}">
-                <a14:useLocalDpi xmlns:a14="http://schemas.microsoft.com/office/drawing/2010/main" val="0"/>
-              </a:ext>
-            </a:extLst>
-          </a:blip>
-          <a:stretch>
-            <a:fillRect/>
-          </a:stretch>
-        </p:blipFill>
-        <p:spPr>
-          <a:xfrm>
-            <a:off x="986970" y="1702367"/>
-            <a:ext cx="10159092" cy="4426857"/>
-          </a:xfrm>
-          <a:prstGeom prst="rect">
-            <a:avLst/>
-          </a:prstGeom>
-        </p:spPr>
-      </p:pic>
-    </p:spTree>
-    <p:extLst>
-      <p:ext uri="{BB962C8B-B14F-4D97-AF65-F5344CB8AC3E}">
-        <p14:creationId xmlns:p14="http://schemas.microsoft.com/office/powerpoint/2010/main" val="2035722306"/>
       </p:ext>
     </p:extLst>
   </p:cSld>

</xml_diff>